<commit_message>
refactor: remove some content
</commit_message>
<xml_diff>
--- a/My 7th Semester/FYP/FYP PPT.pptx
+++ b/My 7th Semester/FYP/FYP PPT.pptx
@@ -226,7 +226,7 @@
           <a:p>
             <a:fld id="{209AD1F1-416F-48D4-ADF3-EEF37A1896ED}" type="datetimeFigureOut">
               <a:rPr lang="en-US" smtClean="0"/>
-              <a:t>10/2/2024</a:t>
+              <a:t>10/4/2024</a:t>
             </a:fld>
             <a:endParaRPr lang="en-US"/>
           </a:p>
@@ -933,7 +933,7 @@
             <a:fld id="{1D8BD707-D9CF-40AE-B4C6-C98DA3205C09}" type="datetimeFigureOut">
               <a:rPr lang="en-US" smtClean="0"/>
               <a:pPr/>
-              <a:t>10/2/2024</a:t>
+              <a:t>10/4/2024</a:t>
             </a:fld>
             <a:endParaRPr lang="en-US"/>
           </a:p>
@@ -1132,7 +1132,7 @@
             <a:fld id="{1D8BD707-D9CF-40AE-B4C6-C98DA3205C09}" type="datetimeFigureOut">
               <a:rPr lang="en-US" smtClean="0"/>
               <a:pPr/>
-              <a:t>10/2/2024</a:t>
+              <a:t>10/4/2024</a:t>
             </a:fld>
             <a:endParaRPr lang="en-US"/>
           </a:p>
@@ -1366,7 +1366,7 @@
             <a:fld id="{1D8BD707-D9CF-40AE-B4C6-C98DA3205C09}" type="datetimeFigureOut">
               <a:rPr lang="en-US" smtClean="0"/>
               <a:pPr/>
-              <a:t>10/2/2024</a:t>
+              <a:t>10/4/2024</a:t>
             </a:fld>
             <a:endParaRPr lang="en-US"/>
           </a:p>
@@ -1646,7 +1646,7 @@
             <a:fld id="{1D8BD707-D9CF-40AE-B4C6-C98DA3205C09}" type="datetimeFigureOut">
               <a:rPr lang="en-US" smtClean="0"/>
               <a:pPr/>
-              <a:t>10/2/2024</a:t>
+              <a:t>10/4/2024</a:t>
             </a:fld>
             <a:endParaRPr lang="en-US"/>
           </a:p>
@@ -1952,7 +1952,7 @@
             <a:fld id="{1D8BD707-D9CF-40AE-B4C6-C98DA3205C09}" type="datetimeFigureOut">
               <a:rPr lang="en-US" smtClean="0"/>
               <a:pPr/>
-              <a:t>10/2/2024</a:t>
+              <a:t>10/4/2024</a:t>
             </a:fld>
             <a:endParaRPr lang="en-US"/>
           </a:p>
@@ -2438,7 +2438,7 @@
             <a:fld id="{1D8BD707-D9CF-40AE-B4C6-C98DA3205C09}" type="datetimeFigureOut">
               <a:rPr lang="en-US" smtClean="0"/>
               <a:pPr/>
-              <a:t>10/2/2024</a:t>
+              <a:t>10/4/2024</a:t>
             </a:fld>
             <a:endParaRPr lang="en-US"/>
           </a:p>
@@ -2590,7 +2590,7 @@
             <a:fld id="{1D8BD707-D9CF-40AE-B4C6-C98DA3205C09}" type="datetimeFigureOut">
               <a:rPr lang="en-US" smtClean="0"/>
               <a:pPr/>
-              <a:t>10/2/2024</a:t>
+              <a:t>10/4/2024</a:t>
             </a:fld>
             <a:endParaRPr lang="en-US"/>
           </a:p>
@@ -2706,7 +2706,7 @@
             <a:fld id="{1D8BD707-D9CF-40AE-B4C6-C98DA3205C09}" type="datetimeFigureOut">
               <a:rPr lang="en-US" smtClean="0"/>
               <a:pPr/>
-              <a:t>10/2/2024</a:t>
+              <a:t>10/4/2024</a:t>
             </a:fld>
             <a:endParaRPr lang="en-US"/>
           </a:p>
@@ -3002,7 +3002,7 @@
             <a:fld id="{1D8BD707-D9CF-40AE-B4C6-C98DA3205C09}" type="datetimeFigureOut">
               <a:rPr lang="en-US" smtClean="0"/>
               <a:pPr/>
-              <a:t>10/2/2024</a:t>
+              <a:t>10/4/2024</a:t>
             </a:fld>
             <a:endParaRPr lang="en-US"/>
           </a:p>
@@ -3275,7 +3275,7 @@
             <a:fld id="{1D8BD707-D9CF-40AE-B4C6-C98DA3205C09}" type="datetimeFigureOut">
               <a:rPr lang="en-US" smtClean="0"/>
               <a:pPr/>
-              <a:t>10/2/2024</a:t>
+              <a:t>10/4/2024</a:t>
             </a:fld>
             <a:endParaRPr lang="en-US"/>
           </a:p>
@@ -4622,7 +4622,7 @@
           <a:p>
             <a:r>
               <a:rPr lang="en-US" dirty="0"/>
-              <a:t>Proposed Solution (Cont. )</a:t>
+              <a:t>Proposed Solution</a:t>
             </a:r>
           </a:p>
         </p:txBody>
@@ -4644,8 +4644,17 @@
           </a:bodyPr>
           <a:lstStyle/>
           <a:p>
-            <a:r>
-              <a:rPr lang="en-US" dirty="0"/>
+            <a:pPr marL="0" indent="0">
+              <a:buNone/>
+            </a:pPr>
+            <a:endParaRPr lang="en-US" sz="2800" dirty="0"/>
+          </a:p>
+          <a:p>
+            <a:pPr marL="0" indent="0">
+              <a:buNone/>
+            </a:pPr>
+            <a:r>
+              <a:rPr lang="en-US" sz="2800" dirty="0"/>
               <a:t>Methodology/Algorithm</a:t>
             </a:r>
           </a:p>
@@ -4673,8 +4682,8 @@
         </p:nvSpPr>
         <p:spPr bwMode="auto">
           <a:xfrm>
-            <a:off x="228600" y="1676400"/>
-            <a:ext cx="8534400" cy="4832092"/>
+            <a:off x="228600" y="2620952"/>
+            <a:ext cx="8458200" cy="1815882"/>
           </a:xfrm>
           <a:prstGeom prst="rect">
             <a:avLst/>
@@ -4733,25 +4742,18 @@
               <a:buChar char="•"/>
             </a:pPr>
             <a:r>
-              <a:rPr lang="en-US" altLang="en-US" sz="2400" b="1" dirty="0">
+              <a:rPr lang="en-US" altLang="en-US" sz="2400" dirty="0">
                 <a:latin typeface="Times New Roman" panose="02020603050405020304" pitchFamily="18" charset="0"/>
                 <a:cs typeface="Times New Roman" panose="02020603050405020304" pitchFamily="18" charset="0"/>
               </a:rPr>
               <a:t> </a:t>
             </a:r>
             <a:r>
-              <a:rPr lang="en-US" altLang="en-US" sz="2800" b="1" dirty="0">
-                <a:latin typeface="Times New Roman" panose="02020603050405020304" pitchFamily="18" charset="0"/>
-                <a:cs typeface="Times New Roman" panose="02020603050405020304" pitchFamily="18" charset="0"/>
-              </a:rPr>
-              <a:t>Sprints and Iterations</a:t>
-            </a:r>
-            <a:r>
               <a:rPr lang="en-US" altLang="en-US" sz="2800" dirty="0">
                 <a:latin typeface="Times New Roman" panose="02020603050405020304" pitchFamily="18" charset="0"/>
                 <a:cs typeface="Times New Roman" panose="02020603050405020304" pitchFamily="18" charset="0"/>
               </a:rPr>
-              <a:t>: Each sprint (2-4 weeks) will focus on specific deliverables, ensuring continuous progress.</a:t>
+              <a:t>Sprints and Iterations:</a:t>
             </a:r>
           </a:p>
           <a:p>
@@ -4766,18 +4768,11 @@
               <a:buChar char="•"/>
             </a:pPr>
             <a:r>
-              <a:rPr lang="en-US" altLang="en-US" sz="2800" b="1" dirty="0">
-                <a:latin typeface="Times New Roman" panose="02020603050405020304" pitchFamily="18" charset="0"/>
-                <a:cs typeface="Times New Roman" panose="02020603050405020304" pitchFamily="18" charset="0"/>
-              </a:rPr>
-              <a:t> Daily Stand-ups</a:t>
-            </a:r>
-            <a:r>
               <a:rPr lang="en-US" altLang="en-US" sz="2800" dirty="0">
                 <a:latin typeface="Times New Roman" panose="02020603050405020304" pitchFamily="18" charset="0"/>
                 <a:cs typeface="Times New Roman" panose="02020603050405020304" pitchFamily="18" charset="0"/>
               </a:rPr>
-              <a:t>: Short daily meetings to review progress, address roadblocks, and align on daily tasks.</a:t>
+              <a:t> Daily Stand-ups: </a:t>
             </a:r>
           </a:p>
           <a:p>
@@ -4792,18 +4787,11 @@
               <a:buChar char="•"/>
             </a:pPr>
             <a:r>
-              <a:rPr lang="en-US" altLang="en-US" sz="2800" b="1" dirty="0">
-                <a:latin typeface="Times New Roman" panose="02020603050405020304" pitchFamily="18" charset="0"/>
-                <a:cs typeface="Times New Roman" panose="02020603050405020304" pitchFamily="18" charset="0"/>
-              </a:rPr>
-              <a:t> User Stories and Backlog</a:t>
-            </a:r>
-            <a:r>
               <a:rPr lang="en-US" altLang="en-US" sz="2800" dirty="0">
                 <a:latin typeface="Times New Roman" panose="02020603050405020304" pitchFamily="18" charset="0"/>
                 <a:cs typeface="Times New Roman" panose="02020603050405020304" pitchFamily="18" charset="0"/>
               </a:rPr>
-              <a:t>: Prioritized user stories will guide development, focusing on key features like real-time communication and AI-powered documentation.</a:t>
+              <a:t>User Stories and Backlog: </a:t>
             </a:r>
           </a:p>
           <a:p>
@@ -4818,18 +4806,11 @@
               <a:buChar char="•"/>
             </a:pPr>
             <a:r>
-              <a:rPr lang="en-US" altLang="en-US" sz="2800" b="1" dirty="0">
-                <a:latin typeface="Times New Roman" panose="02020603050405020304" pitchFamily="18" charset="0"/>
-                <a:cs typeface="Times New Roman" panose="02020603050405020304" pitchFamily="18" charset="0"/>
-              </a:rPr>
-              <a:t> Continuous Integration and Delivery (CI/CD)</a:t>
-            </a:r>
-            <a:r>
               <a:rPr lang="en-US" altLang="en-US" sz="2800" dirty="0">
                 <a:latin typeface="Times New Roman" panose="02020603050405020304" pitchFamily="18" charset="0"/>
                 <a:cs typeface="Times New Roman" panose="02020603050405020304" pitchFamily="18" charset="0"/>
               </a:rPr>
-              <a:t>: Regular code integration and testing will ensure stability and frequent releases.</a:t>
+              <a:t>Continuous Integration and Delivery (CI/CD):</a:t>
             </a:r>
           </a:p>
         </p:txBody>
@@ -4881,7 +4862,7 @@
           <a:p>
             <a:r>
               <a:rPr lang="en-US" dirty="0"/>
-              <a:t>Proposed Solution (Cont. )</a:t>
+              <a:t>Proposed Solution</a:t>
             </a:r>
           </a:p>
         </p:txBody>
@@ -4899,7 +4880,7 @@
         <p:spPr/>
         <p:txBody>
           <a:bodyPr>
-            <a:normAutofit/>
+            <a:normAutofit fontScale="85000" lnSpcReduction="10000"/>
           </a:bodyPr>
           <a:lstStyle/>
           <a:p>
@@ -4922,6 +4903,9 @@
           </a:p>
           <a:p>
             <a:pPr marL="342900" marR="0" lvl="0" indent="-342900">
+              <a:lnSpc>
+                <a:spcPct val="150000"/>
+              </a:lnSpc>
               <a:spcBef>
                 <a:spcPts val="65"/>
               </a:spcBef>
@@ -4936,7 +4920,7 @@
               </a:tabLst>
             </a:pPr>
             <a:r>
-              <a:rPr lang="en-US" sz="2800" b="1" dirty="0">
+              <a:rPr lang="en-US" b="1" dirty="0">
                 <a:effectLst/>
                 <a:latin typeface="Times New Roman" panose="02020603050405020304" pitchFamily="18" charset="0"/>
                 <a:ea typeface="Calibri" panose="020F0502020204030204" pitchFamily="34" charset="0"/>
@@ -4945,7 +4929,7 @@
               <a:t>Frontend:</a:t>
             </a:r>
             <a:r>
-              <a:rPr lang="en-US" sz="2800" dirty="0">
+              <a:rPr lang="en-US" dirty="0">
                 <a:effectLst/>
                 <a:latin typeface="Times New Roman" panose="02020603050405020304" pitchFamily="18" charset="0"/>
                 <a:ea typeface="Calibri" panose="020F0502020204030204" pitchFamily="34" charset="0"/>
@@ -4954,7 +4938,7 @@
               <a:t> </a:t>
             </a:r>
             <a:r>
-              <a:rPr lang="en-US" sz="2800" b="0" dirty="0">
+              <a:rPr lang="en-US" b="0" dirty="0">
                 <a:effectLst/>
                 <a:latin typeface="Times New Roman" panose="02020603050405020304" pitchFamily="18" charset="0"/>
                 <a:ea typeface="Calibri" panose="020F0502020204030204" pitchFamily="34" charset="0"/>
@@ -4962,7 +4946,7 @@
               </a:rPr>
               <a:t>React.js</a:t>
             </a:r>
-            <a:endParaRPr lang="en-US" sz="2800" b="0" dirty="0">
+            <a:endParaRPr lang="en-US" b="0" dirty="0">
               <a:effectLst/>
               <a:latin typeface="Times New Roman" panose="02020603050405020304" pitchFamily="18" charset="0"/>
               <a:ea typeface="Times New Roman" panose="02020603050405020304" pitchFamily="18" charset="0"/>
@@ -4970,6 +4954,9 @@
           </a:p>
           <a:p>
             <a:pPr marL="342900" marR="0" lvl="0" indent="-342900">
+              <a:lnSpc>
+                <a:spcPct val="150000"/>
+              </a:lnSpc>
               <a:spcBef>
                 <a:spcPts val="65"/>
               </a:spcBef>
@@ -4984,7 +4971,7 @@
               </a:tabLst>
             </a:pPr>
             <a:r>
-              <a:rPr lang="en-US" sz="2800" b="1" dirty="0">
+              <a:rPr lang="en-US" b="1" dirty="0">
                 <a:effectLst/>
                 <a:latin typeface="Times New Roman" panose="02020603050405020304" pitchFamily="18" charset="0"/>
                 <a:ea typeface="Calibri" panose="020F0502020204030204" pitchFamily="34" charset="0"/>
@@ -4993,7 +4980,7 @@
               <a:t>Backend/Database:</a:t>
             </a:r>
             <a:r>
-              <a:rPr lang="en-US" sz="2800" dirty="0">
+              <a:rPr lang="en-US" dirty="0">
                 <a:effectLst/>
                 <a:latin typeface="Times New Roman" panose="02020603050405020304" pitchFamily="18" charset="0"/>
                 <a:ea typeface="Calibri" panose="020F0502020204030204" pitchFamily="34" charset="0"/>
@@ -5002,7 +4989,7 @@
               <a:t> </a:t>
             </a:r>
             <a:r>
-              <a:rPr lang="en-US" sz="2800" b="0" dirty="0">
+              <a:rPr lang="en-US" b="0" dirty="0">
                 <a:effectLst/>
                 <a:latin typeface="Times New Roman" panose="02020603050405020304" pitchFamily="18" charset="0"/>
                 <a:ea typeface="Calibri" panose="020F0502020204030204" pitchFamily="34" charset="0"/>
@@ -5010,7 +4997,7 @@
               </a:rPr>
               <a:t>Firebase</a:t>
             </a:r>
-            <a:endParaRPr lang="en-US" sz="2800" b="0" dirty="0">
+            <a:endParaRPr lang="en-US" b="0" dirty="0">
               <a:effectLst/>
               <a:latin typeface="Times New Roman" panose="02020603050405020304" pitchFamily="18" charset="0"/>
               <a:ea typeface="Times New Roman" panose="02020603050405020304" pitchFamily="18" charset="0"/>
@@ -5018,6 +5005,9 @@
           </a:p>
           <a:p>
             <a:pPr marL="342900" marR="0" lvl="0" indent="-342900">
+              <a:lnSpc>
+                <a:spcPct val="150000"/>
+              </a:lnSpc>
               <a:spcBef>
                 <a:spcPts val="65"/>
               </a:spcBef>
@@ -5032,7 +5022,7 @@
               </a:tabLst>
             </a:pPr>
             <a:r>
-              <a:rPr lang="en-US" sz="2800" b="1" dirty="0">
+              <a:rPr lang="en-US" b="1" dirty="0">
                 <a:effectLst/>
                 <a:latin typeface="Times New Roman" panose="02020603050405020304" pitchFamily="18" charset="0"/>
                 <a:ea typeface="Calibri" panose="020F0502020204030204" pitchFamily="34" charset="0"/>
@@ -5041,7 +5031,7 @@
               <a:t>Real-Time Communication:</a:t>
             </a:r>
             <a:r>
-              <a:rPr lang="en-US" sz="2800" dirty="0">
+              <a:rPr lang="en-US" dirty="0">
                 <a:effectLst/>
                 <a:latin typeface="Times New Roman" panose="02020603050405020304" pitchFamily="18" charset="0"/>
                 <a:ea typeface="Calibri" panose="020F0502020204030204" pitchFamily="34" charset="0"/>
@@ -5050,7 +5040,7 @@
               <a:t> </a:t>
             </a:r>
             <a:r>
-              <a:rPr lang="en-US" sz="2800" b="0" dirty="0">
+              <a:rPr lang="en-US" b="0" dirty="0">
                 <a:effectLst/>
                 <a:latin typeface="Times New Roman" panose="02020603050405020304" pitchFamily="18" charset="0"/>
                 <a:ea typeface="Calibri" panose="020F0502020204030204" pitchFamily="34" charset="0"/>
@@ -5058,7 +5048,7 @@
               </a:rPr>
               <a:t>Real time Firebase Database</a:t>
             </a:r>
-            <a:endParaRPr lang="en-US" sz="2800" b="0" dirty="0">
+            <a:endParaRPr lang="en-US" b="0" dirty="0">
               <a:effectLst/>
               <a:latin typeface="Times New Roman" panose="02020603050405020304" pitchFamily="18" charset="0"/>
               <a:ea typeface="Times New Roman" panose="02020603050405020304" pitchFamily="18" charset="0"/>
@@ -5066,6 +5056,9 @@
           </a:p>
           <a:p>
             <a:pPr marL="342900" marR="0" lvl="0" indent="-342900">
+              <a:lnSpc>
+                <a:spcPct val="150000"/>
+              </a:lnSpc>
               <a:spcBef>
                 <a:spcPts val="65"/>
               </a:spcBef>
@@ -5080,7 +5073,7 @@
               </a:tabLst>
             </a:pPr>
             <a:r>
-              <a:rPr lang="en-US" sz="2800" b="1" dirty="0">
+              <a:rPr lang="en-US" b="1" dirty="0">
                 <a:effectLst/>
                 <a:latin typeface="Times New Roman" panose="02020603050405020304" pitchFamily="18" charset="0"/>
                 <a:ea typeface="Calibri" panose="020F0502020204030204" pitchFamily="34" charset="0"/>
@@ -5089,7 +5082,7 @@
               <a:t>AI Tools (optional):</a:t>
             </a:r>
             <a:r>
-              <a:rPr lang="en-US" sz="2800" dirty="0">
+              <a:rPr lang="en-US" dirty="0">
                 <a:effectLst/>
                 <a:latin typeface="Times New Roman" panose="02020603050405020304" pitchFamily="18" charset="0"/>
                 <a:ea typeface="Calibri" panose="020F0502020204030204" pitchFamily="34" charset="0"/>
@@ -5098,7 +5091,7 @@
               <a:t> </a:t>
             </a:r>
             <a:r>
-              <a:rPr lang="en-US" sz="2800" b="0" dirty="0">
+              <a:rPr lang="en-US" b="0" dirty="0">
                 <a:effectLst/>
                 <a:latin typeface="Times New Roman" panose="02020603050405020304" pitchFamily="18" charset="0"/>
                 <a:ea typeface="Calibri" panose="020F0502020204030204" pitchFamily="34" charset="0"/>
@@ -5106,7 +5099,7 @@
               </a:rPr>
               <a:t>OpenAI API for automatic documentation</a:t>
             </a:r>
-            <a:endParaRPr lang="en-US" sz="2800" b="0" dirty="0">
+            <a:endParaRPr lang="en-US" b="0" dirty="0">
               <a:effectLst/>
               <a:latin typeface="Times New Roman" panose="02020603050405020304" pitchFamily="18" charset="0"/>
               <a:ea typeface="Times New Roman" panose="02020603050405020304" pitchFamily="18" charset="0"/>
@@ -5114,6 +5107,9 @@
           </a:p>
           <a:p>
             <a:pPr marL="342900" marR="0" lvl="0" indent="-342900">
+              <a:lnSpc>
+                <a:spcPct val="150000"/>
+              </a:lnSpc>
               <a:spcBef>
                 <a:spcPts val="65"/>
               </a:spcBef>
@@ -5128,7 +5124,7 @@
               </a:tabLst>
             </a:pPr>
             <a:r>
-              <a:rPr lang="en-US" sz="2800" b="1" dirty="0">
+              <a:rPr lang="en-US" b="1" dirty="0">
                 <a:effectLst/>
                 <a:latin typeface="Times New Roman" panose="02020603050405020304" pitchFamily="18" charset="0"/>
                 <a:ea typeface="Calibri" panose="020F0502020204030204" pitchFamily="34" charset="0"/>
@@ -5137,7 +5133,7 @@
               <a:t>Task Scheduling &amp; Progress Tracking:</a:t>
             </a:r>
             <a:r>
-              <a:rPr lang="en-US" sz="2800" dirty="0">
+              <a:rPr lang="en-US" dirty="0">
                 <a:effectLst/>
                 <a:latin typeface="Times New Roman" panose="02020603050405020304" pitchFamily="18" charset="0"/>
                 <a:ea typeface="Calibri" panose="020F0502020204030204" pitchFamily="34" charset="0"/>
@@ -5146,7 +5142,7 @@
               <a:t> </a:t>
             </a:r>
             <a:r>
-              <a:rPr lang="en-US" sz="2800" b="0" dirty="0">
+              <a:rPr lang="en-US" b="0" dirty="0">
                 <a:effectLst/>
                 <a:latin typeface="Times New Roman" panose="02020603050405020304" pitchFamily="18" charset="0"/>
                 <a:ea typeface="Calibri" panose="020F0502020204030204" pitchFamily="34" charset="0"/>
@@ -5155,7 +5151,7 @@
               <a:t>Firebase </a:t>
             </a:r>
             <a:r>
-              <a:rPr lang="en-US" sz="2800" b="0" dirty="0" err="1">
+              <a:rPr lang="en-US" b="0" dirty="0" err="1">
                 <a:effectLst/>
                 <a:latin typeface="Times New Roman" panose="02020603050405020304" pitchFamily="18" charset="0"/>
                 <a:ea typeface="Calibri" panose="020F0502020204030204" pitchFamily="34" charset="0"/>
@@ -5164,7 +5160,7 @@
               <a:t>Firestore</a:t>
             </a:r>
             <a:r>
-              <a:rPr lang="en-US" sz="2800" b="0" dirty="0">
+              <a:rPr lang="en-US" b="0" dirty="0">
                 <a:effectLst/>
                 <a:latin typeface="Times New Roman" panose="02020603050405020304" pitchFamily="18" charset="0"/>
                 <a:ea typeface="Calibri" panose="020F0502020204030204" pitchFamily="34" charset="0"/>
@@ -5172,55 +5168,7 @@
               </a:rPr>
               <a:t> for scheduled tasks</a:t>
             </a:r>
-            <a:endParaRPr lang="en-US" sz="2800" b="0" dirty="0">
-              <a:effectLst/>
-              <a:latin typeface="Times New Roman" panose="02020603050405020304" pitchFamily="18" charset="0"/>
-              <a:ea typeface="Times New Roman" panose="02020603050405020304" pitchFamily="18" charset="0"/>
-            </a:endParaRPr>
-          </a:p>
-          <a:p>
-            <a:pPr marL="342900" marR="0" lvl="0" indent="-342900">
-              <a:spcBef>
-                <a:spcPts val="65"/>
-              </a:spcBef>
-              <a:spcAft>
-                <a:spcPts val="0"/>
-              </a:spcAft>
-              <a:buSzPts val="1000"/>
-              <a:buFont typeface="Symbol" panose="05050102010706020507" pitchFamily="18" charset="2"/>
-              <a:buChar char=""/>
-              <a:tabLst>
-                <a:tab pos="457200" algn="l"/>
-              </a:tabLst>
-            </a:pPr>
-            <a:r>
-              <a:rPr lang="en-US" sz="2800" b="1" dirty="0">
-                <a:effectLst/>
-                <a:latin typeface="Times New Roman" panose="02020603050405020304" pitchFamily="18" charset="0"/>
-                <a:ea typeface="Calibri" panose="020F0502020204030204" pitchFamily="34" charset="0"/>
-                <a:cs typeface="Times New Roman" panose="02020603050405020304" pitchFamily="18" charset="0"/>
-              </a:rPr>
-              <a:t>Mobile Integration (optional):</a:t>
-            </a:r>
-            <a:r>
-              <a:rPr lang="en-US" sz="2800" dirty="0">
-                <a:effectLst/>
-                <a:latin typeface="Times New Roman" panose="02020603050405020304" pitchFamily="18" charset="0"/>
-                <a:ea typeface="Calibri" panose="020F0502020204030204" pitchFamily="34" charset="0"/>
-                <a:cs typeface="Times New Roman" panose="02020603050405020304" pitchFamily="18" charset="0"/>
-              </a:rPr>
-              <a:t> </a:t>
-            </a:r>
-            <a:r>
-              <a:rPr lang="en-US" sz="2800" b="0" dirty="0">
-                <a:effectLst/>
-                <a:latin typeface="Times New Roman" panose="02020603050405020304" pitchFamily="18" charset="0"/>
-                <a:ea typeface="Calibri" panose="020F0502020204030204" pitchFamily="34" charset="0"/>
-                <a:cs typeface="Times New Roman" panose="02020603050405020304" pitchFamily="18" charset="0"/>
-              </a:rPr>
-              <a:t>React Native for mobile access</a:t>
-            </a:r>
-            <a:endParaRPr lang="en-US" sz="2800" b="0" dirty="0">
+            <a:endParaRPr lang="en-US" b="0" dirty="0">
               <a:effectLst/>
               <a:latin typeface="Times New Roman" panose="02020603050405020304" pitchFamily="18" charset="0"/>
               <a:ea typeface="Times New Roman" panose="02020603050405020304" pitchFamily="18" charset="0"/>
@@ -5275,7 +5223,7 @@
           <a:p>
             <a:r>
               <a:rPr lang="en-US" dirty="0"/>
-              <a:t>Proposed Solution (Cont. )</a:t>
+              <a:t>Proposed Solution</a:t>
             </a:r>
           </a:p>
         </p:txBody>
@@ -5298,7 +5246,7 @@
           <a:lstStyle/>
           <a:p>
             <a:r>
-              <a:rPr lang="en-US" b="1" u="sng" dirty="0"/>
+              <a:rPr lang="en-US" sz="2800" b="1" u="sng" dirty="0"/>
               <a:t>Sustainable Development Goals Mappings</a:t>
             </a:r>
           </a:p>
@@ -5682,62 +5630,6 @@
               <a:t>Features for customers and builders to add and track projects, including descriptions, images, and building links.</a:t>
             </a:r>
             <a:endParaRPr lang="en-US" sz="2600" b="0" dirty="0">
-              <a:effectLst/>
-              <a:latin typeface="Times New Roman" panose="02020603050405020304" pitchFamily="18" charset="0"/>
-              <a:ea typeface="Times New Roman" panose="02020603050405020304" pitchFamily="18" charset="0"/>
-            </a:endParaRPr>
-          </a:p>
-          <a:p>
-            <a:pPr marL="342900" marR="0" lvl="0" indent="-342900">
-              <a:spcBef>
-                <a:spcPts val="65"/>
-              </a:spcBef>
-              <a:spcAft>
-                <a:spcPts val="0"/>
-              </a:spcAft>
-              <a:buFont typeface="+mj-lt"/>
-              <a:buAutoNum type="arabicPeriod"/>
-              <a:tabLst>
-                <a:tab pos="514350" algn="l"/>
-              </a:tabLst>
-            </a:pPr>
-            <a:r>
-              <a:rPr lang="en-US" sz="2600" b="1" dirty="0">
-                <a:effectLst/>
-                <a:latin typeface="Times New Roman" panose="02020603050405020304" pitchFamily="18" charset="0"/>
-                <a:ea typeface="Calibri" panose="020F0502020204030204" pitchFamily="34" charset="0"/>
-                <a:cs typeface="Times New Roman" panose="02020603050405020304" pitchFamily="18" charset="0"/>
-              </a:rPr>
-              <a:t>Companies Section:</a:t>
-            </a:r>
-            <a:r>
-              <a:rPr lang="en-US" sz="2600" dirty="0">
-                <a:effectLst/>
-                <a:latin typeface="Times New Roman" panose="02020603050405020304" pitchFamily="18" charset="0"/>
-                <a:ea typeface="Calibri" panose="020F0502020204030204" pitchFamily="34" charset="0"/>
-                <a:cs typeface="Times New Roman" panose="02020603050405020304" pitchFamily="18" charset="0"/>
-              </a:rPr>
-              <a:t> </a:t>
-            </a:r>
-            <a:r>
-              <a:rPr lang="en-US" sz="2600" b="0" dirty="0">
-                <a:effectLst/>
-                <a:latin typeface="Times New Roman" panose="02020603050405020304" pitchFamily="18" charset="0"/>
-                <a:ea typeface="Calibri" panose="020F0502020204030204" pitchFamily="34" charset="0"/>
-                <a:cs typeface="Times New Roman" panose="02020603050405020304" pitchFamily="18" charset="0"/>
-              </a:rPr>
-              <a:t>A dedicated section for listing companies involved in a project, visible in the sidebar for easy navigation</a:t>
-            </a:r>
-            <a:r>
-              <a:rPr lang="en-US" sz="2600" dirty="0">
-                <a:effectLst/>
-                <a:latin typeface="Times New Roman" panose="02020603050405020304" pitchFamily="18" charset="0"/>
-                <a:ea typeface="Calibri" panose="020F0502020204030204" pitchFamily="34" charset="0"/>
-                <a:cs typeface="Times New Roman" panose="02020603050405020304" pitchFamily="18" charset="0"/>
-              </a:rPr>
-              <a:t>.</a:t>
-            </a:r>
-            <a:endParaRPr lang="en-US" sz="2600" dirty="0">
               <a:effectLst/>
               <a:latin typeface="Times New Roman" panose="02020603050405020304" pitchFamily="18" charset="0"/>
               <a:ea typeface="Times New Roman" panose="02020603050405020304" pitchFamily="18" charset="0"/>
@@ -5942,7 +5834,66 @@
           </a:bodyPr>
           <a:lstStyle/>
           <a:p>
+            <a:pPr marL="514350" indent="-514350">
+              <a:lnSpc>
+                <a:spcPct val="150000"/>
+              </a:lnSpc>
+              <a:spcBef>
+                <a:spcPts val="65"/>
+              </a:spcBef>
+              <a:buFont typeface="Arial" pitchFamily="34" charset="0"/>
+              <a:buAutoNum type="arabicPeriod" startAt="6"/>
+              <a:tabLst>
+                <a:tab pos="514350" algn="l"/>
+              </a:tabLst>
+            </a:pPr>
+            <a:r>
+              <a:rPr lang="en-US" sz="2400" b="1" dirty="0">
+                <a:effectLst/>
+                <a:latin typeface="Times New Roman" panose="02020603050405020304" pitchFamily="18" charset="0"/>
+                <a:ea typeface="Calibri" panose="020F0502020204030204" pitchFamily="34" charset="0"/>
+                <a:cs typeface="Times New Roman" panose="02020603050405020304" pitchFamily="18" charset="0"/>
+              </a:rPr>
+              <a:t>Companies Section:</a:t>
+            </a:r>
+            <a:r>
+              <a:rPr lang="en-US" sz="2400" dirty="0">
+                <a:effectLst/>
+                <a:latin typeface="Times New Roman" panose="02020603050405020304" pitchFamily="18" charset="0"/>
+                <a:ea typeface="Calibri" panose="020F0502020204030204" pitchFamily="34" charset="0"/>
+                <a:cs typeface="Times New Roman" panose="02020603050405020304" pitchFamily="18" charset="0"/>
+              </a:rPr>
+              <a:t> </a:t>
+            </a:r>
+            <a:r>
+              <a:rPr lang="en-US" sz="2400" b="0" dirty="0">
+                <a:effectLst/>
+                <a:latin typeface="Times New Roman" panose="02020603050405020304" pitchFamily="18" charset="0"/>
+                <a:ea typeface="Calibri" panose="020F0502020204030204" pitchFamily="34" charset="0"/>
+                <a:cs typeface="Times New Roman" panose="02020603050405020304" pitchFamily="18" charset="0"/>
+              </a:rPr>
+              <a:t>A dedicated section for listing companies involved in a project, visible in the sidebar for easy navigation</a:t>
+            </a:r>
+            <a:r>
+              <a:rPr lang="en-US" sz="2400" dirty="0">
+                <a:effectLst/>
+                <a:latin typeface="Times New Roman" panose="02020603050405020304" pitchFamily="18" charset="0"/>
+                <a:ea typeface="Calibri" panose="020F0502020204030204" pitchFamily="34" charset="0"/>
+                <a:cs typeface="Times New Roman" panose="02020603050405020304" pitchFamily="18" charset="0"/>
+              </a:rPr>
+              <a:t>.</a:t>
+            </a:r>
+            <a:endParaRPr lang="en-US" sz="2400" dirty="0">
+              <a:effectLst/>
+              <a:latin typeface="Times New Roman" panose="02020603050405020304" pitchFamily="18" charset="0"/>
+              <a:ea typeface="Times New Roman" panose="02020603050405020304" pitchFamily="18" charset="0"/>
+            </a:endParaRPr>
+          </a:p>
+          <a:p>
             <a:pPr marL="514350" marR="0" lvl="0" indent="-514350" rtl="0">
+              <a:lnSpc>
+                <a:spcPct val="150000"/>
+              </a:lnSpc>
               <a:spcBef>
                 <a:spcPts val="65"/>
               </a:spcBef>
@@ -5961,7 +5912,7 @@
                 <a:ea typeface="Calibri" panose="020F0502020204030204" pitchFamily="34" charset="0"/>
                 <a:cs typeface="Times New Roman" panose="02020603050405020304" pitchFamily="18" charset="0"/>
               </a:rPr>
-              <a:t>Project and Task Dashboard:</a:t>
+              <a:t>Customer Reviews:</a:t>
             </a:r>
             <a:r>
               <a:rPr lang="en-US" sz="2500" dirty="0">
@@ -5979,7 +5930,7 @@
                 <a:ea typeface="Calibri" panose="020F0502020204030204" pitchFamily="34" charset="0"/>
                 <a:cs typeface="Times New Roman" panose="02020603050405020304" pitchFamily="18" charset="0"/>
               </a:rPr>
-              <a:t>Centralized project dashboards for tracking progress, deadlines, payments, and key milestones.</a:t>
+              <a:t>A system for customers to leave feedback about builders and companies.</a:t>
             </a:r>
             <a:endParaRPr lang="en-US" sz="2500" b="0" dirty="0">
               <a:latin typeface="Times New Roman" panose="02020603050405020304" pitchFamily="18" charset="0"/>
@@ -5988,6 +5939,9 @@
           </a:p>
           <a:p>
             <a:pPr marL="514350" marR="0" lvl="0" indent="-514350" rtl="0">
+              <a:lnSpc>
+                <a:spcPct val="150000"/>
+              </a:lnSpc>
               <a:spcBef>
                 <a:spcPts val="65"/>
               </a:spcBef>
@@ -6006,7 +5960,7 @@
                 <a:ea typeface="Calibri" panose="020F0502020204030204" pitchFamily="34" charset="0"/>
                 <a:cs typeface="Times New Roman" panose="02020603050405020304" pitchFamily="18" charset="0"/>
               </a:rPr>
-              <a:t>Customer Reviews:</a:t>
+              <a:t>Notifications System:</a:t>
             </a:r>
             <a:r>
               <a:rPr lang="en-US" sz="2500" dirty="0">
@@ -6024,7 +5978,7 @@
                 <a:ea typeface="Calibri" panose="020F0502020204030204" pitchFamily="34" charset="0"/>
                 <a:cs typeface="Times New Roman" panose="02020603050405020304" pitchFamily="18" charset="0"/>
               </a:rPr>
-              <a:t>A system for customers to leave feedback about builders and companies.</a:t>
+              <a:t>Real-time alerts for project updates, task completions, and document approvals.</a:t>
             </a:r>
             <a:endParaRPr lang="en-US" sz="2500" b="0" dirty="0">
               <a:latin typeface="Times New Roman" panose="02020603050405020304" pitchFamily="18" charset="0"/>
@@ -6033,141 +5987,9 @@
           </a:p>
           <a:p>
             <a:pPr marL="514350" marR="0" lvl="0" indent="-514350" rtl="0">
-              <a:spcBef>
-                <a:spcPts val="65"/>
-              </a:spcBef>
-              <a:spcAft>
-                <a:spcPts val="0"/>
-              </a:spcAft>
-              <a:buAutoNum type="arabicPeriod" startAt="6"/>
-              <a:tabLst>
-                <a:tab pos="514350" algn="l"/>
-              </a:tabLst>
-            </a:pPr>
-            <a:r>
-              <a:rPr lang="en-US" sz="2500" b="1" dirty="0">
-                <a:effectLst/>
-                <a:latin typeface="Times New Roman" panose="02020603050405020304" pitchFamily="18" charset="0"/>
-                <a:ea typeface="Calibri" panose="020F0502020204030204" pitchFamily="34" charset="0"/>
-                <a:cs typeface="Times New Roman" panose="02020603050405020304" pitchFamily="18" charset="0"/>
-              </a:rPr>
-              <a:t>Notifications System:</a:t>
-            </a:r>
-            <a:r>
-              <a:rPr lang="en-US" sz="2500" dirty="0">
-                <a:effectLst/>
-                <a:latin typeface="Times New Roman" panose="02020603050405020304" pitchFamily="18" charset="0"/>
-                <a:ea typeface="Calibri" panose="020F0502020204030204" pitchFamily="34" charset="0"/>
-                <a:cs typeface="Times New Roman" panose="02020603050405020304" pitchFamily="18" charset="0"/>
-              </a:rPr>
-              <a:t> </a:t>
-            </a:r>
-            <a:r>
-              <a:rPr lang="en-US" sz="2500" b="0" dirty="0">
-                <a:effectLst/>
-                <a:latin typeface="Times New Roman" panose="02020603050405020304" pitchFamily="18" charset="0"/>
-                <a:ea typeface="Calibri" panose="020F0502020204030204" pitchFamily="34" charset="0"/>
-                <a:cs typeface="Times New Roman" panose="02020603050405020304" pitchFamily="18" charset="0"/>
-              </a:rPr>
-              <a:t>Real-time alerts for project updates, task completions, and document approvals.</a:t>
-            </a:r>
-            <a:endParaRPr lang="en-US" sz="2500" b="0" dirty="0">
-              <a:latin typeface="Times New Roman" panose="02020603050405020304" pitchFamily="18" charset="0"/>
-              <a:ea typeface="Calibri" panose="020F0502020204030204" pitchFamily="34" charset="0"/>
-            </a:endParaRPr>
-          </a:p>
-          <a:p>
-            <a:pPr marL="514350" marR="0" lvl="0" indent="-514350" rtl="0">
-              <a:spcBef>
-                <a:spcPts val="65"/>
-              </a:spcBef>
-              <a:spcAft>
-                <a:spcPts val="0"/>
-              </a:spcAft>
-              <a:buAutoNum type="arabicPeriod" startAt="6"/>
-              <a:tabLst>
-                <a:tab pos="514350" algn="l"/>
-              </a:tabLst>
-            </a:pPr>
-            <a:r>
-              <a:rPr lang="en-US" sz="2500" b="1" dirty="0">
-                <a:effectLst/>
-                <a:latin typeface="Times New Roman" panose="02020603050405020304" pitchFamily="18" charset="0"/>
-                <a:ea typeface="Calibri" panose="020F0502020204030204" pitchFamily="34" charset="0"/>
-                <a:cs typeface="Times New Roman" panose="02020603050405020304" pitchFamily="18" charset="0"/>
-              </a:rPr>
-              <a:t>Task Management:</a:t>
-            </a:r>
-            <a:r>
-              <a:rPr lang="en-US" sz="2500" dirty="0">
-                <a:effectLst/>
-                <a:latin typeface="Times New Roman" panose="02020603050405020304" pitchFamily="18" charset="0"/>
-                <a:ea typeface="Calibri" panose="020F0502020204030204" pitchFamily="34" charset="0"/>
-                <a:cs typeface="Times New Roman" panose="02020603050405020304" pitchFamily="18" charset="0"/>
-              </a:rPr>
-              <a:t> </a:t>
-            </a:r>
-            <a:r>
-              <a:rPr lang="en-US" sz="2500" b="0" dirty="0">
-                <a:effectLst/>
-                <a:latin typeface="Times New Roman" panose="02020603050405020304" pitchFamily="18" charset="0"/>
-                <a:ea typeface="Calibri" panose="020F0502020204030204" pitchFamily="34" charset="0"/>
-                <a:cs typeface="Times New Roman" panose="02020603050405020304" pitchFamily="18" charset="0"/>
-              </a:rPr>
-              <a:t>A task assignment system where customers can assign tasks to builders and track progress.</a:t>
-            </a:r>
-            <a:endParaRPr lang="en-US" sz="2500" b="0" dirty="0">
-              <a:latin typeface="Times New Roman" panose="02020603050405020304" pitchFamily="18" charset="0"/>
-              <a:ea typeface="Calibri" panose="020F0502020204030204" pitchFamily="34" charset="0"/>
-            </a:endParaRPr>
-          </a:p>
-          <a:p>
-            <a:pPr marL="514350" marR="0" lvl="0" indent="-514350" rtl="0">
-              <a:spcBef>
-                <a:spcPts val="65"/>
-              </a:spcBef>
-              <a:spcAft>
-                <a:spcPts val="0"/>
-              </a:spcAft>
-              <a:buAutoNum type="arabicPeriod" startAt="6"/>
-              <a:tabLst>
-                <a:tab pos="514350" algn="l"/>
-              </a:tabLst>
-            </a:pPr>
-            <a:r>
-              <a:rPr lang="en-US" sz="2500" b="1" dirty="0">
-                <a:effectLst/>
-                <a:latin typeface="Times New Roman" panose="02020603050405020304" pitchFamily="18" charset="0"/>
-                <a:ea typeface="Calibri" panose="020F0502020204030204" pitchFamily="34" charset="0"/>
-                <a:cs typeface="Times New Roman" panose="02020603050405020304" pitchFamily="18" charset="0"/>
-              </a:rPr>
-              <a:t>Mobile Integration (optional):</a:t>
-            </a:r>
-            <a:r>
-              <a:rPr lang="en-US" sz="2500" dirty="0">
-                <a:effectLst/>
-                <a:latin typeface="Times New Roman" panose="02020603050405020304" pitchFamily="18" charset="0"/>
-                <a:ea typeface="Calibri" panose="020F0502020204030204" pitchFamily="34" charset="0"/>
-                <a:cs typeface="Times New Roman" panose="02020603050405020304" pitchFamily="18" charset="0"/>
-              </a:rPr>
-              <a:t> </a:t>
-            </a:r>
-            <a:r>
-              <a:rPr lang="en-US" sz="2500" b="0" dirty="0">
-                <a:effectLst/>
-                <a:latin typeface="Times New Roman" panose="02020603050405020304" pitchFamily="18" charset="0"/>
-                <a:ea typeface="Calibri" panose="020F0502020204030204" pitchFamily="34" charset="0"/>
-                <a:cs typeface="Times New Roman" panose="02020603050405020304" pitchFamily="18" charset="0"/>
-              </a:rPr>
-              <a:t>A mobile-friendly platform allowing access to project updates on-the-go.</a:t>
-            </a:r>
-            <a:endParaRPr lang="en-US" sz="2500" b="0" dirty="0">
-              <a:latin typeface="Times New Roman" panose="02020603050405020304" pitchFamily="18" charset="0"/>
-              <a:ea typeface="Calibri" panose="020F0502020204030204" pitchFamily="34" charset="0"/>
-            </a:endParaRPr>
-          </a:p>
-          <a:p>
-            <a:pPr marL="514350" marR="0" lvl="0" indent="-514350" rtl="0">
+              <a:lnSpc>
+                <a:spcPct val="150000"/>
+              </a:lnSpc>
               <a:spcBef>
                 <a:spcPts val="65"/>
               </a:spcBef>
@@ -10617,8 +10439,7 @@
               </a:spcAft>
               <a:buClrTx/>
               <a:buSzTx/>
-              <a:buFontTx/>
-              <a:buChar char="•"/>
+              <a:buNone/>
               <a:tabLst/>
             </a:pPr>
             <a:r>
@@ -10963,8 +10784,8 @@
         </p:nvSpPr>
         <p:spPr bwMode="auto">
           <a:xfrm>
-            <a:off x="76200" y="1577134"/>
-            <a:ext cx="8839199" cy="4770537"/>
+            <a:off x="33529" y="914400"/>
+            <a:ext cx="9143999" cy="5698932"/>
           </a:xfrm>
           <a:prstGeom prst="rect">
             <a:avLst/>
@@ -11042,7 +10863,7 @@
           <a:p>
             <a:pPr marL="0" marR="0" lvl="0" indent="0" algn="l" defTabSz="914400" rtl="0" eaLnBrk="0" fontAlgn="base" latinLnBrk="0" hangingPunct="0">
               <a:lnSpc>
-                <a:spcPct val="100000"/>
+                <a:spcPct val="150000"/>
               </a:lnSpc>
               <a:spcBef>
                 <a:spcPct val="0"/>
@@ -11130,7 +10951,7 @@
           <a:p>
             <a:pPr marL="0" marR="0" lvl="0" indent="0" algn="l" defTabSz="914400" rtl="0" eaLnBrk="0" fontAlgn="base" latinLnBrk="0" hangingPunct="0">
               <a:lnSpc>
-                <a:spcPct val="100000"/>
+                <a:spcPct val="150000"/>
               </a:lnSpc>
               <a:spcBef>
                 <a:spcPct val="0"/>
@@ -11218,7 +11039,7 @@
           <a:p>
             <a:pPr marL="0" marR="0" lvl="0" indent="0" algn="l" defTabSz="914400" rtl="0" eaLnBrk="0" fontAlgn="base" latinLnBrk="0" hangingPunct="0">
               <a:lnSpc>
-                <a:spcPct val="100000"/>
+                <a:spcPct val="150000"/>
               </a:lnSpc>
               <a:spcBef>
                 <a:spcPct val="0"/>
@@ -11306,7 +11127,7 @@
           <a:p>
             <a:pPr marL="0" marR="0" lvl="0" indent="0" algn="l" defTabSz="914400" rtl="0" eaLnBrk="0" fontAlgn="base" latinLnBrk="0" hangingPunct="0">
               <a:lnSpc>
-                <a:spcPct val="100000"/>
+                <a:spcPct val="150000"/>
               </a:lnSpc>
               <a:spcBef>
                 <a:spcPct val="0"/>
@@ -11366,7 +11187,7 @@
           <a:p>
             <a:pPr marL="0" marR="0" lvl="0" indent="0" algn="l" defTabSz="914400" rtl="0" eaLnBrk="0" fontAlgn="base" latinLnBrk="0" hangingPunct="0">
               <a:lnSpc>
-                <a:spcPct val="100000"/>
+                <a:spcPct val="150000"/>
               </a:lnSpc>
               <a:spcBef>
                 <a:spcPct val="0"/>
@@ -11381,6 +11202,13 @@
               <a:tabLst/>
             </a:pPr>
             <a:r>
+              <a:rPr lang="en-US" altLang="en-US" sz="2600" b="0" dirty="0">
+                <a:latin typeface="Times New Roman" panose="02020603050405020304" pitchFamily="18" charset="0"/>
+                <a:cs typeface="Times New Roman" panose="02020603050405020304" pitchFamily="18" charset="0"/>
+              </a:rPr>
+              <a:t>Our Software</a:t>
+            </a:r>
+            <a:r>
               <a:rPr kumimoji="0" lang="en-US" altLang="en-US" sz="2600" b="0" i="0" u="none" strike="noStrike" cap="none" normalizeH="0" baseline="0" dirty="0">
                 <a:ln>
                   <a:noFill/>
@@ -11392,124 +11220,7 @@
                 <a:latin typeface="Times New Roman" panose="02020603050405020304" pitchFamily="18" charset="0"/>
                 <a:cs typeface="Times New Roman" panose="02020603050405020304" pitchFamily="18" charset="0"/>
               </a:rPr>
-              <a:t>Our software will introduce </a:t>
-            </a:r>
-            <a:r>
-              <a:rPr kumimoji="0" lang="en-US" altLang="en-US" sz="2600" b="1" i="0" u="none" strike="noStrike" cap="none" normalizeH="0" baseline="0" dirty="0">
-                <a:ln>
-                  <a:noFill/>
-                </a:ln>
-                <a:solidFill>
-                  <a:schemeClr val="tx1"/>
-                </a:solidFill>
-                <a:effectLst/>
-                <a:latin typeface="Times New Roman" panose="02020603050405020304" pitchFamily="18" charset="0"/>
-                <a:cs typeface="Times New Roman" panose="02020603050405020304" pitchFamily="18" charset="0"/>
-              </a:rPr>
-              <a:t>AI-powered documentation</a:t>
-            </a:r>
-            <a:endParaRPr kumimoji="0" lang="en-US" altLang="en-US" sz="2600" b="0" i="0" u="none" strike="noStrike" cap="none" normalizeH="0" baseline="0" dirty="0">
-              <a:ln>
-                <a:noFill/>
-              </a:ln>
-              <a:solidFill>
-                <a:schemeClr val="tx1"/>
-              </a:solidFill>
-              <a:effectLst/>
-              <a:latin typeface="Times New Roman" panose="02020603050405020304" pitchFamily="18" charset="0"/>
-              <a:cs typeface="Times New Roman" panose="02020603050405020304" pitchFamily="18" charset="0"/>
-            </a:endParaRPr>
-          </a:p>
-          <a:p>
-            <a:pPr marL="0" marR="0" lvl="0" indent="0" algn="l" defTabSz="914400" rtl="0" eaLnBrk="0" fontAlgn="base" latinLnBrk="0" hangingPunct="0">
-              <a:lnSpc>
-                <a:spcPct val="100000"/>
-              </a:lnSpc>
-              <a:spcBef>
-                <a:spcPct val="0"/>
-              </a:spcBef>
-              <a:spcAft>
-                <a:spcPct val="0"/>
-              </a:spcAft>
-              <a:buClrTx/>
-              <a:buSzTx/>
-              <a:buFontTx/>
-              <a:buChar char="•"/>
-              <a:tabLst/>
-            </a:pPr>
-            <a:r>
-              <a:rPr kumimoji="0" lang="en-US" altLang="en-US" sz="2600" b="0" i="0" u="none" strike="noStrike" cap="none" normalizeH="0" baseline="0" dirty="0">
-                <a:ln>
-                  <a:noFill/>
-                </a:ln>
-                <a:solidFill>
-                  <a:schemeClr val="tx1"/>
-                </a:solidFill>
-                <a:effectLst/>
-                <a:latin typeface="Times New Roman" panose="02020603050405020304" pitchFamily="18" charset="0"/>
-                <a:cs typeface="Times New Roman" panose="02020603050405020304" pitchFamily="18" charset="0"/>
-              </a:rPr>
-              <a:t>and </a:t>
-            </a:r>
-            <a:r>
-              <a:rPr kumimoji="0" lang="en-US" altLang="en-US" sz="2600" b="1" i="0" u="none" strike="noStrike" cap="none" normalizeH="0" baseline="0" dirty="0">
-                <a:ln>
-                  <a:noFill/>
-                </a:ln>
-                <a:solidFill>
-                  <a:schemeClr val="tx1"/>
-                </a:solidFill>
-                <a:effectLst/>
-                <a:latin typeface="Times New Roman" panose="02020603050405020304" pitchFamily="18" charset="0"/>
-                <a:cs typeface="Times New Roman" panose="02020603050405020304" pitchFamily="18" charset="0"/>
-              </a:rPr>
-              <a:t>customizable project tracking</a:t>
-            </a:r>
-            <a:r>
-              <a:rPr kumimoji="0" lang="en-US" altLang="en-US" sz="2600" b="0" i="0" u="none" strike="noStrike" cap="none" normalizeH="0" baseline="0" dirty="0">
-                <a:ln>
-                  <a:noFill/>
-                </a:ln>
-                <a:solidFill>
-                  <a:schemeClr val="tx1"/>
-                </a:solidFill>
-                <a:effectLst/>
-                <a:latin typeface="Times New Roman" panose="02020603050405020304" pitchFamily="18" charset="0"/>
-                <a:cs typeface="Times New Roman" panose="02020603050405020304" pitchFamily="18" charset="0"/>
-              </a:rPr>
-              <a:t>.</a:t>
-            </a:r>
-          </a:p>
-          <a:p>
-            <a:pPr marL="0" marR="0" lvl="0" indent="0" algn="l" defTabSz="914400" rtl="0" eaLnBrk="0" fontAlgn="base" latinLnBrk="0" hangingPunct="0">
-              <a:lnSpc>
-                <a:spcPct val="100000"/>
-              </a:lnSpc>
-              <a:spcBef>
-                <a:spcPct val="0"/>
-              </a:spcBef>
-              <a:spcAft>
-                <a:spcPct val="0"/>
-              </a:spcAft>
-              <a:buClrTx/>
-              <a:buSzTx/>
-              <a:buFontTx/>
-              <a:buChar char="•"/>
-              <a:tabLst/>
-            </a:pPr>
-            <a:r>
-              <a:rPr kumimoji="0" lang="en-US" altLang="en-US" sz="2600" b="0" i="0" u="none" strike="noStrike" cap="none" normalizeH="0" baseline="0" dirty="0">
-                <a:ln>
-                  <a:noFill/>
-                </a:ln>
-                <a:solidFill>
-                  <a:schemeClr val="tx1"/>
-                </a:solidFill>
-                <a:effectLst/>
-                <a:latin typeface="Times New Roman" panose="02020603050405020304" pitchFamily="18" charset="0"/>
-                <a:cs typeface="Times New Roman" panose="02020603050405020304" pitchFamily="18" charset="0"/>
-              </a:rPr>
-              <a:t>It provides a </a:t>
+              <a:t> provides a </a:t>
             </a:r>
             <a:r>
               <a:rPr kumimoji="0" lang="en-US" altLang="en-US" sz="2600" b="1" i="0" u="none" strike="noStrike" cap="none" normalizeH="0" baseline="0" dirty="0">
@@ -11653,7 +11364,7 @@
             <p:ph idx="1"/>
             <p:extLst>
               <p:ext uri="{D42A27DB-BD31-4B8C-83A1-F6EECF244321}">
-                <p14:modId xmlns:p14="http://schemas.microsoft.com/office/powerpoint/2010/main" val="319355181"/>
+                <p14:modId xmlns:p14="http://schemas.microsoft.com/office/powerpoint/2010/main" val="3130735662"/>
               </p:ext>
             </p:extLst>
           </p:nvPr>
@@ -11793,12 +11504,12 @@
                         </a:spcAft>
                       </a:pPr>
                       <a:r>
-                        <a:rPr lang="en-US" sz="2000">
+                        <a:rPr lang="en-US" sz="2000" dirty="0">
                           <a:effectLst/>
                         </a:rPr>
-                        <a:t>AI-Powered Documentation: Automatically generate real-time documentation of decisions and progress.</a:t>
+                        <a:t>Automatically generate real-time documentation of decisions and progress.</a:t>
                       </a:r>
-                      <a:endParaRPr lang="en-US" sz="1400">
+                      <a:endParaRPr lang="en-US" sz="1400" dirty="0">
                         <a:effectLst/>
                         <a:latin typeface="Times New Roman" panose="02020603050405020304" pitchFamily="18" charset="0"/>
                         <a:ea typeface="Times New Roman" panose="02020603050405020304" pitchFamily="18" charset="0"/>
@@ -12031,14 +11742,14 @@
             <p:ph idx="1"/>
             <p:extLst>
               <p:ext uri="{D42A27DB-BD31-4B8C-83A1-F6EECF244321}">
-                <p14:modId xmlns:p14="http://schemas.microsoft.com/office/powerpoint/2010/main" val="3887989615"/>
+                <p14:modId xmlns:p14="http://schemas.microsoft.com/office/powerpoint/2010/main" val="4195359306"/>
               </p:ext>
             </p:extLst>
           </p:nvPr>
         </p:nvGraphicFramePr>
         <p:xfrm>
           <a:off x="304800" y="1447800"/>
-          <a:ext cx="8534400" cy="4693920"/>
+          <a:ext cx="8534400" cy="4648200"/>
         </p:xfrm>
         <a:graphic>
           <a:graphicData uri="http://schemas.openxmlformats.org/drawingml/2006/table">
@@ -12062,7 +11773,7 @@
                   </a:extLst>
                 </a:gridCol>
               </a:tblGrid>
-              <a:tr h="975360">
+              <a:tr h="2582333">
                 <a:tc>
                   <a:txBody>
                     <a:bodyPr/>
@@ -12077,97 +11788,10 @@
                         </a:spcAft>
                       </a:pPr>
                       <a:r>
-                        <a:rPr lang="en-US" sz="2200">
+                        <a:rPr lang="en-US" sz="2200" dirty="0">
                           <a:effectLst/>
                         </a:rPr>
                         <a:t>Task Scheduling: Allocate tasks and manage schedules.</a:t>
-                      </a:r>
-                      <a:endParaRPr lang="en-US" sz="2200">
-                        <a:effectLst/>
-                        <a:latin typeface="Times New Roman" panose="02020603050405020304" pitchFamily="18" charset="0"/>
-                        <a:ea typeface="Times New Roman" panose="02020603050405020304" pitchFamily="18" charset="0"/>
-                        <a:cs typeface="Arial" panose="020B0604020202020204" pitchFamily="34" charset="0"/>
-                      </a:endParaRPr>
-                    </a:p>
-                  </a:txBody>
-                  <a:tcPr marL="68580" marR="68580" marT="0" marB="0" anchor="ctr"/>
-                </a:tc>
-                <a:tc>
-                  <a:txBody>
-                    <a:bodyPr/>
-                    <a:lstStyle/>
-                    <a:p>
-                      <a:pPr marL="0" marR="0" algn="l">
-                        <a:spcBef>
-                          <a:spcPts val="65"/>
-                        </a:spcBef>
-                        <a:spcAft>
-                          <a:spcPts val="0"/>
-                        </a:spcAft>
-                      </a:pPr>
-                      <a:r>
-                        <a:rPr lang="en-US" sz="2200" dirty="0">
-                          <a:effectLst/>
-                        </a:rPr>
-                        <a:t>Enhanced Collaboration Tools: Real-time communication and decision documentation </a:t>
-                      </a:r>
-                      <a:r>
-                        <a:rPr lang="en-US" sz="2000" dirty="0"/>
-                        <a:t>for</a:t>
-                      </a:r>
-                      <a:r>
-                        <a:rPr lang="en-US" sz="2200" dirty="0">
-                          <a:effectLst/>
-                        </a:rPr>
-                        <a:t> all stakeholders.</a:t>
-                      </a:r>
-                      <a:endParaRPr lang="en-US" sz="2200" dirty="0">
-                        <a:effectLst/>
-                        <a:latin typeface="Times New Roman" panose="02020603050405020304" pitchFamily="18" charset="0"/>
-                        <a:ea typeface="Times New Roman" panose="02020603050405020304" pitchFamily="18" charset="0"/>
-                        <a:cs typeface="Arial" panose="020B0604020202020204" pitchFamily="34" charset="0"/>
-                      </a:endParaRPr>
-                    </a:p>
-                  </a:txBody>
-                  <a:tcPr marL="68580" marR="68580" marT="0" marB="0" anchor="ctr"/>
-                </a:tc>
-                <a:extLst>
-                  <a:ext uri="{0D108BD9-81ED-4DB2-BD59-A6C34878D82A}">
-                    <a16:rowId xmlns:a16="http://schemas.microsoft.com/office/drawing/2014/main" val="90772348"/>
-                  </a:ext>
-                </a:extLst>
-              </a:tr>
-              <a:tr h="975360">
-                <a:tc>
-                  <a:txBody>
-                    <a:bodyPr/>
-                    <a:lstStyle/>
-                    <a:p>
-                      <a:pPr marL="0" marR="0" algn="l">
-                        <a:spcBef>
-                          <a:spcPts val="65"/>
-                        </a:spcBef>
-                        <a:spcAft>
-                          <a:spcPts val="0"/>
-                        </a:spcAft>
-                      </a:pPr>
-                      <a:r>
-                        <a:rPr lang="en-US" sz="2200" dirty="0">
-                          <a:effectLst/>
-                        </a:rPr>
-                        <a:t>Subcontractor Management: Manage </a:t>
-                      </a:r>
-                      <a:r>
-                        <a:rPr lang="en-US" sz="2200" dirty="0" err="1">
-                          <a:effectLst/>
-                        </a:rPr>
-                        <a:t>tradies</a:t>
-                      </a:r>
-                      <a:r>
-                        <a:rPr lang="en-US" sz="2200" dirty="0">
-                          <a:effectLst/>
-                        </a:rPr>
-                        <a:t> and subcontractors.</a:t>
                       </a:r>
                       <a:endParaRPr lang="en-US" sz="2200" dirty="0">
                         <a:effectLst/>
@@ -12196,7 +11820,17 @@
                         <a:rPr lang="en-US" sz="2200" dirty="0">
                           <a:effectLst/>
                         </a:rPr>
-                        <a:t>Direct </a:t>
+                        <a:t>Enhanced Collaboration Tools: Real-time communication and decision documentation </a:t>
+                      </a:r>
+                      <a:r>
+                        <a:rPr lang="en-US" sz="2000" dirty="0"/>
+                        <a:t>for</a:t>
+                      </a:r>
+                      <a:r>
+                        <a:rPr lang="en-US" sz="2200" dirty="0">
+                          <a:effectLst/>
+                        </a:rPr>
+                        <a:t> all stakeholders (Direct </a:t>
                       </a:r>
                       <a:r>
                         <a:rPr lang="en-US" sz="2200" dirty="0" err="1">
@@ -12208,7 +11842,7 @@
                         <a:rPr lang="en-US" sz="2200" dirty="0">
                           <a:effectLst/>
                         </a:rPr>
-                        <a:t>-Builder-Customer Channel: A direct, real-time communication system for seamless collaboration.</a:t>
+                        <a:t>-Builder-Customer Channel)</a:t>
                       </a:r>
                       <a:endParaRPr lang="en-US" sz="2200" dirty="0">
                         <a:effectLst/>
@@ -12222,11 +11856,11 @@
                 </a:tc>
                 <a:extLst>
                   <a:ext uri="{0D108BD9-81ED-4DB2-BD59-A6C34878D82A}">
-                    <a16:rowId xmlns:a16="http://schemas.microsoft.com/office/drawing/2014/main" val="617812042"/>
+                    <a16:rowId xmlns:a16="http://schemas.microsoft.com/office/drawing/2014/main" val="90772348"/>
                   </a:ext>
                 </a:extLst>
               </a:tr>
-              <a:tr h="975360">
+              <a:tr h="2065867">
                 <a:tc>
                   <a:txBody>
                     <a:bodyPr/>
@@ -12270,75 +11904,10 @@
                         </a:spcAft>
                       </a:pPr>
                       <a:r>
-                        <a:rPr lang="en-US" sz="2200">
+                        <a:rPr lang="en-US" sz="2200" dirty="0">
                           <a:effectLst/>
                         </a:rPr>
                         <a:t>Interactive Progress Reports: Real-time, interactive reports with updates, photos, and documents.</a:t>
-                      </a:r>
-                      <a:endParaRPr lang="en-US" sz="2200">
-                        <a:effectLst/>
-                        <a:latin typeface="Times New Roman" panose="02020603050405020304" pitchFamily="18" charset="0"/>
-                        <a:ea typeface="Times New Roman" panose="02020603050405020304" pitchFamily="18" charset="0"/>
-                        <a:cs typeface="Arial" panose="020B0604020202020204" pitchFamily="34" charset="0"/>
-                      </a:endParaRPr>
-                    </a:p>
-                  </a:txBody>
-                  <a:tcPr marL="68580" marR="68580" marT="0" marB="0" anchor="ctr"/>
-                </a:tc>
-                <a:extLst>
-                  <a:ext uri="{0D108BD9-81ED-4DB2-BD59-A6C34878D82A}">
-                    <a16:rowId xmlns:a16="http://schemas.microsoft.com/office/drawing/2014/main" val="142014423"/>
-                  </a:ext>
-                </a:extLst>
-              </a:tr>
-              <a:tr h="975360">
-                <a:tc>
-                  <a:txBody>
-                    <a:bodyPr/>
-                    <a:lstStyle/>
-                    <a:p>
-                      <a:pPr marL="0" marR="0" algn="l">
-                        <a:spcBef>
-                          <a:spcPts val="65"/>
-                        </a:spcBef>
-                        <a:spcAft>
-                          <a:spcPts val="0"/>
-                        </a:spcAft>
-                      </a:pPr>
-                      <a:r>
-                        <a:rPr lang="en-US" sz="2200">
-                          <a:effectLst/>
-                        </a:rPr>
-                        <a:t>Budget Tracking: Monitor project expenses and stay within budget.</a:t>
-                      </a:r>
-                      <a:endParaRPr lang="en-US" sz="2200">
-                        <a:effectLst/>
-                        <a:latin typeface="Times New Roman" panose="02020603050405020304" pitchFamily="18" charset="0"/>
-                        <a:ea typeface="Times New Roman" panose="02020603050405020304" pitchFamily="18" charset="0"/>
-                        <a:cs typeface="Arial" panose="020B0604020202020204" pitchFamily="34" charset="0"/>
-                      </a:endParaRPr>
-                    </a:p>
-                  </a:txBody>
-                  <a:tcPr marL="68580" marR="68580" marT="0" marB="0" anchor="ctr"/>
-                </a:tc>
-                <a:tc>
-                  <a:txBody>
-                    <a:bodyPr/>
-                    <a:lstStyle/>
-                    <a:p>
-                      <a:pPr marL="0" marR="0" algn="l">
-                        <a:spcBef>
-                          <a:spcPts val="65"/>
-                        </a:spcBef>
-                        <a:spcAft>
-                          <a:spcPts val="0"/>
-                        </a:spcAft>
-                      </a:pPr>
-                      <a:r>
-                        <a:rPr lang="en-US" sz="2200" dirty="0">
-                          <a:effectLst/>
-                        </a:rPr>
-                        <a:t>Customizable Project Tracking: Tailor project tracking dashboards to suit specific client needs.</a:t>
                       </a:r>
                       <a:endParaRPr lang="en-US" sz="2200" dirty="0">
                         <a:effectLst/>
@@ -12352,7 +11921,7 @@
                 </a:tc>
                 <a:extLst>
                   <a:ext uri="{0D108BD9-81ED-4DB2-BD59-A6C34878D82A}">
-                    <a16:rowId xmlns:a16="http://schemas.microsoft.com/office/drawing/2014/main" val="2594563478"/>
+                    <a16:rowId xmlns:a16="http://schemas.microsoft.com/office/drawing/2014/main" val="142014423"/>
                   </a:ext>
                 </a:extLst>
               </a:tr>
@@ -12952,8 +12521,8 @@
         </p:nvSpPr>
         <p:spPr bwMode="auto">
           <a:xfrm>
-            <a:off x="228600" y="1335613"/>
-            <a:ext cx="8446576" cy="4832092"/>
+            <a:off x="228600" y="1504890"/>
+            <a:ext cx="8446576" cy="4493538"/>
           </a:xfrm>
           <a:prstGeom prst="rect">
             <a:avLst/>
@@ -13169,7 +12738,7 @@
                 <a:latin typeface="Times New Roman" panose="02020603050405020304" pitchFamily="18" charset="0"/>
                 <a:cs typeface="Times New Roman" panose="02020603050405020304" pitchFamily="18" charset="0"/>
               </a:rPr>
-              <a:t> AI-Powered Documentation</a:t>
+              <a:t> Documentation</a:t>
             </a:r>
             <a:r>
               <a:rPr kumimoji="0" lang="en-US" altLang="en-US" sz="2200" b="0" i="0" u="none" strike="noStrike" cap="none" normalizeH="0" baseline="0" dirty="0">

</xml_diff>

<commit_message>
feat: add gantt chart and update fyp ppt
</commit_message>
<xml_diff>
--- a/My 7th Semester/FYP/FYP PPT.pptx
+++ b/My 7th Semester/FYP/FYP PPT.pptx
@@ -5,7 +5,7 @@
     <p:sldMasterId id="2147483648" r:id="rId1"/>
   </p:sldMasterIdLst>
   <p:notesMasterIdLst>
-    <p:notesMasterId r:id="rId21"/>
+    <p:notesMasterId r:id="rId20"/>
   </p:notesMasterIdLst>
   <p:sldIdLst>
     <p:sldId id="256" r:id="rId2"/>
@@ -23,10 +23,9 @@
     <p:sldId id="260" r:id="rId14"/>
     <p:sldId id="272" r:id="rId15"/>
     <p:sldId id="263" r:id="rId16"/>
-    <p:sldId id="273" r:id="rId17"/>
-    <p:sldId id="274" r:id="rId18"/>
-    <p:sldId id="275" r:id="rId19"/>
-    <p:sldId id="261" r:id="rId20"/>
+    <p:sldId id="275" r:id="rId17"/>
+    <p:sldId id="261" r:id="rId18"/>
+    <p:sldId id="276" r:id="rId19"/>
   </p:sldIdLst>
   <p:sldSz cx="9144000" cy="6858000" type="screen4x3"/>
   <p:notesSz cx="6858000" cy="9144000"/>
@@ -226,7 +225,7 @@
           <a:p>
             <a:fld id="{209AD1F1-416F-48D4-ADF3-EEF37A1896ED}" type="datetimeFigureOut">
               <a:rPr lang="en-US" smtClean="0"/>
-              <a:t>10/4/2024</a:t>
+              <a:t>10/8/2024</a:t>
             </a:fld>
             <a:endParaRPr lang="en-US"/>
           </a:p>
@@ -933,7 +932,7 @@
             <a:fld id="{1D8BD707-D9CF-40AE-B4C6-C98DA3205C09}" type="datetimeFigureOut">
               <a:rPr lang="en-US" smtClean="0"/>
               <a:pPr/>
-              <a:t>10/4/2024</a:t>
+              <a:t>10/8/2024</a:t>
             </a:fld>
             <a:endParaRPr lang="en-US"/>
           </a:p>
@@ -1132,7 +1131,7 @@
             <a:fld id="{1D8BD707-D9CF-40AE-B4C6-C98DA3205C09}" type="datetimeFigureOut">
               <a:rPr lang="en-US" smtClean="0"/>
               <a:pPr/>
-              <a:t>10/4/2024</a:t>
+              <a:t>10/8/2024</a:t>
             </a:fld>
             <a:endParaRPr lang="en-US"/>
           </a:p>
@@ -1366,7 +1365,7 @@
             <a:fld id="{1D8BD707-D9CF-40AE-B4C6-C98DA3205C09}" type="datetimeFigureOut">
               <a:rPr lang="en-US" smtClean="0"/>
               <a:pPr/>
-              <a:t>10/4/2024</a:t>
+              <a:t>10/8/2024</a:t>
             </a:fld>
             <a:endParaRPr lang="en-US"/>
           </a:p>
@@ -1646,7 +1645,7 @@
             <a:fld id="{1D8BD707-D9CF-40AE-B4C6-C98DA3205C09}" type="datetimeFigureOut">
               <a:rPr lang="en-US" smtClean="0"/>
               <a:pPr/>
-              <a:t>10/4/2024</a:t>
+              <a:t>10/8/2024</a:t>
             </a:fld>
             <a:endParaRPr lang="en-US"/>
           </a:p>
@@ -1952,7 +1951,7 @@
             <a:fld id="{1D8BD707-D9CF-40AE-B4C6-C98DA3205C09}" type="datetimeFigureOut">
               <a:rPr lang="en-US" smtClean="0"/>
               <a:pPr/>
-              <a:t>10/4/2024</a:t>
+              <a:t>10/8/2024</a:t>
             </a:fld>
             <a:endParaRPr lang="en-US"/>
           </a:p>
@@ -2438,7 +2437,7 @@
             <a:fld id="{1D8BD707-D9CF-40AE-B4C6-C98DA3205C09}" type="datetimeFigureOut">
               <a:rPr lang="en-US" smtClean="0"/>
               <a:pPr/>
-              <a:t>10/4/2024</a:t>
+              <a:t>10/8/2024</a:t>
             </a:fld>
             <a:endParaRPr lang="en-US"/>
           </a:p>
@@ -2590,7 +2589,7 @@
             <a:fld id="{1D8BD707-D9CF-40AE-B4C6-C98DA3205C09}" type="datetimeFigureOut">
               <a:rPr lang="en-US" smtClean="0"/>
               <a:pPr/>
-              <a:t>10/4/2024</a:t>
+              <a:t>10/8/2024</a:t>
             </a:fld>
             <a:endParaRPr lang="en-US"/>
           </a:p>
@@ -2706,7 +2705,7 @@
             <a:fld id="{1D8BD707-D9CF-40AE-B4C6-C98DA3205C09}" type="datetimeFigureOut">
               <a:rPr lang="en-US" smtClean="0"/>
               <a:pPr/>
-              <a:t>10/4/2024</a:t>
+              <a:t>10/8/2024</a:t>
             </a:fld>
             <a:endParaRPr lang="en-US"/>
           </a:p>
@@ -3002,7 +3001,7 @@
             <a:fld id="{1D8BD707-D9CF-40AE-B4C6-C98DA3205C09}" type="datetimeFigureOut">
               <a:rPr lang="en-US" smtClean="0"/>
               <a:pPr/>
-              <a:t>10/4/2024</a:t>
+              <a:t>10/8/2024</a:t>
             </a:fld>
             <a:endParaRPr lang="en-US"/>
           </a:p>
@@ -3275,7 +3274,7 @@
             <a:fld id="{1D8BD707-D9CF-40AE-B4C6-C98DA3205C09}" type="datetimeFigureOut">
               <a:rPr lang="en-US" smtClean="0"/>
               <a:pPr/>
-              <a:t>10/4/2024</a:t>
+              <a:t>10/8/2024</a:t>
             </a:fld>
             <a:endParaRPr lang="en-US"/>
           </a:p>
@@ -4176,13 +4175,13 @@
           <p:nvPr>
             <p:extLst>
               <p:ext uri="{D42A27DB-BD31-4B8C-83A1-F6EECF244321}">
-                <p14:modId xmlns:p14="http://schemas.microsoft.com/office/powerpoint/2010/main" val="2162668590"/>
+                <p14:modId xmlns:p14="http://schemas.microsoft.com/office/powerpoint/2010/main" val="3392234301"/>
               </p:ext>
             </p:extLst>
           </p:nvPr>
         </p:nvGraphicFramePr>
         <p:xfrm>
-          <a:off x="838200" y="3810000"/>
+          <a:off x="762000" y="4267200"/>
           <a:ext cx="7620000" cy="1449705"/>
         </p:xfrm>
         <a:graphic>
@@ -4575,6 +4574,46 @@
           </a:graphicData>
         </a:graphic>
       </p:graphicFrame>
+      <p:sp>
+        <p:nvSpPr>
+          <p:cNvPr id="4" name="TextBox 3">
+            <a:extLst>
+              <a:ext uri="{FF2B5EF4-FFF2-40B4-BE49-F238E27FC236}">
+                <a16:creationId xmlns:a16="http://schemas.microsoft.com/office/drawing/2014/main" id="{28F062F7-C14D-5C7F-12AC-030B877009D6}"/>
+              </a:ext>
+            </a:extLst>
+          </p:cNvPr>
+          <p:cNvSpPr txBox="1"/>
+          <p:nvPr/>
+        </p:nvSpPr>
+        <p:spPr>
+          <a:xfrm>
+            <a:off x="2286000" y="3124200"/>
+            <a:ext cx="4953000" cy="461665"/>
+          </a:xfrm>
+          <a:prstGeom prst="rect">
+            <a:avLst/>
+          </a:prstGeom>
+          <a:noFill/>
+        </p:spPr>
+        <p:txBody>
+          <a:bodyPr wrap="square">
+            <a:spAutoFit/>
+          </a:bodyPr>
+          <a:lstStyle/>
+          <a:p>
+            <a:r>
+              <a:rPr lang="en-US" sz="1600" dirty="0"/>
+              <a:t> </a:t>
+            </a:r>
+            <a:r>
+              <a:rPr lang="en-US" sz="2400" b="1" dirty="0"/>
+              <a:t>Client Name: Muhammad Aamir </a:t>
+            </a:r>
+            <a:endParaRPr lang="en-US" b="1" dirty="0"/>
+          </a:p>
+        </p:txBody>
+      </p:sp>
     </p:spTree>
     <p:extLst>
       <p:ext uri="{BB962C8B-B14F-4D97-AF65-F5344CB8AC3E}">
@@ -6213,556 +6252,40 @@
           </a:p>
         </p:txBody>
       </p:sp>
-      <p:sp>
-        <p:nvSpPr>
-          <p:cNvPr id="3" name="Content Placeholder 2"/>
-          <p:cNvSpPr>
-            <a:spLocks noGrp="1"/>
-          </p:cNvSpPr>
+      <p:pic>
+        <p:nvPicPr>
+          <p:cNvPr id="5" name="Content Placeholder 4" descr="A diagram of a software&#10;&#10;Description automatically generated">
+            <a:extLst>
+              <a:ext uri="{FF2B5EF4-FFF2-40B4-BE49-F238E27FC236}">
+                <a16:creationId xmlns:a16="http://schemas.microsoft.com/office/drawing/2014/main" id="{8020CB83-9BBC-F631-18C4-0427C54C88B5}"/>
+              </a:ext>
+            </a:extLst>
+          </p:cNvPr>
+          <p:cNvPicPr>
+            <a:picLocks noGrp="1" noChangeAspect="1"/>
+          </p:cNvPicPr>
           <p:nvPr>
             <p:ph idx="1"/>
           </p:nvPr>
-        </p:nvSpPr>
-        <p:spPr/>
-        <p:txBody>
-          <a:bodyPr>
-            <a:normAutofit fontScale="92500" lnSpcReduction="10000"/>
-          </a:bodyPr>
-          <a:lstStyle/>
-          <a:p>
-            <a:pPr marL="342900" marR="0" lvl="0" indent="-342900" rtl="0">
-              <a:tabLst>
-                <a:tab pos="457200" algn="l"/>
-              </a:tabLst>
-            </a:pPr>
-            <a:r>
-              <a:rPr lang="en-US" sz="2400" b="1" dirty="0">
-                <a:effectLst/>
-                <a:latin typeface="Times New Roman" panose="02020603050405020304" pitchFamily="18" charset="0"/>
-                <a:ea typeface="Times New Roman" panose="02020603050405020304" pitchFamily="18" charset="0"/>
-              </a:rPr>
-              <a:t>Project Initialization</a:t>
-            </a:r>
-            <a:endParaRPr lang="en-US" sz="2000" dirty="0">
-              <a:effectLst/>
-              <a:latin typeface="Times New Roman" panose="02020603050405020304" pitchFamily="18" charset="0"/>
-              <a:ea typeface="Times New Roman" panose="02020603050405020304" pitchFamily="18" charset="0"/>
-            </a:endParaRPr>
-          </a:p>
-          <a:p>
-            <a:pPr marL="742950" marR="0" lvl="1" indent="-285750">
-              <a:spcBef>
-                <a:spcPts val="0"/>
-              </a:spcBef>
-              <a:spcAft>
-                <a:spcPts val="0"/>
-              </a:spcAft>
-              <a:buSzPts val="1000"/>
-              <a:buFont typeface="Courier New" panose="02070309020205020404" pitchFamily="49" charset="0"/>
-              <a:buChar char="o"/>
-              <a:tabLst>
-                <a:tab pos="914400" algn="l"/>
-              </a:tabLst>
-            </a:pPr>
-            <a:r>
-              <a:rPr lang="en-US" sz="2000" dirty="0">
-                <a:effectLst/>
-                <a:latin typeface="Times New Roman" panose="02020603050405020304" pitchFamily="18" charset="0"/>
-                <a:ea typeface="Times New Roman" panose="02020603050405020304" pitchFamily="18" charset="0"/>
-                <a:cs typeface="Times New Roman" panose="02020603050405020304" pitchFamily="18" charset="0"/>
-              </a:rPr>
-              <a:t>1.1 Project Planning</a:t>
-            </a:r>
-            <a:endParaRPr lang="en-US" sz="1600" dirty="0">
-              <a:effectLst/>
-              <a:latin typeface="Times New Roman" panose="02020603050405020304" pitchFamily="18" charset="0"/>
-              <a:ea typeface="Times New Roman" panose="02020603050405020304" pitchFamily="18" charset="0"/>
-              <a:cs typeface="Times New Roman" panose="02020603050405020304" pitchFamily="18" charset="0"/>
-            </a:endParaRPr>
-          </a:p>
-          <a:p>
-            <a:pPr marL="1143000" marR="0" lvl="2" indent="-228600">
-              <a:spcBef>
-                <a:spcPts val="0"/>
-              </a:spcBef>
-              <a:spcAft>
-                <a:spcPts val="0"/>
-              </a:spcAft>
-              <a:buSzPts val="1000"/>
-              <a:buFont typeface="Wingdings" panose="05000000000000000000" pitchFamily="2" charset="2"/>
-              <a:buChar char=""/>
-              <a:tabLst>
-                <a:tab pos="1371600" algn="l"/>
-              </a:tabLst>
-            </a:pPr>
-            <a:r>
-              <a:rPr lang="en-US" sz="2000" dirty="0">
-                <a:effectLst/>
-                <a:latin typeface="Times New Roman" panose="02020603050405020304" pitchFamily="18" charset="0"/>
-                <a:ea typeface="Times New Roman" panose="02020603050405020304" pitchFamily="18" charset="0"/>
-              </a:rPr>
-              <a:t>1.1.1 Define project goals and scope</a:t>
-            </a:r>
-            <a:endParaRPr lang="en-US" sz="1600" dirty="0">
-              <a:effectLst/>
-              <a:latin typeface="Times New Roman" panose="02020603050405020304" pitchFamily="18" charset="0"/>
-              <a:ea typeface="Times New Roman" panose="02020603050405020304" pitchFamily="18" charset="0"/>
-            </a:endParaRPr>
-          </a:p>
-          <a:p>
-            <a:pPr marL="1143000" marR="0" lvl="2" indent="-228600">
-              <a:spcBef>
-                <a:spcPts val="0"/>
-              </a:spcBef>
-              <a:spcAft>
-                <a:spcPts val="0"/>
-              </a:spcAft>
-              <a:buSzPts val="1000"/>
-              <a:buFont typeface="Wingdings" panose="05000000000000000000" pitchFamily="2" charset="2"/>
-              <a:buChar char=""/>
-              <a:tabLst>
-                <a:tab pos="1371600" algn="l"/>
-              </a:tabLst>
-            </a:pPr>
-            <a:r>
-              <a:rPr lang="en-US" sz="2000" dirty="0">
-                <a:effectLst/>
-                <a:latin typeface="Times New Roman" panose="02020603050405020304" pitchFamily="18" charset="0"/>
-                <a:ea typeface="Times New Roman" panose="02020603050405020304" pitchFamily="18" charset="0"/>
-              </a:rPr>
-              <a:t>1.1.2 Stakeholder identification and consultation</a:t>
-            </a:r>
-            <a:endParaRPr lang="en-US" sz="1600" dirty="0">
-              <a:effectLst/>
-              <a:latin typeface="Times New Roman" panose="02020603050405020304" pitchFamily="18" charset="0"/>
-              <a:ea typeface="Times New Roman" panose="02020603050405020304" pitchFamily="18" charset="0"/>
-            </a:endParaRPr>
-          </a:p>
-          <a:p>
-            <a:pPr marL="742950" marR="0" lvl="1" indent="-285750">
-              <a:spcBef>
-                <a:spcPts val="0"/>
-              </a:spcBef>
-              <a:spcAft>
-                <a:spcPts val="0"/>
-              </a:spcAft>
-              <a:buSzPts val="1000"/>
-              <a:buFont typeface="Courier New" panose="02070309020205020404" pitchFamily="49" charset="0"/>
-              <a:buChar char="o"/>
-              <a:tabLst>
-                <a:tab pos="914400" algn="l"/>
-              </a:tabLst>
-            </a:pPr>
-            <a:r>
-              <a:rPr lang="en-US" sz="2000" dirty="0">
-                <a:effectLst/>
-                <a:latin typeface="Times New Roman" panose="02020603050405020304" pitchFamily="18" charset="0"/>
-                <a:ea typeface="Times New Roman" panose="02020603050405020304" pitchFamily="18" charset="0"/>
-                <a:cs typeface="Times New Roman" panose="02020603050405020304" pitchFamily="18" charset="0"/>
-              </a:rPr>
-              <a:t>1.2 Requirements Gathering</a:t>
-            </a:r>
-            <a:endParaRPr lang="en-US" sz="1600" dirty="0">
-              <a:effectLst/>
-              <a:latin typeface="Times New Roman" panose="02020603050405020304" pitchFamily="18" charset="0"/>
-              <a:ea typeface="Times New Roman" panose="02020603050405020304" pitchFamily="18" charset="0"/>
-              <a:cs typeface="Times New Roman" panose="02020603050405020304" pitchFamily="18" charset="0"/>
-            </a:endParaRPr>
-          </a:p>
-          <a:p>
-            <a:pPr marL="1143000" marR="0" lvl="2" indent="-228600">
-              <a:spcBef>
-                <a:spcPts val="0"/>
-              </a:spcBef>
-              <a:spcAft>
-                <a:spcPts val="0"/>
-              </a:spcAft>
-              <a:buSzPts val="1000"/>
-              <a:buFont typeface="Wingdings" panose="05000000000000000000" pitchFamily="2" charset="2"/>
-              <a:buChar char=""/>
-              <a:tabLst>
-                <a:tab pos="1371600" algn="l"/>
-              </a:tabLst>
-            </a:pPr>
-            <a:r>
-              <a:rPr lang="en-US" sz="2000" dirty="0">
-                <a:effectLst/>
-                <a:latin typeface="Times New Roman" panose="02020603050405020304" pitchFamily="18" charset="0"/>
-                <a:ea typeface="Times New Roman" panose="02020603050405020304" pitchFamily="18" charset="0"/>
-              </a:rPr>
-              <a:t>1.2.1 Market analysis</a:t>
-            </a:r>
-            <a:endParaRPr lang="en-US" sz="1600" dirty="0">
-              <a:effectLst/>
-              <a:latin typeface="Times New Roman" panose="02020603050405020304" pitchFamily="18" charset="0"/>
-              <a:ea typeface="Times New Roman" panose="02020603050405020304" pitchFamily="18" charset="0"/>
-            </a:endParaRPr>
-          </a:p>
-          <a:p>
-            <a:pPr marL="1143000" marR="0" lvl="2" indent="-228600">
-              <a:spcBef>
-                <a:spcPts val="0"/>
-              </a:spcBef>
-              <a:spcAft>
-                <a:spcPts val="0"/>
-              </a:spcAft>
-              <a:buSzPts val="1000"/>
-              <a:buFont typeface="Wingdings" panose="05000000000000000000" pitchFamily="2" charset="2"/>
-              <a:buChar char=""/>
-              <a:tabLst>
-                <a:tab pos="1371600" algn="l"/>
-              </a:tabLst>
-            </a:pPr>
-            <a:r>
-              <a:rPr lang="en-US" sz="2000" dirty="0">
-                <a:effectLst/>
-                <a:latin typeface="Times New Roman" panose="02020603050405020304" pitchFamily="18" charset="0"/>
-                <a:ea typeface="Times New Roman" panose="02020603050405020304" pitchFamily="18" charset="0"/>
-              </a:rPr>
-              <a:t>1.2.2 Competitor software analysis (</a:t>
-            </a:r>
-            <a:r>
-              <a:rPr lang="en-US" sz="2000" dirty="0" err="1">
-                <a:effectLst/>
-                <a:latin typeface="Times New Roman" panose="02020603050405020304" pitchFamily="18" charset="0"/>
-                <a:ea typeface="Times New Roman" panose="02020603050405020304" pitchFamily="18" charset="0"/>
-              </a:rPr>
-              <a:t>BuildTools</a:t>
-            </a:r>
-            <a:r>
-              <a:rPr lang="en-US" sz="2000" dirty="0">
-                <a:effectLst/>
-                <a:latin typeface="Times New Roman" panose="02020603050405020304" pitchFamily="18" charset="0"/>
-                <a:ea typeface="Times New Roman" panose="02020603050405020304" pitchFamily="18" charset="0"/>
-              </a:rPr>
-              <a:t>, Procore, etc.)</a:t>
-            </a:r>
-            <a:endParaRPr lang="en-US" sz="1600" dirty="0">
-              <a:effectLst/>
-              <a:latin typeface="Times New Roman" panose="02020603050405020304" pitchFamily="18" charset="0"/>
-              <a:ea typeface="Times New Roman" panose="02020603050405020304" pitchFamily="18" charset="0"/>
-            </a:endParaRPr>
-          </a:p>
-          <a:p>
-            <a:pPr marL="342900" marR="0" lvl="0" indent="-342900">
-              <a:tabLst>
-                <a:tab pos="457200" algn="l"/>
-              </a:tabLst>
-            </a:pPr>
-            <a:r>
-              <a:rPr lang="en-US" sz="2400" b="1" dirty="0">
-                <a:effectLst/>
-                <a:latin typeface="Times New Roman" panose="02020603050405020304" pitchFamily="18" charset="0"/>
-                <a:ea typeface="Times New Roman" panose="02020603050405020304" pitchFamily="18" charset="0"/>
-              </a:rPr>
-              <a:t>Design and Architecture</a:t>
-            </a:r>
-            <a:endParaRPr lang="en-US" sz="2000" dirty="0">
-              <a:effectLst/>
-              <a:latin typeface="Times New Roman" panose="02020603050405020304" pitchFamily="18" charset="0"/>
-              <a:ea typeface="Times New Roman" panose="02020603050405020304" pitchFamily="18" charset="0"/>
-            </a:endParaRPr>
-          </a:p>
-          <a:p>
-            <a:pPr marL="742950" marR="0" lvl="1" indent="-285750">
-              <a:spcBef>
-                <a:spcPts val="0"/>
-              </a:spcBef>
-              <a:spcAft>
-                <a:spcPts val="0"/>
-              </a:spcAft>
-              <a:buSzPts val="1000"/>
-              <a:buFont typeface="Courier New" panose="02070309020205020404" pitchFamily="49" charset="0"/>
-              <a:buChar char="o"/>
-              <a:tabLst>
-                <a:tab pos="914400" algn="l"/>
-              </a:tabLst>
-            </a:pPr>
-            <a:r>
-              <a:rPr lang="en-US" sz="2000" dirty="0">
-                <a:effectLst/>
-                <a:latin typeface="Times New Roman" panose="02020603050405020304" pitchFamily="18" charset="0"/>
-                <a:ea typeface="Times New Roman" panose="02020603050405020304" pitchFamily="18" charset="0"/>
-                <a:cs typeface="Times New Roman" panose="02020603050405020304" pitchFamily="18" charset="0"/>
-              </a:rPr>
-              <a:t>2.1 System Design</a:t>
-            </a:r>
-            <a:endParaRPr lang="en-US" sz="1600" dirty="0">
-              <a:effectLst/>
-              <a:latin typeface="Times New Roman" panose="02020603050405020304" pitchFamily="18" charset="0"/>
-              <a:ea typeface="Times New Roman" panose="02020603050405020304" pitchFamily="18" charset="0"/>
-              <a:cs typeface="Times New Roman" panose="02020603050405020304" pitchFamily="18" charset="0"/>
-            </a:endParaRPr>
-          </a:p>
-          <a:p>
-            <a:pPr marL="1143000" marR="0" lvl="2" indent="-228600">
-              <a:spcBef>
-                <a:spcPts val="0"/>
-              </a:spcBef>
-              <a:spcAft>
-                <a:spcPts val="0"/>
-              </a:spcAft>
-              <a:buSzPts val="1000"/>
-              <a:buFont typeface="Wingdings" panose="05000000000000000000" pitchFamily="2" charset="2"/>
-              <a:buChar char=""/>
-              <a:tabLst>
-                <a:tab pos="1371600" algn="l"/>
-              </a:tabLst>
-            </a:pPr>
-            <a:r>
-              <a:rPr lang="en-US" sz="2000" dirty="0">
-                <a:effectLst/>
-                <a:latin typeface="Times New Roman" panose="02020603050405020304" pitchFamily="18" charset="0"/>
-                <a:ea typeface="Times New Roman" panose="02020603050405020304" pitchFamily="18" charset="0"/>
-              </a:rPr>
-              <a:t>2.1.1 Adobe design</a:t>
-            </a:r>
-            <a:endParaRPr lang="en-US" sz="1600" dirty="0">
-              <a:effectLst/>
-              <a:latin typeface="Times New Roman" panose="02020603050405020304" pitchFamily="18" charset="0"/>
-              <a:ea typeface="Times New Roman" panose="02020603050405020304" pitchFamily="18" charset="0"/>
-            </a:endParaRPr>
-          </a:p>
-          <a:p>
-            <a:pPr marL="742950" marR="0" lvl="1" indent="-285750">
-              <a:spcBef>
-                <a:spcPts val="0"/>
-              </a:spcBef>
-              <a:spcAft>
-                <a:spcPts val="0"/>
-              </a:spcAft>
-              <a:buSzPts val="1000"/>
-              <a:buFont typeface="Courier New" panose="02070309020205020404" pitchFamily="49" charset="0"/>
-              <a:buChar char="o"/>
-              <a:tabLst>
-                <a:tab pos="914400" algn="l"/>
-              </a:tabLst>
-            </a:pPr>
-            <a:r>
-              <a:rPr lang="en-US" sz="2000" dirty="0">
-                <a:effectLst/>
-                <a:latin typeface="Times New Roman" panose="02020603050405020304" pitchFamily="18" charset="0"/>
-                <a:ea typeface="Times New Roman" panose="02020603050405020304" pitchFamily="18" charset="0"/>
-                <a:cs typeface="Times New Roman" panose="02020603050405020304" pitchFamily="18" charset="0"/>
-              </a:rPr>
-              <a:t>2.2 Architecture Setup</a:t>
-            </a:r>
-            <a:endParaRPr lang="en-US" sz="1600" dirty="0">
-              <a:effectLst/>
-              <a:latin typeface="Times New Roman" panose="02020603050405020304" pitchFamily="18" charset="0"/>
-              <a:ea typeface="Times New Roman" panose="02020603050405020304" pitchFamily="18" charset="0"/>
-              <a:cs typeface="Times New Roman" panose="02020603050405020304" pitchFamily="18" charset="0"/>
-            </a:endParaRPr>
-          </a:p>
-          <a:p>
-            <a:pPr marL="1143000" marR="0" lvl="2" indent="-228600">
-              <a:spcBef>
-                <a:spcPts val="0"/>
-              </a:spcBef>
-              <a:spcAft>
-                <a:spcPts val="0"/>
-              </a:spcAft>
-              <a:buSzPts val="1000"/>
-              <a:buFont typeface="Wingdings" panose="05000000000000000000" pitchFamily="2" charset="2"/>
-              <a:buChar char=""/>
-              <a:tabLst>
-                <a:tab pos="1371600" algn="l"/>
-              </a:tabLst>
-            </a:pPr>
-            <a:r>
-              <a:rPr lang="en-US" sz="2000" dirty="0">
-                <a:effectLst/>
-                <a:latin typeface="Times New Roman" panose="02020603050405020304" pitchFamily="18" charset="0"/>
-                <a:ea typeface="Times New Roman" panose="02020603050405020304" pitchFamily="18" charset="0"/>
-              </a:rPr>
-              <a:t>2.2.1 Firebase real-time database integration</a:t>
-            </a:r>
-            <a:endParaRPr lang="en-US" sz="1600" dirty="0">
-              <a:effectLst/>
-              <a:latin typeface="Times New Roman" panose="02020603050405020304" pitchFamily="18" charset="0"/>
-              <a:ea typeface="Times New Roman" panose="02020603050405020304" pitchFamily="18" charset="0"/>
-            </a:endParaRPr>
-          </a:p>
-          <a:p>
-            <a:pPr marL="342900" marR="0" lvl="0" indent="-342900">
-              <a:tabLst>
-                <a:tab pos="457200" algn="l"/>
-              </a:tabLst>
-            </a:pPr>
-            <a:r>
-              <a:rPr lang="en-US" sz="2400" b="1" dirty="0">
-                <a:effectLst/>
-                <a:latin typeface="Times New Roman" panose="02020603050405020304" pitchFamily="18" charset="0"/>
-                <a:ea typeface="Times New Roman" panose="02020603050405020304" pitchFamily="18" charset="0"/>
-              </a:rPr>
-              <a:t>Development</a:t>
-            </a:r>
-            <a:endParaRPr lang="en-US" sz="2000" dirty="0">
-              <a:effectLst/>
-              <a:latin typeface="Times New Roman" panose="02020603050405020304" pitchFamily="18" charset="0"/>
-              <a:ea typeface="Times New Roman" panose="02020603050405020304" pitchFamily="18" charset="0"/>
-            </a:endParaRPr>
-          </a:p>
-          <a:p>
-            <a:pPr marL="742950" marR="0" lvl="1" indent="-285750">
-              <a:spcBef>
-                <a:spcPts val="0"/>
-              </a:spcBef>
-              <a:spcAft>
-                <a:spcPts val="0"/>
-              </a:spcAft>
-              <a:buSzPts val="1000"/>
-              <a:buFont typeface="Courier New" panose="02070309020205020404" pitchFamily="49" charset="0"/>
-              <a:buChar char="o"/>
-              <a:tabLst>
-                <a:tab pos="914400" algn="l"/>
-              </a:tabLst>
-            </a:pPr>
-            <a:r>
-              <a:rPr lang="en-US" sz="1800" dirty="0">
-                <a:effectLst/>
-                <a:latin typeface="Times New Roman" panose="02020603050405020304" pitchFamily="18" charset="0"/>
-                <a:ea typeface="Times New Roman" panose="02020603050405020304" pitchFamily="18" charset="0"/>
-                <a:cs typeface="Times New Roman" panose="02020603050405020304" pitchFamily="18" charset="0"/>
-              </a:rPr>
-              <a:t>3.1 </a:t>
-            </a:r>
-            <a:r>
-              <a:rPr lang="en-US" sz="2000" dirty="0">
-                <a:effectLst/>
-                <a:latin typeface="Times New Roman" panose="02020603050405020304" pitchFamily="18" charset="0"/>
-                <a:ea typeface="Times New Roman" panose="02020603050405020304" pitchFamily="18" charset="0"/>
-                <a:cs typeface="Times New Roman" panose="02020603050405020304" pitchFamily="18" charset="0"/>
-              </a:rPr>
-              <a:t>Frontend Development (React.js)</a:t>
-            </a:r>
-            <a:endParaRPr lang="en-US" sz="1600" dirty="0">
-              <a:effectLst/>
-              <a:latin typeface="Times New Roman" panose="02020603050405020304" pitchFamily="18" charset="0"/>
-              <a:ea typeface="Times New Roman" panose="02020603050405020304" pitchFamily="18" charset="0"/>
-              <a:cs typeface="Times New Roman" panose="02020603050405020304" pitchFamily="18" charset="0"/>
-            </a:endParaRPr>
-          </a:p>
-          <a:p>
-            <a:pPr marL="1143000" marR="0" lvl="2" indent="-228600">
-              <a:spcBef>
-                <a:spcPts val="0"/>
-              </a:spcBef>
-              <a:spcAft>
-                <a:spcPts val="0"/>
-              </a:spcAft>
-              <a:buSzPts val="1000"/>
-              <a:buFont typeface="Wingdings" panose="05000000000000000000" pitchFamily="2" charset="2"/>
-              <a:buChar char=""/>
-              <a:tabLst>
-                <a:tab pos="1371600" algn="l"/>
-              </a:tabLst>
-            </a:pPr>
-            <a:r>
-              <a:rPr lang="en-US" sz="2000" dirty="0">
-                <a:effectLst/>
-                <a:latin typeface="Times New Roman" panose="02020603050405020304" pitchFamily="18" charset="0"/>
-                <a:ea typeface="Times New Roman" panose="02020603050405020304" pitchFamily="18" charset="0"/>
-              </a:rPr>
-              <a:t>3.1.1 Dashboard and task management UI</a:t>
-            </a:r>
-            <a:endParaRPr lang="en-US" sz="1600" dirty="0">
-              <a:effectLst/>
-              <a:latin typeface="Times New Roman" panose="02020603050405020304" pitchFamily="18" charset="0"/>
-              <a:ea typeface="Times New Roman" panose="02020603050405020304" pitchFamily="18" charset="0"/>
-            </a:endParaRPr>
-          </a:p>
-          <a:p>
-            <a:pPr marL="1143000" marR="0" lvl="2" indent="-228600">
-              <a:spcBef>
-                <a:spcPts val="0"/>
-              </a:spcBef>
-              <a:spcAft>
-                <a:spcPts val="0"/>
-              </a:spcAft>
-              <a:buSzPts val="1000"/>
-              <a:buFont typeface="Wingdings" panose="05000000000000000000" pitchFamily="2" charset="2"/>
-              <a:buChar char=""/>
-              <a:tabLst>
-                <a:tab pos="1371600" algn="l"/>
-              </a:tabLst>
-            </a:pPr>
-            <a:r>
-              <a:rPr lang="en-US" sz="2000" dirty="0">
-                <a:effectLst/>
-                <a:latin typeface="Times New Roman" panose="02020603050405020304" pitchFamily="18" charset="0"/>
-                <a:ea typeface="Times New Roman" panose="02020603050405020304" pitchFamily="18" charset="0"/>
-              </a:rPr>
-              <a:t>3.1.2 Real-time communication system</a:t>
-            </a:r>
-            <a:endParaRPr lang="en-US" sz="1600" dirty="0">
-              <a:effectLst/>
-              <a:latin typeface="Times New Roman" panose="02020603050405020304" pitchFamily="18" charset="0"/>
-              <a:ea typeface="Times New Roman" panose="02020603050405020304" pitchFamily="18" charset="0"/>
-            </a:endParaRPr>
-          </a:p>
-          <a:p>
-            <a:pPr marL="742950" marR="0" lvl="1" indent="-285750">
-              <a:spcBef>
-                <a:spcPts val="0"/>
-              </a:spcBef>
-              <a:spcAft>
-                <a:spcPts val="0"/>
-              </a:spcAft>
-              <a:buSzPts val="1000"/>
-              <a:buFont typeface="Courier New" panose="02070309020205020404" pitchFamily="49" charset="0"/>
-              <a:buChar char="o"/>
-              <a:tabLst>
-                <a:tab pos="914400" algn="l"/>
-              </a:tabLst>
-            </a:pPr>
-            <a:r>
-              <a:rPr lang="en-US" sz="2000" dirty="0">
-                <a:effectLst/>
-                <a:latin typeface="Times New Roman" panose="02020603050405020304" pitchFamily="18" charset="0"/>
-                <a:ea typeface="Times New Roman" panose="02020603050405020304" pitchFamily="18" charset="0"/>
-                <a:cs typeface="Times New Roman" panose="02020603050405020304" pitchFamily="18" charset="0"/>
-              </a:rPr>
-              <a:t>3.2 Backend Development (Firebase)</a:t>
-            </a:r>
-            <a:endParaRPr lang="en-US" sz="1600" dirty="0">
-              <a:effectLst/>
-              <a:latin typeface="Times New Roman" panose="02020603050405020304" pitchFamily="18" charset="0"/>
-              <a:ea typeface="Times New Roman" panose="02020603050405020304" pitchFamily="18" charset="0"/>
-              <a:cs typeface="Times New Roman" panose="02020603050405020304" pitchFamily="18" charset="0"/>
-            </a:endParaRPr>
-          </a:p>
-          <a:p>
-            <a:pPr marL="1143000" marR="0" lvl="2" indent="-228600">
-              <a:spcBef>
-                <a:spcPts val="0"/>
-              </a:spcBef>
-              <a:spcAft>
-                <a:spcPts val="0"/>
-              </a:spcAft>
-              <a:buSzPts val="1000"/>
-              <a:buFont typeface="Wingdings" panose="05000000000000000000" pitchFamily="2" charset="2"/>
-              <a:buChar char=""/>
-              <a:tabLst>
-                <a:tab pos="1371600" algn="l"/>
-              </a:tabLst>
-            </a:pPr>
-            <a:r>
-              <a:rPr lang="en-US" sz="2000" dirty="0">
-                <a:effectLst/>
-                <a:latin typeface="Times New Roman" panose="02020603050405020304" pitchFamily="18" charset="0"/>
-                <a:ea typeface="Times New Roman" panose="02020603050405020304" pitchFamily="18" charset="0"/>
-              </a:rPr>
-              <a:t>3.2.1 Database setup</a:t>
-            </a:r>
-            <a:endParaRPr lang="en-US" sz="1600" dirty="0">
-              <a:effectLst/>
-              <a:latin typeface="Times New Roman" panose="02020603050405020304" pitchFamily="18" charset="0"/>
-              <a:ea typeface="Times New Roman" panose="02020603050405020304" pitchFamily="18" charset="0"/>
-            </a:endParaRPr>
-          </a:p>
-        </p:txBody>
-      </p:sp>
+        </p:nvPicPr>
+        <p:blipFill>
+          <a:blip r:embed="rId2">
+            <a:extLst>
+              <a:ext uri="{28A0092B-C50C-407E-A947-70E740481C1C}">
+                <a14:useLocalDpi xmlns:a14="http://schemas.microsoft.com/office/drawing/2010/main" val="0"/>
+              </a:ext>
+            </a:extLst>
+          </a:blip>
+          <a:srcRect t="16666" b="13890"/>
+          <a:stretch/>
+        </p:blipFill>
+        <p:spPr>
+          <a:xfrm>
+            <a:off x="36576" y="1239837"/>
+            <a:ext cx="9031224" cy="4703763"/>
+          </a:xfrm>
+        </p:spPr>
+      </p:pic>
     </p:spTree>
     <p:extLst>
       <p:ext uri="{BB962C8B-B14F-4D97-AF65-F5344CB8AC3E}">
@@ -6798,1671 +6321,6 @@
           <p:cNvPr id="2" name="Title 1">
             <a:extLst>
               <a:ext uri="{FF2B5EF4-FFF2-40B4-BE49-F238E27FC236}">
-                <a16:creationId xmlns:a16="http://schemas.microsoft.com/office/drawing/2014/main" id="{D31FA83D-508D-B834-216B-118B0A6C1413}"/>
-              </a:ext>
-            </a:extLst>
-          </p:cNvPr>
-          <p:cNvSpPr>
-            <a:spLocks noGrp="1"/>
-          </p:cNvSpPr>
-          <p:nvPr>
-            <p:ph type="title"/>
-          </p:nvPr>
-        </p:nvSpPr>
-        <p:spPr/>
-        <p:txBody>
-          <a:bodyPr/>
-          <a:lstStyle/>
-          <a:p>
-            <a:r>
-              <a:rPr lang="en-US" dirty="0"/>
-              <a:t>Work Breakdown Structure</a:t>
-            </a:r>
-          </a:p>
-        </p:txBody>
-      </p:sp>
-      <p:sp>
-        <p:nvSpPr>
-          <p:cNvPr id="3" name="Content Placeholder 2">
-            <a:extLst>
-              <a:ext uri="{FF2B5EF4-FFF2-40B4-BE49-F238E27FC236}">
-                <a16:creationId xmlns:a16="http://schemas.microsoft.com/office/drawing/2014/main" id="{1AD37058-925F-39E1-535C-1A5FE2B6F221}"/>
-              </a:ext>
-            </a:extLst>
-          </p:cNvPr>
-          <p:cNvSpPr>
-            <a:spLocks noGrp="1"/>
-          </p:cNvSpPr>
-          <p:nvPr>
-            <p:ph idx="1"/>
-          </p:nvPr>
-        </p:nvSpPr>
-        <p:spPr/>
-        <p:txBody>
-          <a:bodyPr>
-            <a:normAutofit/>
-          </a:bodyPr>
-          <a:lstStyle/>
-          <a:p>
-            <a:pPr marL="342900" marR="0" lvl="0" indent="-342900">
-              <a:tabLst>
-                <a:tab pos="457200" algn="l"/>
-              </a:tabLst>
-            </a:pPr>
-            <a:r>
-              <a:rPr lang="en-US" sz="2400" b="1" dirty="0">
-                <a:effectLst/>
-                <a:latin typeface="Times New Roman" panose="02020603050405020304" pitchFamily="18" charset="0"/>
-                <a:ea typeface="Times New Roman" panose="02020603050405020304" pitchFamily="18" charset="0"/>
-              </a:rPr>
-              <a:t>Testing and Quality Assurance</a:t>
-            </a:r>
-            <a:endParaRPr lang="en-US" sz="2000" dirty="0">
-              <a:effectLst/>
-              <a:latin typeface="Times New Roman" panose="02020603050405020304" pitchFamily="18" charset="0"/>
-              <a:ea typeface="Times New Roman" panose="02020603050405020304" pitchFamily="18" charset="0"/>
-            </a:endParaRPr>
-          </a:p>
-          <a:p>
-            <a:pPr marL="742950" marR="0" lvl="1" indent="-285750">
-              <a:spcBef>
-                <a:spcPts val="0"/>
-              </a:spcBef>
-              <a:spcAft>
-                <a:spcPts val="0"/>
-              </a:spcAft>
-              <a:buSzPts val="1000"/>
-              <a:buFont typeface="Courier New" panose="02070309020205020404" pitchFamily="49" charset="0"/>
-              <a:buChar char="o"/>
-              <a:tabLst>
-                <a:tab pos="914400" algn="l"/>
-              </a:tabLst>
-            </a:pPr>
-            <a:r>
-              <a:rPr lang="en-US" sz="1800" dirty="0">
-                <a:effectLst/>
-                <a:latin typeface="Times New Roman" panose="02020603050405020304" pitchFamily="18" charset="0"/>
-                <a:ea typeface="Times New Roman" panose="02020603050405020304" pitchFamily="18" charset="0"/>
-                <a:cs typeface="Times New Roman" panose="02020603050405020304" pitchFamily="18" charset="0"/>
-              </a:rPr>
-              <a:t>4.1 Unit Testing</a:t>
-            </a:r>
-            <a:endParaRPr lang="en-US" sz="1400" dirty="0">
-              <a:effectLst/>
-              <a:latin typeface="Times New Roman" panose="02020603050405020304" pitchFamily="18" charset="0"/>
-              <a:ea typeface="Times New Roman" panose="02020603050405020304" pitchFamily="18" charset="0"/>
-              <a:cs typeface="Times New Roman" panose="02020603050405020304" pitchFamily="18" charset="0"/>
-            </a:endParaRPr>
-          </a:p>
-          <a:p>
-            <a:pPr marL="1143000" marR="0" lvl="2" indent="-228600">
-              <a:spcBef>
-                <a:spcPts val="0"/>
-              </a:spcBef>
-              <a:spcAft>
-                <a:spcPts val="0"/>
-              </a:spcAft>
-              <a:buSzPts val="1000"/>
-              <a:buFont typeface="Wingdings" panose="05000000000000000000" pitchFamily="2" charset="2"/>
-              <a:buChar char=""/>
-              <a:tabLst>
-                <a:tab pos="1371600" algn="l"/>
-              </a:tabLst>
-            </a:pPr>
-            <a:r>
-              <a:rPr lang="en-US" sz="1800" dirty="0">
-                <a:effectLst/>
-                <a:latin typeface="Times New Roman" panose="02020603050405020304" pitchFamily="18" charset="0"/>
-                <a:ea typeface="Times New Roman" panose="02020603050405020304" pitchFamily="18" charset="0"/>
-              </a:rPr>
-              <a:t>4.1.1 Component and functionality testing</a:t>
-            </a:r>
-            <a:endParaRPr lang="en-US" sz="1400" dirty="0">
-              <a:effectLst/>
-              <a:latin typeface="Times New Roman" panose="02020603050405020304" pitchFamily="18" charset="0"/>
-              <a:ea typeface="Times New Roman" panose="02020603050405020304" pitchFamily="18" charset="0"/>
-            </a:endParaRPr>
-          </a:p>
-          <a:p>
-            <a:pPr marL="742950" marR="0" lvl="1" indent="-285750">
-              <a:spcBef>
-                <a:spcPts val="0"/>
-              </a:spcBef>
-              <a:spcAft>
-                <a:spcPts val="0"/>
-              </a:spcAft>
-              <a:buSzPts val="1000"/>
-              <a:buFont typeface="Courier New" panose="02070309020205020404" pitchFamily="49" charset="0"/>
-              <a:buChar char="o"/>
-              <a:tabLst>
-                <a:tab pos="914400" algn="l"/>
-              </a:tabLst>
-            </a:pPr>
-            <a:r>
-              <a:rPr lang="en-US" sz="1800" dirty="0">
-                <a:effectLst/>
-                <a:latin typeface="Times New Roman" panose="02020603050405020304" pitchFamily="18" charset="0"/>
-                <a:ea typeface="Times New Roman" panose="02020603050405020304" pitchFamily="18" charset="0"/>
-                <a:cs typeface="Times New Roman" panose="02020603050405020304" pitchFamily="18" charset="0"/>
-              </a:rPr>
-              <a:t>4.2 User Acceptance Testing</a:t>
-            </a:r>
-            <a:endParaRPr lang="en-US" sz="1400" dirty="0">
-              <a:effectLst/>
-              <a:latin typeface="Times New Roman" panose="02020603050405020304" pitchFamily="18" charset="0"/>
-              <a:ea typeface="Times New Roman" panose="02020603050405020304" pitchFamily="18" charset="0"/>
-              <a:cs typeface="Times New Roman" panose="02020603050405020304" pitchFamily="18" charset="0"/>
-            </a:endParaRPr>
-          </a:p>
-          <a:p>
-            <a:pPr marL="1143000" marR="0" lvl="2" indent="-228600">
-              <a:spcBef>
-                <a:spcPts val="0"/>
-              </a:spcBef>
-              <a:spcAft>
-                <a:spcPts val="0"/>
-              </a:spcAft>
-              <a:buSzPts val="1000"/>
-              <a:buFont typeface="Wingdings" panose="05000000000000000000" pitchFamily="2" charset="2"/>
-              <a:buChar char=""/>
-              <a:tabLst>
-                <a:tab pos="1371600" algn="l"/>
-              </a:tabLst>
-            </a:pPr>
-            <a:r>
-              <a:rPr lang="en-US" sz="1800" dirty="0">
-                <a:effectLst/>
-                <a:latin typeface="Times New Roman" panose="02020603050405020304" pitchFamily="18" charset="0"/>
-                <a:ea typeface="Times New Roman" panose="02020603050405020304" pitchFamily="18" charset="0"/>
-              </a:rPr>
-              <a:t>4.2.1 Beta testing with builders and clients</a:t>
-            </a:r>
-            <a:endParaRPr lang="en-US" sz="1400" dirty="0">
-              <a:effectLst/>
-              <a:latin typeface="Times New Roman" panose="02020603050405020304" pitchFamily="18" charset="0"/>
-              <a:ea typeface="Times New Roman" panose="02020603050405020304" pitchFamily="18" charset="0"/>
-            </a:endParaRPr>
-          </a:p>
-          <a:p>
-            <a:pPr marL="1143000" marR="0" lvl="2" indent="-228600">
-              <a:spcBef>
-                <a:spcPts val="0"/>
-              </a:spcBef>
-              <a:spcAft>
-                <a:spcPts val="0"/>
-              </a:spcAft>
-              <a:buSzPts val="1000"/>
-              <a:buFont typeface="Wingdings" panose="05000000000000000000" pitchFamily="2" charset="2"/>
-              <a:buChar char=""/>
-              <a:tabLst>
-                <a:tab pos="1371600" algn="l"/>
-              </a:tabLst>
-            </a:pPr>
-            <a:r>
-              <a:rPr lang="en-US" sz="1800" dirty="0">
-                <a:effectLst/>
-                <a:latin typeface="Times New Roman" panose="02020603050405020304" pitchFamily="18" charset="0"/>
-                <a:ea typeface="Times New Roman" panose="02020603050405020304" pitchFamily="18" charset="0"/>
-              </a:rPr>
-              <a:t>4.2.2 Feedback gathering and analysis</a:t>
-            </a:r>
-            <a:endParaRPr lang="en-US" sz="1400" dirty="0">
-              <a:effectLst/>
-              <a:latin typeface="Times New Roman" panose="02020603050405020304" pitchFamily="18" charset="0"/>
-              <a:ea typeface="Times New Roman" panose="02020603050405020304" pitchFamily="18" charset="0"/>
-            </a:endParaRPr>
-          </a:p>
-          <a:p>
-            <a:pPr marL="342900" marR="0" lvl="0" indent="-342900">
-              <a:tabLst>
-                <a:tab pos="457200" algn="l"/>
-              </a:tabLst>
-            </a:pPr>
-            <a:r>
-              <a:rPr lang="en-US" sz="2400" b="1" dirty="0">
-                <a:effectLst/>
-                <a:latin typeface="Times New Roman" panose="02020603050405020304" pitchFamily="18" charset="0"/>
-                <a:ea typeface="Times New Roman" panose="02020603050405020304" pitchFamily="18" charset="0"/>
-              </a:rPr>
-              <a:t>Deployment and Launch</a:t>
-            </a:r>
-            <a:endParaRPr lang="en-US" sz="2000" dirty="0">
-              <a:effectLst/>
-              <a:latin typeface="Times New Roman" panose="02020603050405020304" pitchFamily="18" charset="0"/>
-              <a:ea typeface="Times New Roman" panose="02020603050405020304" pitchFamily="18" charset="0"/>
-            </a:endParaRPr>
-          </a:p>
-          <a:p>
-            <a:pPr marL="742950" marR="0" lvl="1" indent="-285750">
-              <a:spcBef>
-                <a:spcPts val="0"/>
-              </a:spcBef>
-              <a:spcAft>
-                <a:spcPts val="0"/>
-              </a:spcAft>
-              <a:buSzPts val="1000"/>
-              <a:buFont typeface="Courier New" panose="02070309020205020404" pitchFamily="49" charset="0"/>
-              <a:buChar char="o"/>
-              <a:tabLst>
-                <a:tab pos="914400" algn="l"/>
-              </a:tabLst>
-            </a:pPr>
-            <a:r>
-              <a:rPr lang="en-US" sz="1800" dirty="0">
-                <a:effectLst/>
-                <a:latin typeface="Times New Roman" panose="02020603050405020304" pitchFamily="18" charset="0"/>
-                <a:ea typeface="Times New Roman" panose="02020603050405020304" pitchFamily="18" charset="0"/>
-                <a:cs typeface="Times New Roman" panose="02020603050405020304" pitchFamily="18" charset="0"/>
-              </a:rPr>
-              <a:t>5.1 Deployment Setup</a:t>
-            </a:r>
-            <a:endParaRPr lang="en-US" sz="1400" dirty="0">
-              <a:effectLst/>
-              <a:latin typeface="Times New Roman" panose="02020603050405020304" pitchFamily="18" charset="0"/>
-              <a:ea typeface="Times New Roman" panose="02020603050405020304" pitchFamily="18" charset="0"/>
-              <a:cs typeface="Times New Roman" panose="02020603050405020304" pitchFamily="18" charset="0"/>
-            </a:endParaRPr>
-          </a:p>
-          <a:p>
-            <a:pPr marL="1143000" marR="0" lvl="2" indent="-228600">
-              <a:spcBef>
-                <a:spcPts val="0"/>
-              </a:spcBef>
-              <a:spcAft>
-                <a:spcPts val="0"/>
-              </a:spcAft>
-              <a:buSzPts val="1000"/>
-              <a:buFont typeface="Wingdings" panose="05000000000000000000" pitchFamily="2" charset="2"/>
-              <a:buChar char=""/>
-              <a:tabLst>
-                <a:tab pos="1371600" algn="l"/>
-              </a:tabLst>
-            </a:pPr>
-            <a:r>
-              <a:rPr lang="en-US" sz="1800" dirty="0">
-                <a:effectLst/>
-                <a:latin typeface="Times New Roman" panose="02020603050405020304" pitchFamily="18" charset="0"/>
-                <a:ea typeface="Times New Roman" panose="02020603050405020304" pitchFamily="18" charset="0"/>
-              </a:rPr>
-              <a:t>5.1.1 Cloud server setup</a:t>
-            </a:r>
-            <a:endParaRPr lang="en-US" sz="1400" dirty="0">
-              <a:effectLst/>
-              <a:latin typeface="Times New Roman" panose="02020603050405020304" pitchFamily="18" charset="0"/>
-              <a:ea typeface="Times New Roman" panose="02020603050405020304" pitchFamily="18" charset="0"/>
-            </a:endParaRPr>
-          </a:p>
-          <a:p>
-            <a:pPr marL="1143000" marR="0" lvl="2" indent="-228600">
-              <a:spcBef>
-                <a:spcPts val="0"/>
-              </a:spcBef>
-              <a:spcAft>
-                <a:spcPts val="0"/>
-              </a:spcAft>
-              <a:buSzPts val="1000"/>
-              <a:buFont typeface="Wingdings" panose="05000000000000000000" pitchFamily="2" charset="2"/>
-              <a:buChar char=""/>
-              <a:tabLst>
-                <a:tab pos="1371600" algn="l"/>
-              </a:tabLst>
-            </a:pPr>
-            <a:r>
-              <a:rPr lang="en-US" sz="1800" dirty="0">
-                <a:effectLst/>
-                <a:latin typeface="Times New Roman" panose="02020603050405020304" pitchFamily="18" charset="0"/>
-                <a:ea typeface="Times New Roman" panose="02020603050405020304" pitchFamily="18" charset="0"/>
-              </a:rPr>
-              <a:t>5.1.2 Domain and security configuration</a:t>
-            </a:r>
-            <a:endParaRPr lang="en-US" sz="1400" dirty="0">
-              <a:effectLst/>
-              <a:latin typeface="Times New Roman" panose="02020603050405020304" pitchFamily="18" charset="0"/>
-              <a:ea typeface="Times New Roman" panose="02020603050405020304" pitchFamily="18" charset="0"/>
-            </a:endParaRPr>
-          </a:p>
-          <a:p>
-            <a:pPr marL="742950" marR="0" lvl="1" indent="-285750">
-              <a:spcBef>
-                <a:spcPts val="0"/>
-              </a:spcBef>
-              <a:spcAft>
-                <a:spcPts val="0"/>
-              </a:spcAft>
-              <a:buSzPts val="1000"/>
-              <a:buFont typeface="Courier New" panose="02070309020205020404" pitchFamily="49" charset="0"/>
-              <a:buChar char="o"/>
-              <a:tabLst>
-                <a:tab pos="914400" algn="l"/>
-              </a:tabLst>
-            </a:pPr>
-            <a:r>
-              <a:rPr lang="en-US" sz="1800" dirty="0">
-                <a:effectLst/>
-                <a:latin typeface="Times New Roman" panose="02020603050405020304" pitchFamily="18" charset="0"/>
-                <a:ea typeface="Times New Roman" panose="02020603050405020304" pitchFamily="18" charset="0"/>
-                <a:cs typeface="Times New Roman" panose="02020603050405020304" pitchFamily="18" charset="0"/>
-              </a:rPr>
-              <a:t>5.2 Launch</a:t>
-            </a:r>
-            <a:endParaRPr lang="en-US" sz="1400" dirty="0">
-              <a:effectLst/>
-              <a:latin typeface="Times New Roman" panose="02020603050405020304" pitchFamily="18" charset="0"/>
-              <a:ea typeface="Times New Roman" panose="02020603050405020304" pitchFamily="18" charset="0"/>
-              <a:cs typeface="Times New Roman" panose="02020603050405020304" pitchFamily="18" charset="0"/>
-            </a:endParaRPr>
-          </a:p>
-          <a:p>
-            <a:pPr marL="1143000" marR="0" lvl="2" indent="-228600">
-              <a:spcBef>
-                <a:spcPts val="0"/>
-              </a:spcBef>
-              <a:spcAft>
-                <a:spcPts val="0"/>
-              </a:spcAft>
-              <a:buSzPts val="1000"/>
-              <a:buFont typeface="Wingdings" panose="05000000000000000000" pitchFamily="2" charset="2"/>
-              <a:buChar char=""/>
-              <a:tabLst>
-                <a:tab pos="1371600" algn="l"/>
-              </a:tabLst>
-            </a:pPr>
-            <a:r>
-              <a:rPr lang="en-US" sz="1800" dirty="0">
-                <a:effectLst/>
-                <a:latin typeface="Times New Roman" panose="02020603050405020304" pitchFamily="18" charset="0"/>
-                <a:ea typeface="Times New Roman" panose="02020603050405020304" pitchFamily="18" charset="0"/>
-              </a:rPr>
-              <a:t>5.2.1 Marketing and user onboarding</a:t>
-            </a:r>
-            <a:endParaRPr lang="en-US" sz="1400" dirty="0">
-              <a:effectLst/>
-              <a:latin typeface="Times New Roman" panose="02020603050405020304" pitchFamily="18" charset="0"/>
-              <a:ea typeface="Times New Roman" panose="02020603050405020304" pitchFamily="18" charset="0"/>
-            </a:endParaRPr>
-          </a:p>
-          <a:p>
-            <a:pPr marL="1143000" marR="0" lvl="2" indent="-228600">
-              <a:spcBef>
-                <a:spcPts val="0"/>
-              </a:spcBef>
-              <a:spcAft>
-                <a:spcPts val="0"/>
-              </a:spcAft>
-              <a:buSzPts val="1000"/>
-              <a:buFont typeface="Wingdings" panose="05000000000000000000" pitchFamily="2" charset="2"/>
-              <a:buChar char=""/>
-              <a:tabLst>
-                <a:tab pos="1371600" algn="l"/>
-              </a:tabLst>
-            </a:pPr>
-            <a:r>
-              <a:rPr lang="en-US" sz="1800" dirty="0">
-                <a:effectLst/>
-                <a:latin typeface="Times New Roman" panose="02020603050405020304" pitchFamily="18" charset="0"/>
-                <a:ea typeface="Times New Roman" panose="02020603050405020304" pitchFamily="18" charset="0"/>
-              </a:rPr>
-              <a:t>5.2.2 Final launch and deployment</a:t>
-            </a:r>
-            <a:endParaRPr lang="en-US" sz="1400" dirty="0">
-              <a:effectLst/>
-              <a:latin typeface="Times New Roman" panose="02020603050405020304" pitchFamily="18" charset="0"/>
-              <a:ea typeface="Times New Roman" panose="02020603050405020304" pitchFamily="18" charset="0"/>
-            </a:endParaRPr>
-          </a:p>
-          <a:p>
-            <a:pPr marL="342900" marR="0" lvl="0" indent="-342900">
-              <a:tabLst>
-                <a:tab pos="457200" algn="l"/>
-              </a:tabLst>
-            </a:pPr>
-            <a:r>
-              <a:rPr lang="en-US" sz="2400" b="1" dirty="0">
-                <a:effectLst/>
-                <a:latin typeface="Times New Roman" panose="02020603050405020304" pitchFamily="18" charset="0"/>
-                <a:ea typeface="Times New Roman" panose="02020603050405020304" pitchFamily="18" charset="0"/>
-              </a:rPr>
-              <a:t>Post-Launch</a:t>
-            </a:r>
-            <a:endParaRPr lang="en-US" sz="2000" dirty="0">
-              <a:effectLst/>
-              <a:latin typeface="Times New Roman" panose="02020603050405020304" pitchFamily="18" charset="0"/>
-              <a:ea typeface="Times New Roman" panose="02020603050405020304" pitchFamily="18" charset="0"/>
-            </a:endParaRPr>
-          </a:p>
-          <a:p>
-            <a:pPr marL="742950" marR="0" lvl="1" indent="-285750">
-              <a:spcBef>
-                <a:spcPts val="0"/>
-              </a:spcBef>
-              <a:spcAft>
-                <a:spcPts val="0"/>
-              </a:spcAft>
-              <a:buSzPts val="1000"/>
-              <a:buFont typeface="Courier New" panose="02070309020205020404" pitchFamily="49" charset="0"/>
-              <a:buChar char="o"/>
-              <a:tabLst>
-                <a:tab pos="914400" algn="l"/>
-              </a:tabLst>
-            </a:pPr>
-            <a:r>
-              <a:rPr lang="en-US" sz="1800" dirty="0">
-                <a:effectLst/>
-                <a:latin typeface="Times New Roman" panose="02020603050405020304" pitchFamily="18" charset="0"/>
-                <a:ea typeface="Times New Roman" panose="02020603050405020304" pitchFamily="18" charset="0"/>
-                <a:cs typeface="Times New Roman" panose="02020603050405020304" pitchFamily="18" charset="0"/>
-              </a:rPr>
-              <a:t>6.1 Maintenance and Updates</a:t>
-            </a:r>
-            <a:endParaRPr lang="en-US" sz="1400" dirty="0">
-              <a:effectLst/>
-              <a:latin typeface="Times New Roman" panose="02020603050405020304" pitchFamily="18" charset="0"/>
-              <a:ea typeface="Times New Roman" panose="02020603050405020304" pitchFamily="18" charset="0"/>
-              <a:cs typeface="Times New Roman" panose="02020603050405020304" pitchFamily="18" charset="0"/>
-            </a:endParaRPr>
-          </a:p>
-          <a:p>
-            <a:pPr marL="1143000" marR="0" lvl="2" indent="-228600">
-              <a:spcBef>
-                <a:spcPts val="0"/>
-              </a:spcBef>
-              <a:spcAft>
-                <a:spcPts val="0"/>
-              </a:spcAft>
-              <a:buSzPts val="1000"/>
-              <a:buFont typeface="Wingdings" panose="05000000000000000000" pitchFamily="2" charset="2"/>
-              <a:buChar char=""/>
-              <a:tabLst>
-                <a:tab pos="1371600" algn="l"/>
-              </a:tabLst>
-            </a:pPr>
-            <a:r>
-              <a:rPr lang="en-US" sz="1800" dirty="0">
-                <a:effectLst/>
-                <a:latin typeface="Times New Roman" panose="02020603050405020304" pitchFamily="18" charset="0"/>
-                <a:ea typeface="Times New Roman" panose="02020603050405020304" pitchFamily="18" charset="0"/>
-              </a:rPr>
-              <a:t>6.1.1 Bug fixing</a:t>
-            </a:r>
-            <a:endParaRPr lang="en-US" sz="1400" dirty="0">
-              <a:effectLst/>
-              <a:latin typeface="Times New Roman" panose="02020603050405020304" pitchFamily="18" charset="0"/>
-              <a:ea typeface="Times New Roman" panose="02020603050405020304" pitchFamily="18" charset="0"/>
-            </a:endParaRPr>
-          </a:p>
-          <a:p>
-            <a:pPr marL="1143000" marR="0" lvl="2" indent="-228600">
-              <a:spcBef>
-                <a:spcPts val="0"/>
-              </a:spcBef>
-              <a:spcAft>
-                <a:spcPts val="0"/>
-              </a:spcAft>
-              <a:buSzPts val="1000"/>
-              <a:buFont typeface="Wingdings" panose="05000000000000000000" pitchFamily="2" charset="2"/>
-              <a:buChar char=""/>
-              <a:tabLst>
-                <a:tab pos="1371600" algn="l"/>
-              </a:tabLst>
-            </a:pPr>
-            <a:r>
-              <a:rPr lang="en-US" sz="1800" dirty="0">
-                <a:effectLst/>
-                <a:latin typeface="Times New Roman" panose="02020603050405020304" pitchFamily="18" charset="0"/>
-                <a:ea typeface="Times New Roman" panose="02020603050405020304" pitchFamily="18" charset="0"/>
-              </a:rPr>
-              <a:t>6.1.2 User support</a:t>
-            </a:r>
-            <a:endParaRPr lang="en-US" sz="1400" dirty="0">
-              <a:effectLst/>
-              <a:latin typeface="Times New Roman" panose="02020603050405020304" pitchFamily="18" charset="0"/>
-              <a:ea typeface="Times New Roman" panose="02020603050405020304" pitchFamily="18" charset="0"/>
-            </a:endParaRPr>
-          </a:p>
-        </p:txBody>
-      </p:sp>
-    </p:spTree>
-    <p:extLst>
-      <p:ext uri="{BB962C8B-B14F-4D97-AF65-F5344CB8AC3E}">
-        <p14:creationId xmlns:p14="http://schemas.microsoft.com/office/powerpoint/2010/main" val="2136231012"/>
-      </p:ext>
-    </p:extLst>
-  </p:cSld>
-  <p:clrMapOvr>
-    <a:masterClrMapping/>
-  </p:clrMapOvr>
-</p:sld>
-</file>
-
-<file path=ppt/slides/slide17.xml><?xml version="1.0" encoding="utf-8"?>
-<p:sld xmlns:a="http://schemas.openxmlformats.org/drawingml/2006/main" xmlns:r="http://schemas.openxmlformats.org/officeDocument/2006/relationships" xmlns:p="http://schemas.openxmlformats.org/presentationml/2006/main">
-  <p:cSld>
-    <p:spTree>
-      <p:nvGrpSpPr>
-        <p:cNvPr id="1" name=""/>
-        <p:cNvGrpSpPr/>
-        <p:nvPr/>
-      </p:nvGrpSpPr>
-      <p:grpSpPr>
-        <a:xfrm>
-          <a:off x="0" y="0"/>
-          <a:ext cx="0" cy="0"/>
-          <a:chOff x="0" y="0"/>
-          <a:chExt cx="0" cy="0"/>
-        </a:xfrm>
-      </p:grpSpPr>
-      <p:sp>
-        <p:nvSpPr>
-          <p:cNvPr id="2" name="Title 1">
-            <a:extLst>
-              <a:ext uri="{FF2B5EF4-FFF2-40B4-BE49-F238E27FC236}">
-                <a16:creationId xmlns:a16="http://schemas.microsoft.com/office/drawing/2014/main" id="{46172340-C295-68E3-66C3-44E8C1AB88D8}"/>
-              </a:ext>
-            </a:extLst>
-          </p:cNvPr>
-          <p:cNvSpPr>
-            <a:spLocks noGrp="1"/>
-          </p:cNvSpPr>
-          <p:nvPr>
-            <p:ph type="title"/>
-          </p:nvPr>
-        </p:nvSpPr>
-        <p:spPr/>
-        <p:txBody>
-          <a:bodyPr/>
-          <a:lstStyle/>
-          <a:p>
-            <a:r>
-              <a:rPr lang="en-US" dirty="0"/>
-              <a:t>Gantt Chart</a:t>
-            </a:r>
-          </a:p>
-        </p:txBody>
-      </p:sp>
-      <p:graphicFrame>
-        <p:nvGraphicFramePr>
-          <p:cNvPr id="4" name="Content Placeholder 3">
-            <a:extLst>
-              <a:ext uri="{FF2B5EF4-FFF2-40B4-BE49-F238E27FC236}">
-                <a16:creationId xmlns:a16="http://schemas.microsoft.com/office/drawing/2014/main" id="{899B3914-7C81-9EB5-89F6-D75347036E20}"/>
-              </a:ext>
-            </a:extLst>
-          </p:cNvPr>
-          <p:cNvGraphicFramePr>
-            <a:graphicFrameLocks noGrp="1"/>
-          </p:cNvGraphicFramePr>
-          <p:nvPr>
-            <p:ph idx="1"/>
-            <p:extLst>
-              <p:ext uri="{D42A27DB-BD31-4B8C-83A1-F6EECF244321}">
-                <p14:modId xmlns:p14="http://schemas.microsoft.com/office/powerpoint/2010/main" val="2646812677"/>
-              </p:ext>
-            </p:extLst>
-          </p:nvPr>
-        </p:nvGraphicFramePr>
-        <p:xfrm>
-          <a:off x="457200" y="1295400"/>
-          <a:ext cx="8077200" cy="5029200"/>
-        </p:xfrm>
-        <a:graphic>
-          <a:graphicData uri="http://schemas.openxmlformats.org/drawingml/2006/table">
-            <a:tbl>
-              <a:tblPr firstRow="1" firstCol="1" bandRow="1">
-                <a:tableStyleId>{5C22544A-7EE6-4342-B048-85BDC9FD1C3A}</a:tableStyleId>
-              </a:tblPr>
-              <a:tblGrid>
-                <a:gridCol w="3810000">
-                  <a:extLst>
-                    <a:ext uri="{9D8B030D-6E8A-4147-A177-3AD203B41FA5}">
-                      <a16:colId xmlns:a16="http://schemas.microsoft.com/office/drawing/2014/main" val="2057584729"/>
-                    </a:ext>
-                  </a:extLst>
-                </a:gridCol>
-                <a:gridCol w="1447800">
-                  <a:extLst>
-                    <a:ext uri="{9D8B030D-6E8A-4147-A177-3AD203B41FA5}">
-                      <a16:colId xmlns:a16="http://schemas.microsoft.com/office/drawing/2014/main" val="4010405261"/>
-                    </a:ext>
-                  </a:extLst>
-                </a:gridCol>
-                <a:gridCol w="1524000">
-                  <a:extLst>
-                    <a:ext uri="{9D8B030D-6E8A-4147-A177-3AD203B41FA5}">
-                      <a16:colId xmlns:a16="http://schemas.microsoft.com/office/drawing/2014/main" val="2165476667"/>
-                    </a:ext>
-                  </a:extLst>
-                </a:gridCol>
-                <a:gridCol w="1295400">
-                  <a:extLst>
-                    <a:ext uri="{9D8B030D-6E8A-4147-A177-3AD203B41FA5}">
-                      <a16:colId xmlns:a16="http://schemas.microsoft.com/office/drawing/2014/main" val="1537559113"/>
-                    </a:ext>
-                  </a:extLst>
-                </a:gridCol>
-              </a:tblGrid>
-              <a:tr h="743105">
-                <a:tc>
-                  <a:txBody>
-                    <a:bodyPr/>
-                    <a:lstStyle/>
-                    <a:p>
-                      <a:pPr marL="0" marR="0">
-                        <a:spcBef>
-                          <a:spcPts val="0"/>
-                        </a:spcBef>
-                        <a:spcAft>
-                          <a:spcPts val="0"/>
-                        </a:spcAft>
-                      </a:pPr>
-                      <a:r>
-                        <a:rPr lang="en-US" sz="2400">
-                          <a:effectLst/>
-                        </a:rPr>
-                        <a:t>Task</a:t>
-                      </a:r>
-                      <a:endParaRPr lang="en-US" sz="1600">
-                        <a:effectLst/>
-                        <a:latin typeface="Times New Roman" panose="02020603050405020304" pitchFamily="18" charset="0"/>
-                        <a:ea typeface="Times New Roman" panose="02020603050405020304" pitchFamily="18" charset="0"/>
-                        <a:cs typeface="Arial" panose="020B0604020202020204" pitchFamily="34" charset="0"/>
-                      </a:endParaRPr>
-                    </a:p>
-                  </a:txBody>
-                  <a:tcPr marL="68580" marR="68580" marT="0" marB="0"/>
-                </a:tc>
-                <a:tc>
-                  <a:txBody>
-                    <a:bodyPr/>
-                    <a:lstStyle/>
-                    <a:p>
-                      <a:pPr marL="0" marR="0">
-                        <a:spcBef>
-                          <a:spcPts val="0"/>
-                        </a:spcBef>
-                        <a:spcAft>
-                          <a:spcPts val="0"/>
-                        </a:spcAft>
-                      </a:pPr>
-                      <a:r>
-                        <a:rPr lang="en-US" sz="2400">
-                          <a:effectLst/>
-                        </a:rPr>
-                        <a:t>Duration</a:t>
-                      </a:r>
-                      <a:endParaRPr lang="en-US" sz="1600">
-                        <a:effectLst/>
-                        <a:latin typeface="Times New Roman" panose="02020603050405020304" pitchFamily="18" charset="0"/>
-                        <a:ea typeface="Times New Roman" panose="02020603050405020304" pitchFamily="18" charset="0"/>
-                        <a:cs typeface="Arial" panose="020B0604020202020204" pitchFamily="34" charset="0"/>
-                      </a:endParaRPr>
-                    </a:p>
-                  </a:txBody>
-                  <a:tcPr marL="68580" marR="68580" marT="0" marB="0"/>
-                </a:tc>
-                <a:tc>
-                  <a:txBody>
-                    <a:bodyPr/>
-                    <a:lstStyle/>
-                    <a:p>
-                      <a:pPr marL="0" marR="0">
-                        <a:spcBef>
-                          <a:spcPts val="0"/>
-                        </a:spcBef>
-                        <a:spcAft>
-                          <a:spcPts val="0"/>
-                        </a:spcAft>
-                      </a:pPr>
-                      <a:r>
-                        <a:rPr lang="en-US" sz="2400">
-                          <a:effectLst/>
-                        </a:rPr>
-                        <a:t>Start Date</a:t>
-                      </a:r>
-                      <a:endParaRPr lang="en-US" sz="1600">
-                        <a:effectLst/>
-                        <a:latin typeface="Times New Roman" panose="02020603050405020304" pitchFamily="18" charset="0"/>
-                        <a:ea typeface="Times New Roman" panose="02020603050405020304" pitchFamily="18" charset="0"/>
-                        <a:cs typeface="Arial" panose="020B0604020202020204" pitchFamily="34" charset="0"/>
-                      </a:endParaRPr>
-                    </a:p>
-                  </a:txBody>
-                  <a:tcPr marL="68580" marR="68580" marT="0" marB="0"/>
-                </a:tc>
-                <a:tc>
-                  <a:txBody>
-                    <a:bodyPr/>
-                    <a:lstStyle/>
-                    <a:p>
-                      <a:pPr marL="0" marR="0">
-                        <a:spcBef>
-                          <a:spcPts val="0"/>
-                        </a:spcBef>
-                        <a:spcAft>
-                          <a:spcPts val="0"/>
-                        </a:spcAft>
-                      </a:pPr>
-                      <a:r>
-                        <a:rPr lang="en-US" sz="2400">
-                          <a:effectLst/>
-                        </a:rPr>
-                        <a:t>End Date</a:t>
-                      </a:r>
-                      <a:endParaRPr lang="en-US" sz="1600">
-                        <a:effectLst/>
-                        <a:latin typeface="Times New Roman" panose="02020603050405020304" pitchFamily="18" charset="0"/>
-                        <a:ea typeface="Times New Roman" panose="02020603050405020304" pitchFamily="18" charset="0"/>
-                        <a:cs typeface="Arial" panose="020B0604020202020204" pitchFamily="34" charset="0"/>
-                      </a:endParaRPr>
-                    </a:p>
-                  </a:txBody>
-                  <a:tcPr marL="68580" marR="68580" marT="0" marB="0"/>
-                </a:tc>
-                <a:extLst>
-                  <a:ext uri="{0D108BD9-81ED-4DB2-BD59-A6C34878D82A}">
-                    <a16:rowId xmlns:a16="http://schemas.microsoft.com/office/drawing/2014/main" val="450132989"/>
-                  </a:ext>
-                </a:extLst>
-              </a:tr>
-              <a:tr h="495403">
-                <a:tc>
-                  <a:txBody>
-                    <a:bodyPr/>
-                    <a:lstStyle/>
-                    <a:p>
-                      <a:pPr marL="0" marR="0">
-                        <a:spcBef>
-                          <a:spcPts val="0"/>
-                        </a:spcBef>
-                        <a:spcAft>
-                          <a:spcPts val="0"/>
-                        </a:spcAft>
-                      </a:pPr>
-                      <a:r>
-                        <a:rPr lang="en-US" sz="2000">
-                          <a:effectLst/>
-                        </a:rPr>
-                        <a:t>1. Project Initialization</a:t>
-                      </a:r>
-                      <a:endParaRPr lang="en-US" sz="2000">
-                        <a:effectLst/>
-                        <a:latin typeface="Times New Roman" panose="02020603050405020304" pitchFamily="18" charset="0"/>
-                        <a:ea typeface="Times New Roman" panose="02020603050405020304" pitchFamily="18" charset="0"/>
-                        <a:cs typeface="Arial" panose="020B0604020202020204" pitchFamily="34" charset="0"/>
-                      </a:endParaRPr>
-                    </a:p>
-                  </a:txBody>
-                  <a:tcPr marL="68580" marR="68580" marT="0" marB="0"/>
-                </a:tc>
-                <a:tc>
-                  <a:txBody>
-                    <a:bodyPr/>
-                    <a:lstStyle/>
-                    <a:p>
-                      <a:pPr marL="0" marR="0">
-                        <a:spcBef>
-                          <a:spcPts val="0"/>
-                        </a:spcBef>
-                        <a:spcAft>
-                          <a:spcPts val="0"/>
-                        </a:spcAft>
-                      </a:pPr>
-                      <a:r>
-                        <a:rPr lang="en-US" sz="1800">
-                          <a:effectLst/>
-                        </a:rPr>
-                        <a:t>3 Weeks</a:t>
-                      </a:r>
-                      <a:endParaRPr lang="en-US" sz="1800">
-                        <a:effectLst/>
-                        <a:latin typeface="Times New Roman" panose="02020603050405020304" pitchFamily="18" charset="0"/>
-                        <a:ea typeface="Times New Roman" panose="02020603050405020304" pitchFamily="18" charset="0"/>
-                        <a:cs typeface="Arial" panose="020B0604020202020204" pitchFamily="34" charset="0"/>
-                      </a:endParaRPr>
-                    </a:p>
-                  </a:txBody>
-                  <a:tcPr marL="68580" marR="68580" marT="0" marB="0"/>
-                </a:tc>
-                <a:tc>
-                  <a:txBody>
-                    <a:bodyPr/>
-                    <a:lstStyle/>
-                    <a:p>
-                      <a:pPr marL="0" marR="0">
-                        <a:spcBef>
-                          <a:spcPts val="0"/>
-                        </a:spcBef>
-                        <a:spcAft>
-                          <a:spcPts val="0"/>
-                        </a:spcAft>
-                      </a:pPr>
-                      <a:r>
-                        <a:rPr lang="en-US" sz="1800">
-                          <a:effectLst/>
-                        </a:rPr>
-                        <a:t>Month 1</a:t>
-                      </a:r>
-                      <a:endParaRPr lang="en-US" sz="1800">
-                        <a:effectLst/>
-                        <a:latin typeface="Times New Roman" panose="02020603050405020304" pitchFamily="18" charset="0"/>
-                        <a:ea typeface="Times New Roman" panose="02020603050405020304" pitchFamily="18" charset="0"/>
-                        <a:cs typeface="Arial" panose="020B0604020202020204" pitchFamily="34" charset="0"/>
-                      </a:endParaRPr>
-                    </a:p>
-                  </a:txBody>
-                  <a:tcPr marL="68580" marR="68580" marT="0" marB="0"/>
-                </a:tc>
-                <a:tc>
-                  <a:txBody>
-                    <a:bodyPr/>
-                    <a:lstStyle/>
-                    <a:p>
-                      <a:pPr marL="0" marR="0">
-                        <a:spcBef>
-                          <a:spcPts val="0"/>
-                        </a:spcBef>
-                        <a:spcAft>
-                          <a:spcPts val="0"/>
-                        </a:spcAft>
-                      </a:pPr>
-                      <a:r>
-                        <a:rPr lang="en-US" sz="1800">
-                          <a:effectLst/>
-                        </a:rPr>
-                        <a:t>Month 1.75</a:t>
-                      </a:r>
-                      <a:endParaRPr lang="en-US" sz="1800">
-                        <a:effectLst/>
-                        <a:latin typeface="Times New Roman" panose="02020603050405020304" pitchFamily="18" charset="0"/>
-                        <a:ea typeface="Times New Roman" panose="02020603050405020304" pitchFamily="18" charset="0"/>
-                        <a:cs typeface="Arial" panose="020B0604020202020204" pitchFamily="34" charset="0"/>
-                      </a:endParaRPr>
-                    </a:p>
-                  </a:txBody>
-                  <a:tcPr marL="68580" marR="68580" marT="0" marB="0"/>
-                </a:tc>
-                <a:extLst>
-                  <a:ext uri="{0D108BD9-81ED-4DB2-BD59-A6C34878D82A}">
-                    <a16:rowId xmlns:a16="http://schemas.microsoft.com/office/drawing/2014/main" val="1459065793"/>
-                  </a:ext>
-                </a:extLst>
-              </a:tr>
-              <a:tr h="495403">
-                <a:tc>
-                  <a:txBody>
-                    <a:bodyPr/>
-                    <a:lstStyle/>
-                    <a:p>
-                      <a:pPr marL="0" marR="0">
-                        <a:spcBef>
-                          <a:spcPts val="0"/>
-                        </a:spcBef>
-                        <a:spcAft>
-                          <a:spcPts val="0"/>
-                        </a:spcAft>
-                      </a:pPr>
-                      <a:r>
-                        <a:rPr lang="en-US" sz="2000">
-                          <a:effectLst/>
-                        </a:rPr>
-                        <a:t>1.1 Project Planning</a:t>
-                      </a:r>
-                      <a:endParaRPr lang="en-US" sz="2000">
-                        <a:effectLst/>
-                        <a:latin typeface="Times New Roman" panose="02020603050405020304" pitchFamily="18" charset="0"/>
-                        <a:ea typeface="Times New Roman" panose="02020603050405020304" pitchFamily="18" charset="0"/>
-                        <a:cs typeface="Arial" panose="020B0604020202020204" pitchFamily="34" charset="0"/>
-                      </a:endParaRPr>
-                    </a:p>
-                  </a:txBody>
-                  <a:tcPr marL="68580" marR="68580" marT="0" marB="0"/>
-                </a:tc>
-                <a:tc>
-                  <a:txBody>
-                    <a:bodyPr/>
-                    <a:lstStyle/>
-                    <a:p>
-                      <a:pPr marL="0" marR="0">
-                        <a:spcBef>
-                          <a:spcPts val="0"/>
-                        </a:spcBef>
-                        <a:spcAft>
-                          <a:spcPts val="0"/>
-                        </a:spcAft>
-                      </a:pPr>
-                      <a:r>
-                        <a:rPr lang="en-US" sz="1800">
-                          <a:effectLst/>
-                        </a:rPr>
-                        <a:t>1 Week</a:t>
-                      </a:r>
-                      <a:endParaRPr lang="en-US" sz="1800">
-                        <a:effectLst/>
-                        <a:latin typeface="Times New Roman" panose="02020603050405020304" pitchFamily="18" charset="0"/>
-                        <a:ea typeface="Times New Roman" panose="02020603050405020304" pitchFamily="18" charset="0"/>
-                        <a:cs typeface="Arial" panose="020B0604020202020204" pitchFamily="34" charset="0"/>
-                      </a:endParaRPr>
-                    </a:p>
-                  </a:txBody>
-                  <a:tcPr marL="68580" marR="68580" marT="0" marB="0"/>
-                </a:tc>
-                <a:tc>
-                  <a:txBody>
-                    <a:bodyPr/>
-                    <a:lstStyle/>
-                    <a:p>
-                      <a:pPr marL="0" marR="0">
-                        <a:spcBef>
-                          <a:spcPts val="0"/>
-                        </a:spcBef>
-                        <a:spcAft>
-                          <a:spcPts val="0"/>
-                        </a:spcAft>
-                      </a:pPr>
-                      <a:r>
-                        <a:rPr lang="en-US" sz="1800">
-                          <a:effectLst/>
-                        </a:rPr>
-                        <a:t>Week 1</a:t>
-                      </a:r>
-                      <a:endParaRPr lang="en-US" sz="1800">
-                        <a:effectLst/>
-                        <a:latin typeface="Times New Roman" panose="02020603050405020304" pitchFamily="18" charset="0"/>
-                        <a:ea typeface="Times New Roman" panose="02020603050405020304" pitchFamily="18" charset="0"/>
-                        <a:cs typeface="Arial" panose="020B0604020202020204" pitchFamily="34" charset="0"/>
-                      </a:endParaRPr>
-                    </a:p>
-                  </a:txBody>
-                  <a:tcPr marL="68580" marR="68580" marT="0" marB="0"/>
-                </a:tc>
-                <a:tc>
-                  <a:txBody>
-                    <a:bodyPr/>
-                    <a:lstStyle/>
-                    <a:p>
-                      <a:pPr marL="0" marR="0">
-                        <a:spcBef>
-                          <a:spcPts val="0"/>
-                        </a:spcBef>
-                        <a:spcAft>
-                          <a:spcPts val="0"/>
-                        </a:spcAft>
-                      </a:pPr>
-                      <a:r>
-                        <a:rPr lang="en-US" sz="1800">
-                          <a:effectLst/>
-                        </a:rPr>
-                        <a:t>Week 2</a:t>
-                      </a:r>
-                      <a:endParaRPr lang="en-US" sz="1800">
-                        <a:effectLst/>
-                        <a:latin typeface="Times New Roman" panose="02020603050405020304" pitchFamily="18" charset="0"/>
-                        <a:ea typeface="Times New Roman" panose="02020603050405020304" pitchFamily="18" charset="0"/>
-                        <a:cs typeface="Arial" panose="020B0604020202020204" pitchFamily="34" charset="0"/>
-                      </a:endParaRPr>
-                    </a:p>
-                  </a:txBody>
-                  <a:tcPr marL="68580" marR="68580" marT="0" marB="0"/>
-                </a:tc>
-                <a:extLst>
-                  <a:ext uri="{0D108BD9-81ED-4DB2-BD59-A6C34878D82A}">
-                    <a16:rowId xmlns:a16="http://schemas.microsoft.com/office/drawing/2014/main" val="3242320216"/>
-                  </a:ext>
-                </a:extLst>
-              </a:tr>
-              <a:tr h="768161">
-                <a:tc>
-                  <a:txBody>
-                    <a:bodyPr/>
-                    <a:lstStyle/>
-                    <a:p>
-                      <a:pPr marL="0" marR="0">
-                        <a:spcBef>
-                          <a:spcPts val="0"/>
-                        </a:spcBef>
-                        <a:spcAft>
-                          <a:spcPts val="0"/>
-                        </a:spcAft>
-                      </a:pPr>
-                      <a:r>
-                        <a:rPr lang="en-US" sz="2000">
-                          <a:effectLst/>
-                        </a:rPr>
-                        <a:t>1.2 Requirements Gathering</a:t>
-                      </a:r>
-                      <a:endParaRPr lang="en-US" sz="2000">
-                        <a:effectLst/>
-                        <a:latin typeface="Times New Roman" panose="02020603050405020304" pitchFamily="18" charset="0"/>
-                        <a:ea typeface="Times New Roman" panose="02020603050405020304" pitchFamily="18" charset="0"/>
-                        <a:cs typeface="Arial" panose="020B0604020202020204" pitchFamily="34" charset="0"/>
-                      </a:endParaRPr>
-                    </a:p>
-                  </a:txBody>
-                  <a:tcPr marL="68580" marR="68580" marT="0" marB="0"/>
-                </a:tc>
-                <a:tc>
-                  <a:txBody>
-                    <a:bodyPr/>
-                    <a:lstStyle/>
-                    <a:p>
-                      <a:pPr marL="0" marR="0">
-                        <a:spcBef>
-                          <a:spcPts val="0"/>
-                        </a:spcBef>
-                        <a:spcAft>
-                          <a:spcPts val="0"/>
-                        </a:spcAft>
-                      </a:pPr>
-                      <a:r>
-                        <a:rPr lang="en-US" sz="1800">
-                          <a:effectLst/>
-                        </a:rPr>
-                        <a:t>2 Weeks</a:t>
-                      </a:r>
-                      <a:endParaRPr lang="en-US" sz="1800">
-                        <a:effectLst/>
-                        <a:latin typeface="Times New Roman" panose="02020603050405020304" pitchFamily="18" charset="0"/>
-                        <a:ea typeface="Times New Roman" panose="02020603050405020304" pitchFamily="18" charset="0"/>
-                        <a:cs typeface="Arial" panose="020B0604020202020204" pitchFamily="34" charset="0"/>
-                      </a:endParaRPr>
-                    </a:p>
-                  </a:txBody>
-                  <a:tcPr marL="68580" marR="68580" marT="0" marB="0"/>
-                </a:tc>
-                <a:tc>
-                  <a:txBody>
-                    <a:bodyPr/>
-                    <a:lstStyle/>
-                    <a:p>
-                      <a:pPr marL="0" marR="0">
-                        <a:spcBef>
-                          <a:spcPts val="0"/>
-                        </a:spcBef>
-                        <a:spcAft>
-                          <a:spcPts val="0"/>
-                        </a:spcAft>
-                      </a:pPr>
-                      <a:r>
-                        <a:rPr lang="en-US" sz="1800">
-                          <a:effectLst/>
-                        </a:rPr>
-                        <a:t>Week 2</a:t>
-                      </a:r>
-                      <a:endParaRPr lang="en-US" sz="1800">
-                        <a:effectLst/>
-                        <a:latin typeface="Times New Roman" panose="02020603050405020304" pitchFamily="18" charset="0"/>
-                        <a:ea typeface="Times New Roman" panose="02020603050405020304" pitchFamily="18" charset="0"/>
-                        <a:cs typeface="Arial" panose="020B0604020202020204" pitchFamily="34" charset="0"/>
-                      </a:endParaRPr>
-                    </a:p>
-                  </a:txBody>
-                  <a:tcPr marL="68580" marR="68580" marT="0" marB="0"/>
-                </a:tc>
-                <a:tc>
-                  <a:txBody>
-                    <a:bodyPr/>
-                    <a:lstStyle/>
-                    <a:p>
-                      <a:pPr marL="0" marR="0">
-                        <a:spcBef>
-                          <a:spcPts val="0"/>
-                        </a:spcBef>
-                        <a:spcAft>
-                          <a:spcPts val="0"/>
-                        </a:spcAft>
-                      </a:pPr>
-                      <a:r>
-                        <a:rPr lang="en-US" sz="1800">
-                          <a:effectLst/>
-                        </a:rPr>
-                        <a:t>Week 4</a:t>
-                      </a:r>
-                      <a:endParaRPr lang="en-US" sz="1800">
-                        <a:effectLst/>
-                        <a:latin typeface="Times New Roman" panose="02020603050405020304" pitchFamily="18" charset="0"/>
-                        <a:ea typeface="Times New Roman" panose="02020603050405020304" pitchFamily="18" charset="0"/>
-                        <a:cs typeface="Arial" panose="020B0604020202020204" pitchFamily="34" charset="0"/>
-                      </a:endParaRPr>
-                    </a:p>
-                  </a:txBody>
-                  <a:tcPr marL="68580" marR="68580" marT="0" marB="0"/>
-                </a:tc>
-                <a:extLst>
-                  <a:ext uri="{0D108BD9-81ED-4DB2-BD59-A6C34878D82A}">
-                    <a16:rowId xmlns:a16="http://schemas.microsoft.com/office/drawing/2014/main" val="4008305907"/>
-                  </a:ext>
-                </a:extLst>
-              </a:tr>
-              <a:tr h="768161">
-                <a:tc>
-                  <a:txBody>
-                    <a:bodyPr/>
-                    <a:lstStyle/>
-                    <a:p>
-                      <a:pPr marL="0" marR="0">
-                        <a:spcBef>
-                          <a:spcPts val="0"/>
-                        </a:spcBef>
-                        <a:spcAft>
-                          <a:spcPts val="0"/>
-                        </a:spcAft>
-                      </a:pPr>
-                      <a:r>
-                        <a:rPr lang="en-US" sz="2000">
-                          <a:effectLst/>
-                        </a:rPr>
-                        <a:t>2. Design and Architecture</a:t>
-                      </a:r>
-                      <a:endParaRPr lang="en-US" sz="2000">
-                        <a:effectLst/>
-                        <a:latin typeface="Times New Roman" panose="02020603050405020304" pitchFamily="18" charset="0"/>
-                        <a:ea typeface="Times New Roman" panose="02020603050405020304" pitchFamily="18" charset="0"/>
-                        <a:cs typeface="Arial" panose="020B0604020202020204" pitchFamily="34" charset="0"/>
-                      </a:endParaRPr>
-                    </a:p>
-                  </a:txBody>
-                  <a:tcPr marL="68580" marR="68580" marT="0" marB="0"/>
-                </a:tc>
-                <a:tc>
-                  <a:txBody>
-                    <a:bodyPr/>
-                    <a:lstStyle/>
-                    <a:p>
-                      <a:pPr marL="0" marR="0">
-                        <a:spcBef>
-                          <a:spcPts val="0"/>
-                        </a:spcBef>
-                        <a:spcAft>
-                          <a:spcPts val="0"/>
-                        </a:spcAft>
-                      </a:pPr>
-                      <a:r>
-                        <a:rPr lang="en-US" sz="1800">
-                          <a:effectLst/>
-                        </a:rPr>
-                        <a:t>5 Weeks</a:t>
-                      </a:r>
-                      <a:endParaRPr lang="en-US" sz="1800">
-                        <a:effectLst/>
-                        <a:latin typeface="Times New Roman" panose="02020603050405020304" pitchFamily="18" charset="0"/>
-                        <a:ea typeface="Times New Roman" panose="02020603050405020304" pitchFamily="18" charset="0"/>
-                        <a:cs typeface="Arial" panose="020B0604020202020204" pitchFamily="34" charset="0"/>
-                      </a:endParaRPr>
-                    </a:p>
-                  </a:txBody>
-                  <a:tcPr marL="68580" marR="68580" marT="0" marB="0"/>
-                </a:tc>
-                <a:tc>
-                  <a:txBody>
-                    <a:bodyPr/>
-                    <a:lstStyle/>
-                    <a:p>
-                      <a:pPr marL="0" marR="0">
-                        <a:spcBef>
-                          <a:spcPts val="0"/>
-                        </a:spcBef>
-                        <a:spcAft>
-                          <a:spcPts val="0"/>
-                        </a:spcAft>
-                      </a:pPr>
-                      <a:r>
-                        <a:rPr lang="en-US" sz="1800">
-                          <a:effectLst/>
-                        </a:rPr>
-                        <a:t>Month 1.75</a:t>
-                      </a:r>
-                      <a:endParaRPr lang="en-US" sz="1800">
-                        <a:effectLst/>
-                        <a:latin typeface="Times New Roman" panose="02020603050405020304" pitchFamily="18" charset="0"/>
-                        <a:ea typeface="Times New Roman" panose="02020603050405020304" pitchFamily="18" charset="0"/>
-                        <a:cs typeface="Arial" panose="020B0604020202020204" pitchFamily="34" charset="0"/>
-                      </a:endParaRPr>
-                    </a:p>
-                  </a:txBody>
-                  <a:tcPr marL="68580" marR="68580" marT="0" marB="0"/>
-                </a:tc>
-                <a:tc>
-                  <a:txBody>
-                    <a:bodyPr/>
-                    <a:lstStyle/>
-                    <a:p>
-                      <a:pPr marL="0" marR="0">
-                        <a:spcBef>
-                          <a:spcPts val="0"/>
-                        </a:spcBef>
-                        <a:spcAft>
-                          <a:spcPts val="0"/>
-                        </a:spcAft>
-                      </a:pPr>
-                      <a:r>
-                        <a:rPr lang="en-US" sz="1800">
-                          <a:effectLst/>
-                        </a:rPr>
-                        <a:t>Month 3</a:t>
-                      </a:r>
-                      <a:endParaRPr lang="en-US" sz="1800">
-                        <a:effectLst/>
-                        <a:latin typeface="Times New Roman" panose="02020603050405020304" pitchFamily="18" charset="0"/>
-                        <a:ea typeface="Times New Roman" panose="02020603050405020304" pitchFamily="18" charset="0"/>
-                        <a:cs typeface="Arial" panose="020B0604020202020204" pitchFamily="34" charset="0"/>
-                      </a:endParaRPr>
-                    </a:p>
-                  </a:txBody>
-                  <a:tcPr marL="68580" marR="68580" marT="0" marB="0"/>
-                </a:tc>
-                <a:extLst>
-                  <a:ext uri="{0D108BD9-81ED-4DB2-BD59-A6C34878D82A}">
-                    <a16:rowId xmlns:a16="http://schemas.microsoft.com/office/drawing/2014/main" val="1799555272"/>
-                  </a:ext>
-                </a:extLst>
-              </a:tr>
-              <a:tr h="495403">
-                <a:tc>
-                  <a:txBody>
-                    <a:bodyPr/>
-                    <a:lstStyle/>
-                    <a:p>
-                      <a:pPr marL="0" marR="0">
-                        <a:spcBef>
-                          <a:spcPts val="0"/>
-                        </a:spcBef>
-                        <a:spcAft>
-                          <a:spcPts val="0"/>
-                        </a:spcAft>
-                      </a:pPr>
-                      <a:r>
-                        <a:rPr lang="en-US" sz="2000">
-                          <a:effectLst/>
-                        </a:rPr>
-                        <a:t>2.1 System Design</a:t>
-                      </a:r>
-                      <a:endParaRPr lang="en-US" sz="2000">
-                        <a:effectLst/>
-                        <a:latin typeface="Times New Roman" panose="02020603050405020304" pitchFamily="18" charset="0"/>
-                        <a:ea typeface="Times New Roman" panose="02020603050405020304" pitchFamily="18" charset="0"/>
-                        <a:cs typeface="Arial" panose="020B0604020202020204" pitchFamily="34" charset="0"/>
-                      </a:endParaRPr>
-                    </a:p>
-                  </a:txBody>
-                  <a:tcPr marL="68580" marR="68580" marT="0" marB="0"/>
-                </a:tc>
-                <a:tc>
-                  <a:txBody>
-                    <a:bodyPr/>
-                    <a:lstStyle/>
-                    <a:p>
-                      <a:pPr marL="0" marR="0">
-                        <a:spcBef>
-                          <a:spcPts val="0"/>
-                        </a:spcBef>
-                        <a:spcAft>
-                          <a:spcPts val="0"/>
-                        </a:spcAft>
-                      </a:pPr>
-                      <a:r>
-                        <a:rPr lang="en-US" sz="1800">
-                          <a:effectLst/>
-                        </a:rPr>
-                        <a:t>2 Weeks</a:t>
-                      </a:r>
-                      <a:endParaRPr lang="en-US" sz="1800">
-                        <a:effectLst/>
-                        <a:latin typeface="Times New Roman" panose="02020603050405020304" pitchFamily="18" charset="0"/>
-                        <a:ea typeface="Times New Roman" panose="02020603050405020304" pitchFamily="18" charset="0"/>
-                        <a:cs typeface="Arial" panose="020B0604020202020204" pitchFamily="34" charset="0"/>
-                      </a:endParaRPr>
-                    </a:p>
-                  </a:txBody>
-                  <a:tcPr marL="68580" marR="68580" marT="0" marB="0"/>
-                </a:tc>
-                <a:tc>
-                  <a:txBody>
-                    <a:bodyPr/>
-                    <a:lstStyle/>
-                    <a:p>
-                      <a:pPr marL="0" marR="0">
-                        <a:spcBef>
-                          <a:spcPts val="0"/>
-                        </a:spcBef>
-                        <a:spcAft>
-                          <a:spcPts val="0"/>
-                        </a:spcAft>
-                      </a:pPr>
-                      <a:r>
-                        <a:rPr lang="en-US" sz="1800">
-                          <a:effectLst/>
-                        </a:rPr>
-                        <a:t>Week 5</a:t>
-                      </a:r>
-                      <a:endParaRPr lang="en-US" sz="1800">
-                        <a:effectLst/>
-                        <a:latin typeface="Times New Roman" panose="02020603050405020304" pitchFamily="18" charset="0"/>
-                        <a:ea typeface="Times New Roman" panose="02020603050405020304" pitchFamily="18" charset="0"/>
-                        <a:cs typeface="Arial" panose="020B0604020202020204" pitchFamily="34" charset="0"/>
-                      </a:endParaRPr>
-                    </a:p>
-                  </a:txBody>
-                  <a:tcPr marL="68580" marR="68580" marT="0" marB="0"/>
-                </a:tc>
-                <a:tc>
-                  <a:txBody>
-                    <a:bodyPr/>
-                    <a:lstStyle/>
-                    <a:p>
-                      <a:pPr marL="0" marR="0">
-                        <a:spcBef>
-                          <a:spcPts val="0"/>
-                        </a:spcBef>
-                        <a:spcAft>
-                          <a:spcPts val="0"/>
-                        </a:spcAft>
-                      </a:pPr>
-                      <a:r>
-                        <a:rPr lang="en-US" sz="1800">
-                          <a:effectLst/>
-                        </a:rPr>
-                        <a:t>Week 7</a:t>
-                      </a:r>
-                      <a:endParaRPr lang="en-US" sz="1800">
-                        <a:effectLst/>
-                        <a:latin typeface="Times New Roman" panose="02020603050405020304" pitchFamily="18" charset="0"/>
-                        <a:ea typeface="Times New Roman" panose="02020603050405020304" pitchFamily="18" charset="0"/>
-                        <a:cs typeface="Arial" panose="020B0604020202020204" pitchFamily="34" charset="0"/>
-                      </a:endParaRPr>
-                    </a:p>
-                  </a:txBody>
-                  <a:tcPr marL="68580" marR="68580" marT="0" marB="0"/>
-                </a:tc>
-                <a:extLst>
-                  <a:ext uri="{0D108BD9-81ED-4DB2-BD59-A6C34878D82A}">
-                    <a16:rowId xmlns:a16="http://schemas.microsoft.com/office/drawing/2014/main" val="389244117"/>
-                  </a:ext>
-                </a:extLst>
-              </a:tr>
-              <a:tr h="495403">
-                <a:tc>
-                  <a:txBody>
-                    <a:bodyPr/>
-                    <a:lstStyle/>
-                    <a:p>
-                      <a:pPr marL="0" marR="0">
-                        <a:spcBef>
-                          <a:spcPts val="0"/>
-                        </a:spcBef>
-                        <a:spcAft>
-                          <a:spcPts val="0"/>
-                        </a:spcAft>
-                      </a:pPr>
-                      <a:r>
-                        <a:rPr lang="en-US" sz="2000">
-                          <a:effectLst/>
-                        </a:rPr>
-                        <a:t>2.2 Architecture Setup</a:t>
-                      </a:r>
-                      <a:endParaRPr lang="en-US" sz="2000">
-                        <a:effectLst/>
-                        <a:latin typeface="Times New Roman" panose="02020603050405020304" pitchFamily="18" charset="0"/>
-                        <a:ea typeface="Times New Roman" panose="02020603050405020304" pitchFamily="18" charset="0"/>
-                        <a:cs typeface="Arial" panose="020B0604020202020204" pitchFamily="34" charset="0"/>
-                      </a:endParaRPr>
-                    </a:p>
-                  </a:txBody>
-                  <a:tcPr marL="68580" marR="68580" marT="0" marB="0"/>
-                </a:tc>
-                <a:tc>
-                  <a:txBody>
-                    <a:bodyPr/>
-                    <a:lstStyle/>
-                    <a:p>
-                      <a:pPr marL="0" marR="0">
-                        <a:spcBef>
-                          <a:spcPts val="0"/>
-                        </a:spcBef>
-                        <a:spcAft>
-                          <a:spcPts val="0"/>
-                        </a:spcAft>
-                      </a:pPr>
-                      <a:r>
-                        <a:rPr lang="en-US" sz="1800">
-                          <a:effectLst/>
-                        </a:rPr>
-                        <a:t>2 Weeks</a:t>
-                      </a:r>
-                      <a:endParaRPr lang="en-US" sz="1800">
-                        <a:effectLst/>
-                        <a:latin typeface="Times New Roman" panose="02020603050405020304" pitchFamily="18" charset="0"/>
-                        <a:ea typeface="Times New Roman" panose="02020603050405020304" pitchFamily="18" charset="0"/>
-                        <a:cs typeface="Arial" panose="020B0604020202020204" pitchFamily="34" charset="0"/>
-                      </a:endParaRPr>
-                    </a:p>
-                  </a:txBody>
-                  <a:tcPr marL="68580" marR="68580" marT="0" marB="0"/>
-                </a:tc>
-                <a:tc>
-                  <a:txBody>
-                    <a:bodyPr/>
-                    <a:lstStyle/>
-                    <a:p>
-                      <a:pPr marL="0" marR="0">
-                        <a:spcBef>
-                          <a:spcPts val="0"/>
-                        </a:spcBef>
-                        <a:spcAft>
-                          <a:spcPts val="0"/>
-                        </a:spcAft>
-                      </a:pPr>
-                      <a:r>
-                        <a:rPr lang="en-US" sz="1800">
-                          <a:effectLst/>
-                        </a:rPr>
-                        <a:t>Week 8</a:t>
-                      </a:r>
-                      <a:endParaRPr lang="en-US" sz="1800">
-                        <a:effectLst/>
-                        <a:latin typeface="Times New Roman" panose="02020603050405020304" pitchFamily="18" charset="0"/>
-                        <a:ea typeface="Times New Roman" panose="02020603050405020304" pitchFamily="18" charset="0"/>
-                        <a:cs typeface="Arial" panose="020B0604020202020204" pitchFamily="34" charset="0"/>
-                      </a:endParaRPr>
-                    </a:p>
-                  </a:txBody>
-                  <a:tcPr marL="68580" marR="68580" marT="0" marB="0"/>
-                </a:tc>
-                <a:tc>
-                  <a:txBody>
-                    <a:bodyPr/>
-                    <a:lstStyle/>
-                    <a:p>
-                      <a:pPr marL="0" marR="0">
-                        <a:spcBef>
-                          <a:spcPts val="0"/>
-                        </a:spcBef>
-                        <a:spcAft>
-                          <a:spcPts val="0"/>
-                        </a:spcAft>
-                      </a:pPr>
-                      <a:r>
-                        <a:rPr lang="en-US" sz="1800">
-                          <a:effectLst/>
-                        </a:rPr>
-                        <a:t>Week 10</a:t>
-                      </a:r>
-                      <a:endParaRPr lang="en-US" sz="1800">
-                        <a:effectLst/>
-                        <a:latin typeface="Times New Roman" panose="02020603050405020304" pitchFamily="18" charset="0"/>
-                        <a:ea typeface="Times New Roman" panose="02020603050405020304" pitchFamily="18" charset="0"/>
-                        <a:cs typeface="Arial" panose="020B0604020202020204" pitchFamily="34" charset="0"/>
-                      </a:endParaRPr>
-                    </a:p>
-                  </a:txBody>
-                  <a:tcPr marL="68580" marR="68580" marT="0" marB="0"/>
-                </a:tc>
-                <a:extLst>
-                  <a:ext uri="{0D108BD9-81ED-4DB2-BD59-A6C34878D82A}">
-                    <a16:rowId xmlns:a16="http://schemas.microsoft.com/office/drawing/2014/main" val="1536402244"/>
-                  </a:ext>
-                </a:extLst>
-              </a:tr>
-              <a:tr h="768161">
-                <a:tc>
-                  <a:txBody>
-                    <a:bodyPr/>
-                    <a:lstStyle/>
-                    <a:p>
-                      <a:pPr marL="0" marR="0">
-                        <a:spcBef>
-                          <a:spcPts val="0"/>
-                        </a:spcBef>
-                        <a:spcAft>
-                          <a:spcPts val="0"/>
-                        </a:spcAft>
-                      </a:pPr>
-                      <a:r>
-                        <a:rPr lang="en-US" sz="2000" dirty="0">
-                          <a:effectLst/>
-                        </a:rPr>
-                        <a:t>2.3 AI-Enhanced Documentation Design</a:t>
-                      </a:r>
-                      <a:endParaRPr lang="en-US" sz="2000" dirty="0">
-                        <a:effectLst/>
-                        <a:latin typeface="Times New Roman" panose="02020603050405020304" pitchFamily="18" charset="0"/>
-                        <a:ea typeface="Times New Roman" panose="02020603050405020304" pitchFamily="18" charset="0"/>
-                        <a:cs typeface="Arial" panose="020B0604020202020204" pitchFamily="34" charset="0"/>
-                      </a:endParaRPr>
-                    </a:p>
-                  </a:txBody>
-                  <a:tcPr marL="68580" marR="68580" marT="0" marB="0"/>
-                </a:tc>
-                <a:tc>
-                  <a:txBody>
-                    <a:bodyPr/>
-                    <a:lstStyle/>
-                    <a:p>
-                      <a:pPr marL="0" marR="0">
-                        <a:spcBef>
-                          <a:spcPts val="0"/>
-                        </a:spcBef>
-                        <a:spcAft>
-                          <a:spcPts val="0"/>
-                        </a:spcAft>
-                      </a:pPr>
-                      <a:r>
-                        <a:rPr lang="en-US" sz="1800">
-                          <a:effectLst/>
-                        </a:rPr>
-                        <a:t>1 Week</a:t>
-                      </a:r>
-                      <a:endParaRPr lang="en-US" sz="1800">
-                        <a:effectLst/>
-                        <a:latin typeface="Times New Roman" panose="02020603050405020304" pitchFamily="18" charset="0"/>
-                        <a:ea typeface="Times New Roman" panose="02020603050405020304" pitchFamily="18" charset="0"/>
-                        <a:cs typeface="Arial" panose="020B0604020202020204" pitchFamily="34" charset="0"/>
-                      </a:endParaRPr>
-                    </a:p>
-                  </a:txBody>
-                  <a:tcPr marL="68580" marR="68580" marT="0" marB="0"/>
-                </a:tc>
-                <a:tc>
-                  <a:txBody>
-                    <a:bodyPr/>
-                    <a:lstStyle/>
-                    <a:p>
-                      <a:pPr marL="0" marR="0">
-                        <a:spcBef>
-                          <a:spcPts val="0"/>
-                        </a:spcBef>
-                        <a:spcAft>
-                          <a:spcPts val="0"/>
-                        </a:spcAft>
-                      </a:pPr>
-                      <a:r>
-                        <a:rPr lang="en-US" sz="1800" dirty="0">
-                          <a:effectLst/>
-                        </a:rPr>
-                        <a:t>Week 11</a:t>
-                      </a:r>
-                      <a:endParaRPr lang="en-US" sz="1800" dirty="0">
-                        <a:effectLst/>
-                        <a:latin typeface="Times New Roman" panose="02020603050405020304" pitchFamily="18" charset="0"/>
-                        <a:ea typeface="Times New Roman" panose="02020603050405020304" pitchFamily="18" charset="0"/>
-                        <a:cs typeface="Arial" panose="020B0604020202020204" pitchFamily="34" charset="0"/>
-                      </a:endParaRPr>
-                    </a:p>
-                  </a:txBody>
-                  <a:tcPr marL="68580" marR="68580" marT="0" marB="0"/>
-                </a:tc>
-                <a:tc>
-                  <a:txBody>
-                    <a:bodyPr/>
-                    <a:lstStyle/>
-                    <a:p>
-                      <a:pPr marL="0" marR="0">
-                        <a:spcBef>
-                          <a:spcPts val="0"/>
-                        </a:spcBef>
-                        <a:spcAft>
-                          <a:spcPts val="0"/>
-                        </a:spcAft>
-                      </a:pPr>
-                      <a:r>
-                        <a:rPr lang="en-US" sz="1800" dirty="0">
-                          <a:effectLst/>
-                        </a:rPr>
-                        <a:t>Week 12</a:t>
-                      </a:r>
-                      <a:endParaRPr lang="en-US" sz="1800" dirty="0">
-                        <a:effectLst/>
-                        <a:latin typeface="Times New Roman" panose="02020603050405020304" pitchFamily="18" charset="0"/>
-                        <a:ea typeface="Times New Roman" panose="02020603050405020304" pitchFamily="18" charset="0"/>
-                        <a:cs typeface="Arial" panose="020B0604020202020204" pitchFamily="34" charset="0"/>
-                      </a:endParaRPr>
-                    </a:p>
-                  </a:txBody>
-                  <a:tcPr marL="68580" marR="68580" marT="0" marB="0"/>
-                </a:tc>
-                <a:extLst>
-                  <a:ext uri="{0D108BD9-81ED-4DB2-BD59-A6C34878D82A}">
-                    <a16:rowId xmlns:a16="http://schemas.microsoft.com/office/drawing/2014/main" val="2637470980"/>
-                  </a:ext>
-                </a:extLst>
-              </a:tr>
-            </a:tbl>
-          </a:graphicData>
-        </a:graphic>
-      </p:graphicFrame>
-    </p:spTree>
-    <p:extLst>
-      <p:ext uri="{BB962C8B-B14F-4D97-AF65-F5344CB8AC3E}">
-        <p14:creationId xmlns:p14="http://schemas.microsoft.com/office/powerpoint/2010/main" val="3950030264"/>
-      </p:ext>
-    </p:extLst>
-  </p:cSld>
-  <p:clrMapOvr>
-    <a:masterClrMapping/>
-  </p:clrMapOvr>
-</p:sld>
-</file>
-
-<file path=ppt/slides/slide18.xml><?xml version="1.0" encoding="utf-8"?>
-<p:sld xmlns:a="http://schemas.openxmlformats.org/drawingml/2006/main" xmlns:r="http://schemas.openxmlformats.org/officeDocument/2006/relationships" xmlns:p="http://schemas.openxmlformats.org/presentationml/2006/main">
-  <p:cSld>
-    <p:spTree>
-      <p:nvGrpSpPr>
-        <p:cNvPr id="1" name=""/>
-        <p:cNvGrpSpPr/>
-        <p:nvPr/>
-      </p:nvGrpSpPr>
-      <p:grpSpPr>
-        <a:xfrm>
-          <a:off x="0" y="0"/>
-          <a:ext cx="0" cy="0"/>
-          <a:chOff x="0" y="0"/>
-          <a:chExt cx="0" cy="0"/>
-        </a:xfrm>
-      </p:grpSpPr>
-      <p:sp>
-        <p:nvSpPr>
-          <p:cNvPr id="2" name="Title 1">
-            <a:extLst>
-              <a:ext uri="{FF2B5EF4-FFF2-40B4-BE49-F238E27FC236}">
                 <a16:creationId xmlns:a16="http://schemas.microsoft.com/office/drawing/2014/main" id="{92A4725C-21AB-DC2F-374A-3B92524835A1}"/>
               </a:ext>
             </a:extLst>
@@ -8474,9 +6332,16 @@
             <p:ph type="title"/>
           </p:nvPr>
         </p:nvSpPr>
-        <p:spPr/>
+        <p:spPr>
+          <a:xfrm>
+            <a:off x="0" y="0"/>
+            <a:ext cx="9144000" cy="1143000"/>
+          </a:xfrm>
+        </p:spPr>
         <p:txBody>
-          <a:bodyPr/>
+          <a:bodyPr anchor="ctr">
+            <a:normAutofit/>
+          </a:bodyPr>
           <a:lstStyle/>
           <a:p>
             <a:r>
@@ -8486,1055 +6351,41 @@
           </a:p>
         </p:txBody>
       </p:sp>
-      <p:graphicFrame>
-        <p:nvGraphicFramePr>
-          <p:cNvPr id="4" name="Content Placeholder 3">
+      <p:pic>
+        <p:nvPicPr>
+          <p:cNvPr id="7" name="Content Placeholder 6" descr="A blue and orange software&#10;&#10;Description automatically generated">
             <a:extLst>
               <a:ext uri="{FF2B5EF4-FFF2-40B4-BE49-F238E27FC236}">
-                <a16:creationId xmlns:a16="http://schemas.microsoft.com/office/drawing/2014/main" id="{4B790444-56B2-EE75-F094-0EB945129FB0}"/>
+                <a16:creationId xmlns:a16="http://schemas.microsoft.com/office/drawing/2014/main" id="{FC008ECA-CAF3-0450-6D70-C6148F10703A}"/>
               </a:ext>
             </a:extLst>
           </p:cNvPr>
-          <p:cNvGraphicFramePr>
-            <a:graphicFrameLocks noGrp="1"/>
-          </p:cNvGraphicFramePr>
+          <p:cNvPicPr>
+            <a:picLocks noGrp="1" noChangeAspect="1"/>
+          </p:cNvPicPr>
           <p:nvPr>
             <p:ph idx="1"/>
-            <p:extLst>
-              <p:ext uri="{D42A27DB-BD31-4B8C-83A1-F6EECF244321}">
-                <p14:modId xmlns:p14="http://schemas.microsoft.com/office/powerpoint/2010/main" val="1374347455"/>
-              </p:ext>
-            </p:extLst>
           </p:nvPr>
-        </p:nvGraphicFramePr>
-        <p:xfrm>
-          <a:off x="228600" y="1447800"/>
-          <a:ext cx="8305800" cy="4993341"/>
-        </p:xfrm>
-        <a:graphic>
-          <a:graphicData uri="http://schemas.openxmlformats.org/drawingml/2006/table">
-            <a:tbl>
-              <a:tblPr firstRow="1" firstCol="1" bandRow="1">
-                <a:tableStyleId>{5C22544A-7EE6-4342-B048-85BDC9FD1C3A}</a:tableStyleId>
-              </a:tblPr>
-              <a:tblGrid>
-                <a:gridCol w="4343400">
-                  <a:extLst>
-                    <a:ext uri="{9D8B030D-6E8A-4147-A177-3AD203B41FA5}">
-                      <a16:colId xmlns:a16="http://schemas.microsoft.com/office/drawing/2014/main" val="1234622090"/>
-                    </a:ext>
-                  </a:extLst>
-                </a:gridCol>
-                <a:gridCol w="1219200">
-                  <a:extLst>
-                    <a:ext uri="{9D8B030D-6E8A-4147-A177-3AD203B41FA5}">
-                      <a16:colId xmlns:a16="http://schemas.microsoft.com/office/drawing/2014/main" val="3308880609"/>
-                    </a:ext>
-                  </a:extLst>
-                </a:gridCol>
-                <a:gridCol w="1295400">
-                  <a:extLst>
-                    <a:ext uri="{9D8B030D-6E8A-4147-A177-3AD203B41FA5}">
-                      <a16:colId xmlns:a16="http://schemas.microsoft.com/office/drawing/2014/main" val="2824705506"/>
-                    </a:ext>
-                  </a:extLst>
-                </a:gridCol>
-                <a:gridCol w="1447800">
-                  <a:extLst>
-                    <a:ext uri="{9D8B030D-6E8A-4147-A177-3AD203B41FA5}">
-                      <a16:colId xmlns:a16="http://schemas.microsoft.com/office/drawing/2014/main" val="380900696"/>
-                    </a:ext>
-                  </a:extLst>
-                </a:gridCol>
-              </a:tblGrid>
-              <a:tr h="292249">
-                <a:tc>
-                  <a:txBody>
-                    <a:bodyPr/>
-                    <a:lstStyle/>
-                    <a:p>
-                      <a:pPr marL="0" marR="0">
-                        <a:spcBef>
-                          <a:spcPts val="0"/>
-                        </a:spcBef>
-                        <a:spcAft>
-                          <a:spcPts val="0"/>
-                        </a:spcAft>
-                      </a:pPr>
-                      <a:r>
-                        <a:rPr lang="en-US" sz="2000">
-                          <a:effectLst/>
-                        </a:rPr>
-                        <a:t>3. Development</a:t>
-                      </a:r>
-                      <a:endParaRPr lang="en-US" sz="2000">
-                        <a:effectLst/>
-                        <a:latin typeface="Times New Roman" panose="02020603050405020304" pitchFamily="18" charset="0"/>
-                        <a:ea typeface="Times New Roman" panose="02020603050405020304" pitchFamily="18" charset="0"/>
-                        <a:cs typeface="Arial" panose="020B0604020202020204" pitchFamily="34" charset="0"/>
-                      </a:endParaRPr>
-                    </a:p>
-                  </a:txBody>
-                  <a:tcPr marL="68580" marR="68580" marT="0" marB="0"/>
-                </a:tc>
-                <a:tc>
-                  <a:txBody>
-                    <a:bodyPr/>
-                    <a:lstStyle/>
-                    <a:p>
-                      <a:pPr marL="0" marR="0">
-                        <a:spcBef>
-                          <a:spcPts val="0"/>
-                        </a:spcBef>
-                        <a:spcAft>
-                          <a:spcPts val="0"/>
-                        </a:spcAft>
-                      </a:pPr>
-                      <a:r>
-                        <a:rPr lang="en-US" sz="1800">
-                          <a:effectLst/>
-                        </a:rPr>
-                        <a:t>12 Weeks</a:t>
-                      </a:r>
-                      <a:endParaRPr lang="en-US" sz="1800">
-                        <a:effectLst/>
-                        <a:latin typeface="Times New Roman" panose="02020603050405020304" pitchFamily="18" charset="0"/>
-                        <a:ea typeface="Times New Roman" panose="02020603050405020304" pitchFamily="18" charset="0"/>
-                        <a:cs typeface="Arial" panose="020B0604020202020204" pitchFamily="34" charset="0"/>
-                      </a:endParaRPr>
-                    </a:p>
-                  </a:txBody>
-                  <a:tcPr marL="68580" marR="68580" marT="0" marB="0"/>
-                </a:tc>
-                <a:tc>
-                  <a:txBody>
-                    <a:bodyPr/>
-                    <a:lstStyle/>
-                    <a:p>
-                      <a:pPr marL="0" marR="0">
-                        <a:spcBef>
-                          <a:spcPts val="0"/>
-                        </a:spcBef>
-                        <a:spcAft>
-                          <a:spcPts val="0"/>
-                        </a:spcAft>
-                      </a:pPr>
-                      <a:r>
-                        <a:rPr lang="en-US" sz="1800">
-                          <a:effectLst/>
-                        </a:rPr>
-                        <a:t>Month 3</a:t>
-                      </a:r>
-                      <a:endParaRPr lang="en-US" sz="1800">
-                        <a:effectLst/>
-                        <a:latin typeface="Times New Roman" panose="02020603050405020304" pitchFamily="18" charset="0"/>
-                        <a:ea typeface="Times New Roman" panose="02020603050405020304" pitchFamily="18" charset="0"/>
-                        <a:cs typeface="Arial" panose="020B0604020202020204" pitchFamily="34" charset="0"/>
-                      </a:endParaRPr>
-                    </a:p>
-                  </a:txBody>
-                  <a:tcPr marL="68580" marR="68580" marT="0" marB="0"/>
-                </a:tc>
-                <a:tc>
-                  <a:txBody>
-                    <a:bodyPr/>
-                    <a:lstStyle/>
-                    <a:p>
-                      <a:pPr marL="0" marR="0">
-                        <a:spcBef>
-                          <a:spcPts val="0"/>
-                        </a:spcBef>
-                        <a:spcAft>
-                          <a:spcPts val="0"/>
-                        </a:spcAft>
-                      </a:pPr>
-                      <a:r>
-                        <a:rPr lang="en-US" sz="1800">
-                          <a:effectLst/>
-                        </a:rPr>
-                        <a:t>Month 5</a:t>
-                      </a:r>
-                      <a:endParaRPr lang="en-US" sz="1800">
-                        <a:effectLst/>
-                        <a:latin typeface="Times New Roman" panose="02020603050405020304" pitchFamily="18" charset="0"/>
-                        <a:ea typeface="Times New Roman" panose="02020603050405020304" pitchFamily="18" charset="0"/>
-                        <a:cs typeface="Arial" panose="020B0604020202020204" pitchFamily="34" charset="0"/>
-                      </a:endParaRPr>
-                    </a:p>
-                  </a:txBody>
-                  <a:tcPr marL="68580" marR="68580" marT="0" marB="0"/>
-                </a:tc>
-                <a:extLst>
-                  <a:ext uri="{0D108BD9-81ED-4DB2-BD59-A6C34878D82A}">
-                    <a16:rowId xmlns:a16="http://schemas.microsoft.com/office/drawing/2014/main" val="431597837"/>
-                  </a:ext>
-                </a:extLst>
-              </a:tr>
-              <a:tr h="876748">
-                <a:tc>
-                  <a:txBody>
-                    <a:bodyPr/>
-                    <a:lstStyle/>
-                    <a:p>
-                      <a:pPr marL="0" marR="0">
-                        <a:spcBef>
-                          <a:spcPts val="0"/>
-                        </a:spcBef>
-                        <a:spcAft>
-                          <a:spcPts val="0"/>
-                        </a:spcAft>
-                      </a:pPr>
-                      <a:r>
-                        <a:rPr lang="en-US" sz="2000">
-                          <a:effectLst/>
-                        </a:rPr>
-                        <a:t>3.1 Frontend Development (React.js)</a:t>
-                      </a:r>
-                      <a:endParaRPr lang="en-US" sz="2000">
-                        <a:effectLst/>
-                        <a:latin typeface="Times New Roman" panose="02020603050405020304" pitchFamily="18" charset="0"/>
-                        <a:ea typeface="Times New Roman" panose="02020603050405020304" pitchFamily="18" charset="0"/>
-                        <a:cs typeface="Arial" panose="020B0604020202020204" pitchFamily="34" charset="0"/>
-                      </a:endParaRPr>
-                    </a:p>
-                  </a:txBody>
-                  <a:tcPr marL="68580" marR="68580" marT="0" marB="0"/>
-                </a:tc>
-                <a:tc>
-                  <a:txBody>
-                    <a:bodyPr/>
-                    <a:lstStyle/>
-                    <a:p>
-                      <a:pPr marL="0" marR="0">
-                        <a:spcBef>
-                          <a:spcPts val="0"/>
-                        </a:spcBef>
-                        <a:spcAft>
-                          <a:spcPts val="0"/>
-                        </a:spcAft>
-                      </a:pPr>
-                      <a:r>
-                        <a:rPr lang="en-US" sz="1800">
-                          <a:effectLst/>
-                        </a:rPr>
-                        <a:t>6 Weeks</a:t>
-                      </a:r>
-                      <a:endParaRPr lang="en-US" sz="1800">
-                        <a:effectLst/>
-                        <a:latin typeface="Times New Roman" panose="02020603050405020304" pitchFamily="18" charset="0"/>
-                        <a:ea typeface="Times New Roman" panose="02020603050405020304" pitchFamily="18" charset="0"/>
-                        <a:cs typeface="Arial" panose="020B0604020202020204" pitchFamily="34" charset="0"/>
-                      </a:endParaRPr>
-                    </a:p>
-                  </a:txBody>
-                  <a:tcPr marL="68580" marR="68580" marT="0" marB="0"/>
-                </a:tc>
-                <a:tc>
-                  <a:txBody>
-                    <a:bodyPr/>
-                    <a:lstStyle/>
-                    <a:p>
-                      <a:pPr marL="0" marR="0">
-                        <a:spcBef>
-                          <a:spcPts val="0"/>
-                        </a:spcBef>
-                        <a:spcAft>
-                          <a:spcPts val="0"/>
-                        </a:spcAft>
-                      </a:pPr>
-                      <a:r>
-                        <a:rPr lang="en-US" sz="1800">
-                          <a:effectLst/>
-                        </a:rPr>
-                        <a:t>Week 13</a:t>
-                      </a:r>
-                      <a:endParaRPr lang="en-US" sz="1800">
-                        <a:effectLst/>
-                        <a:latin typeface="Times New Roman" panose="02020603050405020304" pitchFamily="18" charset="0"/>
-                        <a:ea typeface="Times New Roman" panose="02020603050405020304" pitchFamily="18" charset="0"/>
-                        <a:cs typeface="Arial" panose="020B0604020202020204" pitchFamily="34" charset="0"/>
-                      </a:endParaRPr>
-                    </a:p>
-                  </a:txBody>
-                  <a:tcPr marL="68580" marR="68580" marT="0" marB="0"/>
-                </a:tc>
-                <a:tc>
-                  <a:txBody>
-                    <a:bodyPr/>
-                    <a:lstStyle/>
-                    <a:p>
-                      <a:pPr marL="0" marR="0">
-                        <a:spcBef>
-                          <a:spcPts val="0"/>
-                        </a:spcBef>
-                        <a:spcAft>
-                          <a:spcPts val="0"/>
-                        </a:spcAft>
-                      </a:pPr>
-                      <a:r>
-                        <a:rPr lang="en-US" sz="1800">
-                          <a:effectLst/>
-                        </a:rPr>
-                        <a:t>Week 19</a:t>
-                      </a:r>
-                      <a:endParaRPr lang="en-US" sz="1800">
-                        <a:effectLst/>
-                        <a:latin typeface="Times New Roman" panose="02020603050405020304" pitchFamily="18" charset="0"/>
-                        <a:ea typeface="Times New Roman" panose="02020603050405020304" pitchFamily="18" charset="0"/>
-                        <a:cs typeface="Arial" panose="020B0604020202020204" pitchFamily="34" charset="0"/>
-                      </a:endParaRPr>
-                    </a:p>
-                  </a:txBody>
-                  <a:tcPr marL="68580" marR="68580" marT="0" marB="0"/>
-                </a:tc>
-                <a:extLst>
-                  <a:ext uri="{0D108BD9-81ED-4DB2-BD59-A6C34878D82A}">
-                    <a16:rowId xmlns:a16="http://schemas.microsoft.com/office/drawing/2014/main" val="1544197216"/>
-                  </a:ext>
-                </a:extLst>
-              </a:tr>
-              <a:tr h="876748">
-                <a:tc>
-                  <a:txBody>
-                    <a:bodyPr/>
-                    <a:lstStyle/>
-                    <a:p>
-                      <a:pPr marL="0" marR="0">
-                        <a:spcBef>
-                          <a:spcPts val="0"/>
-                        </a:spcBef>
-                        <a:spcAft>
-                          <a:spcPts val="0"/>
-                        </a:spcAft>
-                      </a:pPr>
-                      <a:r>
-                        <a:rPr lang="en-US" sz="2000">
-                          <a:effectLst/>
-                        </a:rPr>
-                        <a:t>3.2 Backend Development (Firebase)</a:t>
-                      </a:r>
-                      <a:endParaRPr lang="en-US" sz="2000">
-                        <a:effectLst/>
-                        <a:latin typeface="Times New Roman" panose="02020603050405020304" pitchFamily="18" charset="0"/>
-                        <a:ea typeface="Times New Roman" panose="02020603050405020304" pitchFamily="18" charset="0"/>
-                        <a:cs typeface="Arial" panose="020B0604020202020204" pitchFamily="34" charset="0"/>
-                      </a:endParaRPr>
-                    </a:p>
-                  </a:txBody>
-                  <a:tcPr marL="68580" marR="68580" marT="0" marB="0"/>
-                </a:tc>
-                <a:tc>
-                  <a:txBody>
-                    <a:bodyPr/>
-                    <a:lstStyle/>
-                    <a:p>
-                      <a:pPr marL="0" marR="0">
-                        <a:spcBef>
-                          <a:spcPts val="0"/>
-                        </a:spcBef>
-                        <a:spcAft>
-                          <a:spcPts val="0"/>
-                        </a:spcAft>
-                      </a:pPr>
-                      <a:r>
-                        <a:rPr lang="en-US" sz="1800">
-                          <a:effectLst/>
-                        </a:rPr>
-                        <a:t>8 Weeks</a:t>
-                      </a:r>
-                      <a:endParaRPr lang="en-US" sz="1800">
-                        <a:effectLst/>
-                        <a:latin typeface="Times New Roman" panose="02020603050405020304" pitchFamily="18" charset="0"/>
-                        <a:ea typeface="Times New Roman" panose="02020603050405020304" pitchFamily="18" charset="0"/>
-                        <a:cs typeface="Arial" panose="020B0604020202020204" pitchFamily="34" charset="0"/>
-                      </a:endParaRPr>
-                    </a:p>
-                  </a:txBody>
-                  <a:tcPr marL="68580" marR="68580" marT="0" marB="0"/>
-                </a:tc>
-                <a:tc>
-                  <a:txBody>
-                    <a:bodyPr/>
-                    <a:lstStyle/>
-                    <a:p>
-                      <a:pPr marL="0" marR="0">
-                        <a:spcBef>
-                          <a:spcPts val="0"/>
-                        </a:spcBef>
-                        <a:spcAft>
-                          <a:spcPts val="0"/>
-                        </a:spcAft>
-                      </a:pPr>
-                      <a:r>
-                        <a:rPr lang="en-US" sz="1800">
-                          <a:effectLst/>
-                        </a:rPr>
-                        <a:t>Week 13</a:t>
-                      </a:r>
-                      <a:endParaRPr lang="en-US" sz="1800">
-                        <a:effectLst/>
-                        <a:latin typeface="Times New Roman" panose="02020603050405020304" pitchFamily="18" charset="0"/>
-                        <a:ea typeface="Times New Roman" panose="02020603050405020304" pitchFamily="18" charset="0"/>
-                        <a:cs typeface="Arial" panose="020B0604020202020204" pitchFamily="34" charset="0"/>
-                      </a:endParaRPr>
-                    </a:p>
-                  </a:txBody>
-                  <a:tcPr marL="68580" marR="68580" marT="0" marB="0"/>
-                </a:tc>
-                <a:tc>
-                  <a:txBody>
-                    <a:bodyPr/>
-                    <a:lstStyle/>
-                    <a:p>
-                      <a:pPr marL="0" marR="0">
-                        <a:spcBef>
-                          <a:spcPts val="0"/>
-                        </a:spcBef>
-                        <a:spcAft>
-                          <a:spcPts val="0"/>
-                        </a:spcAft>
-                      </a:pPr>
-                      <a:r>
-                        <a:rPr lang="en-US" sz="1800">
-                          <a:effectLst/>
-                        </a:rPr>
-                        <a:t>Week 21</a:t>
-                      </a:r>
-                      <a:endParaRPr lang="en-US" sz="1800">
-                        <a:effectLst/>
-                        <a:latin typeface="Times New Roman" panose="02020603050405020304" pitchFamily="18" charset="0"/>
-                        <a:ea typeface="Times New Roman" panose="02020603050405020304" pitchFamily="18" charset="0"/>
-                        <a:cs typeface="Arial" panose="020B0604020202020204" pitchFamily="34" charset="0"/>
-                      </a:endParaRPr>
-                    </a:p>
-                  </a:txBody>
-                  <a:tcPr marL="68580" marR="68580" marT="0" marB="0"/>
-                </a:tc>
-                <a:extLst>
-                  <a:ext uri="{0D108BD9-81ED-4DB2-BD59-A6C34878D82A}">
-                    <a16:rowId xmlns:a16="http://schemas.microsoft.com/office/drawing/2014/main" val="190337436"/>
-                  </a:ext>
-                </a:extLst>
-              </a:tr>
-              <a:tr h="876748">
-                <a:tc>
-                  <a:txBody>
-                    <a:bodyPr/>
-                    <a:lstStyle/>
-                    <a:p>
-                      <a:pPr marL="0" marR="0">
-                        <a:spcBef>
-                          <a:spcPts val="0"/>
-                        </a:spcBef>
-                        <a:spcAft>
-                          <a:spcPts val="0"/>
-                        </a:spcAft>
-                      </a:pPr>
-                      <a:r>
-                        <a:rPr lang="en-US" sz="2000">
-                          <a:effectLst/>
-                        </a:rPr>
-                        <a:t>3.3 Mobile App Development (React Native)</a:t>
-                      </a:r>
-                      <a:endParaRPr lang="en-US" sz="2000">
-                        <a:effectLst/>
-                        <a:latin typeface="Times New Roman" panose="02020603050405020304" pitchFamily="18" charset="0"/>
-                        <a:ea typeface="Times New Roman" panose="02020603050405020304" pitchFamily="18" charset="0"/>
-                        <a:cs typeface="Arial" panose="020B0604020202020204" pitchFamily="34" charset="0"/>
-                      </a:endParaRPr>
-                    </a:p>
-                  </a:txBody>
-                  <a:tcPr marL="68580" marR="68580" marT="0" marB="0"/>
-                </a:tc>
-                <a:tc>
-                  <a:txBody>
-                    <a:bodyPr/>
-                    <a:lstStyle/>
-                    <a:p>
-                      <a:pPr marL="0" marR="0">
-                        <a:spcBef>
-                          <a:spcPts val="0"/>
-                        </a:spcBef>
-                        <a:spcAft>
-                          <a:spcPts val="0"/>
-                        </a:spcAft>
-                      </a:pPr>
-                      <a:r>
-                        <a:rPr lang="en-US" sz="1800">
-                          <a:effectLst/>
-                        </a:rPr>
-                        <a:t>4 Weeks</a:t>
-                      </a:r>
-                      <a:endParaRPr lang="en-US" sz="1800">
-                        <a:effectLst/>
-                        <a:latin typeface="Times New Roman" panose="02020603050405020304" pitchFamily="18" charset="0"/>
-                        <a:ea typeface="Times New Roman" panose="02020603050405020304" pitchFamily="18" charset="0"/>
-                        <a:cs typeface="Arial" panose="020B0604020202020204" pitchFamily="34" charset="0"/>
-                      </a:endParaRPr>
-                    </a:p>
-                  </a:txBody>
-                  <a:tcPr marL="68580" marR="68580" marT="0" marB="0"/>
-                </a:tc>
-                <a:tc>
-                  <a:txBody>
-                    <a:bodyPr/>
-                    <a:lstStyle/>
-                    <a:p>
-                      <a:pPr marL="0" marR="0">
-                        <a:spcBef>
-                          <a:spcPts val="0"/>
-                        </a:spcBef>
-                        <a:spcAft>
-                          <a:spcPts val="0"/>
-                        </a:spcAft>
-                      </a:pPr>
-                      <a:r>
-                        <a:rPr lang="en-US" sz="1800">
-                          <a:effectLst/>
-                        </a:rPr>
-                        <a:t>Week 19</a:t>
-                      </a:r>
-                      <a:endParaRPr lang="en-US" sz="1800">
-                        <a:effectLst/>
-                        <a:latin typeface="Times New Roman" panose="02020603050405020304" pitchFamily="18" charset="0"/>
-                        <a:ea typeface="Times New Roman" panose="02020603050405020304" pitchFamily="18" charset="0"/>
-                        <a:cs typeface="Arial" panose="020B0604020202020204" pitchFamily="34" charset="0"/>
-                      </a:endParaRPr>
-                    </a:p>
-                  </a:txBody>
-                  <a:tcPr marL="68580" marR="68580" marT="0" marB="0"/>
-                </a:tc>
-                <a:tc>
-                  <a:txBody>
-                    <a:bodyPr/>
-                    <a:lstStyle/>
-                    <a:p>
-                      <a:pPr marL="0" marR="0">
-                        <a:spcBef>
-                          <a:spcPts val="0"/>
-                        </a:spcBef>
-                        <a:spcAft>
-                          <a:spcPts val="0"/>
-                        </a:spcAft>
-                      </a:pPr>
-                      <a:r>
-                        <a:rPr lang="en-US" sz="1800">
-                          <a:effectLst/>
-                        </a:rPr>
-                        <a:t>Week 23</a:t>
-                      </a:r>
-                      <a:endParaRPr lang="en-US" sz="1800">
-                        <a:effectLst/>
-                        <a:latin typeface="Times New Roman" panose="02020603050405020304" pitchFamily="18" charset="0"/>
-                        <a:ea typeface="Times New Roman" panose="02020603050405020304" pitchFamily="18" charset="0"/>
-                        <a:cs typeface="Arial" panose="020B0604020202020204" pitchFamily="34" charset="0"/>
-                      </a:endParaRPr>
-                    </a:p>
-                  </a:txBody>
-                  <a:tcPr marL="68580" marR="68580" marT="0" marB="0"/>
-                </a:tc>
-                <a:extLst>
-                  <a:ext uri="{0D108BD9-81ED-4DB2-BD59-A6C34878D82A}">
-                    <a16:rowId xmlns:a16="http://schemas.microsoft.com/office/drawing/2014/main" val="473331924"/>
-                  </a:ext>
-                </a:extLst>
-              </a:tr>
-              <a:tr h="584499">
-                <a:tc>
-                  <a:txBody>
-                    <a:bodyPr/>
-                    <a:lstStyle/>
-                    <a:p>
-                      <a:pPr marL="0" marR="0">
-                        <a:spcBef>
-                          <a:spcPts val="0"/>
-                        </a:spcBef>
-                        <a:spcAft>
-                          <a:spcPts val="0"/>
-                        </a:spcAft>
-                      </a:pPr>
-                      <a:r>
-                        <a:rPr lang="en-US" sz="2000">
-                          <a:effectLst/>
-                        </a:rPr>
-                        <a:t>4. Testing and Quality Assurance</a:t>
-                      </a:r>
-                      <a:endParaRPr lang="en-US" sz="2000">
-                        <a:effectLst/>
-                        <a:latin typeface="Times New Roman" panose="02020603050405020304" pitchFamily="18" charset="0"/>
-                        <a:ea typeface="Times New Roman" panose="02020603050405020304" pitchFamily="18" charset="0"/>
-                        <a:cs typeface="Arial" panose="020B0604020202020204" pitchFamily="34" charset="0"/>
-                      </a:endParaRPr>
-                    </a:p>
-                  </a:txBody>
-                  <a:tcPr marL="68580" marR="68580" marT="0" marB="0"/>
-                </a:tc>
-                <a:tc>
-                  <a:txBody>
-                    <a:bodyPr/>
-                    <a:lstStyle/>
-                    <a:p>
-                      <a:pPr marL="0" marR="0">
-                        <a:spcBef>
-                          <a:spcPts val="0"/>
-                        </a:spcBef>
-                        <a:spcAft>
-                          <a:spcPts val="0"/>
-                        </a:spcAft>
-                      </a:pPr>
-                      <a:r>
-                        <a:rPr lang="en-US" sz="1800">
-                          <a:effectLst/>
-                        </a:rPr>
-                        <a:t>4 Weeks</a:t>
-                      </a:r>
-                      <a:endParaRPr lang="en-US" sz="1800">
-                        <a:effectLst/>
-                        <a:latin typeface="Times New Roman" panose="02020603050405020304" pitchFamily="18" charset="0"/>
-                        <a:ea typeface="Times New Roman" panose="02020603050405020304" pitchFamily="18" charset="0"/>
-                        <a:cs typeface="Arial" panose="020B0604020202020204" pitchFamily="34" charset="0"/>
-                      </a:endParaRPr>
-                    </a:p>
-                  </a:txBody>
-                  <a:tcPr marL="68580" marR="68580" marT="0" marB="0"/>
-                </a:tc>
-                <a:tc>
-                  <a:txBody>
-                    <a:bodyPr/>
-                    <a:lstStyle/>
-                    <a:p>
-                      <a:pPr marL="0" marR="0">
-                        <a:spcBef>
-                          <a:spcPts val="0"/>
-                        </a:spcBef>
-                        <a:spcAft>
-                          <a:spcPts val="0"/>
-                        </a:spcAft>
-                      </a:pPr>
-                      <a:r>
-                        <a:rPr lang="en-US" sz="1800">
-                          <a:effectLst/>
-                        </a:rPr>
-                        <a:t>Month 6</a:t>
-                      </a:r>
-                      <a:endParaRPr lang="en-US" sz="1800">
-                        <a:effectLst/>
-                        <a:latin typeface="Times New Roman" panose="02020603050405020304" pitchFamily="18" charset="0"/>
-                        <a:ea typeface="Times New Roman" panose="02020603050405020304" pitchFamily="18" charset="0"/>
-                        <a:cs typeface="Arial" panose="020B0604020202020204" pitchFamily="34" charset="0"/>
-                      </a:endParaRPr>
-                    </a:p>
-                  </a:txBody>
-                  <a:tcPr marL="68580" marR="68580" marT="0" marB="0"/>
-                </a:tc>
-                <a:tc>
-                  <a:txBody>
-                    <a:bodyPr/>
-                    <a:lstStyle/>
-                    <a:p>
-                      <a:pPr marL="0" marR="0">
-                        <a:spcBef>
-                          <a:spcPts val="0"/>
-                        </a:spcBef>
-                        <a:spcAft>
-                          <a:spcPts val="0"/>
-                        </a:spcAft>
-                      </a:pPr>
-                      <a:r>
-                        <a:rPr lang="en-US" sz="1800">
-                          <a:effectLst/>
-                        </a:rPr>
-                        <a:t>Month 5.75</a:t>
-                      </a:r>
-                      <a:endParaRPr lang="en-US" sz="1800">
-                        <a:effectLst/>
-                        <a:latin typeface="Times New Roman" panose="02020603050405020304" pitchFamily="18" charset="0"/>
-                        <a:ea typeface="Times New Roman" panose="02020603050405020304" pitchFamily="18" charset="0"/>
-                        <a:cs typeface="Arial" panose="020B0604020202020204" pitchFamily="34" charset="0"/>
-                      </a:endParaRPr>
-                    </a:p>
-                  </a:txBody>
-                  <a:tcPr marL="68580" marR="68580" marT="0" marB="0"/>
-                </a:tc>
-                <a:extLst>
-                  <a:ext uri="{0D108BD9-81ED-4DB2-BD59-A6C34878D82A}">
-                    <a16:rowId xmlns:a16="http://schemas.microsoft.com/office/drawing/2014/main" val="118609329"/>
-                  </a:ext>
-                </a:extLst>
-              </a:tr>
-              <a:tr h="292249">
-                <a:tc>
-                  <a:txBody>
-                    <a:bodyPr/>
-                    <a:lstStyle/>
-                    <a:p>
-                      <a:pPr marL="0" marR="0">
-                        <a:spcBef>
-                          <a:spcPts val="0"/>
-                        </a:spcBef>
-                        <a:spcAft>
-                          <a:spcPts val="0"/>
-                        </a:spcAft>
-                      </a:pPr>
-                      <a:r>
-                        <a:rPr lang="en-US" sz="2000">
-                          <a:effectLst/>
-                        </a:rPr>
-                        <a:t>4.1 Unit Testing</a:t>
-                      </a:r>
-                      <a:endParaRPr lang="en-US" sz="2000">
-                        <a:effectLst/>
-                        <a:latin typeface="Times New Roman" panose="02020603050405020304" pitchFamily="18" charset="0"/>
-                        <a:ea typeface="Times New Roman" panose="02020603050405020304" pitchFamily="18" charset="0"/>
-                        <a:cs typeface="Arial" panose="020B0604020202020204" pitchFamily="34" charset="0"/>
-                      </a:endParaRPr>
-                    </a:p>
-                  </a:txBody>
-                  <a:tcPr marL="68580" marR="68580" marT="0" marB="0"/>
-                </a:tc>
-                <a:tc>
-                  <a:txBody>
-                    <a:bodyPr/>
-                    <a:lstStyle/>
-                    <a:p>
-                      <a:pPr marL="0" marR="0">
-                        <a:spcBef>
-                          <a:spcPts val="0"/>
-                        </a:spcBef>
-                        <a:spcAft>
-                          <a:spcPts val="0"/>
-                        </a:spcAft>
-                      </a:pPr>
-                      <a:r>
-                        <a:rPr lang="en-US" sz="1800">
-                          <a:effectLst/>
-                        </a:rPr>
-                        <a:t>2 Weeks</a:t>
-                      </a:r>
-                      <a:endParaRPr lang="en-US" sz="1800">
-                        <a:effectLst/>
-                        <a:latin typeface="Times New Roman" panose="02020603050405020304" pitchFamily="18" charset="0"/>
-                        <a:ea typeface="Times New Roman" panose="02020603050405020304" pitchFamily="18" charset="0"/>
-                        <a:cs typeface="Arial" panose="020B0604020202020204" pitchFamily="34" charset="0"/>
-                      </a:endParaRPr>
-                    </a:p>
-                  </a:txBody>
-                  <a:tcPr marL="68580" marR="68580" marT="0" marB="0"/>
-                </a:tc>
-                <a:tc>
-                  <a:txBody>
-                    <a:bodyPr/>
-                    <a:lstStyle/>
-                    <a:p>
-                      <a:pPr marL="0" marR="0">
-                        <a:spcBef>
-                          <a:spcPts val="0"/>
-                        </a:spcBef>
-                        <a:spcAft>
-                          <a:spcPts val="0"/>
-                        </a:spcAft>
-                      </a:pPr>
-                      <a:r>
-                        <a:rPr lang="en-US" sz="1800">
-                          <a:effectLst/>
-                        </a:rPr>
-                        <a:t>Week 21</a:t>
-                      </a:r>
-                      <a:endParaRPr lang="en-US" sz="1800">
-                        <a:effectLst/>
-                        <a:latin typeface="Times New Roman" panose="02020603050405020304" pitchFamily="18" charset="0"/>
-                        <a:ea typeface="Times New Roman" panose="02020603050405020304" pitchFamily="18" charset="0"/>
-                        <a:cs typeface="Arial" panose="020B0604020202020204" pitchFamily="34" charset="0"/>
-                      </a:endParaRPr>
-                    </a:p>
-                  </a:txBody>
-                  <a:tcPr marL="68580" marR="68580" marT="0" marB="0"/>
-                </a:tc>
-                <a:tc>
-                  <a:txBody>
-                    <a:bodyPr/>
-                    <a:lstStyle/>
-                    <a:p>
-                      <a:pPr marL="0" marR="0">
-                        <a:spcBef>
-                          <a:spcPts val="0"/>
-                        </a:spcBef>
-                        <a:spcAft>
-                          <a:spcPts val="0"/>
-                        </a:spcAft>
-                      </a:pPr>
-                      <a:r>
-                        <a:rPr lang="en-US" sz="1800">
-                          <a:effectLst/>
-                        </a:rPr>
-                        <a:t>Week 23</a:t>
-                      </a:r>
-                      <a:endParaRPr lang="en-US" sz="1800">
-                        <a:effectLst/>
-                        <a:latin typeface="Times New Roman" panose="02020603050405020304" pitchFamily="18" charset="0"/>
-                        <a:ea typeface="Times New Roman" panose="02020603050405020304" pitchFamily="18" charset="0"/>
-                        <a:cs typeface="Arial" panose="020B0604020202020204" pitchFamily="34" charset="0"/>
-                      </a:endParaRPr>
-                    </a:p>
-                  </a:txBody>
-                  <a:tcPr marL="68580" marR="68580" marT="0" marB="0"/>
-                </a:tc>
-                <a:extLst>
-                  <a:ext uri="{0D108BD9-81ED-4DB2-BD59-A6C34878D82A}">
-                    <a16:rowId xmlns:a16="http://schemas.microsoft.com/office/drawing/2014/main" val="3409271073"/>
-                  </a:ext>
-                </a:extLst>
-              </a:tr>
-              <a:tr h="584499">
-                <a:tc>
-                  <a:txBody>
-                    <a:bodyPr/>
-                    <a:lstStyle/>
-                    <a:p>
-                      <a:pPr marL="0" marR="0">
-                        <a:spcBef>
-                          <a:spcPts val="0"/>
-                        </a:spcBef>
-                        <a:spcAft>
-                          <a:spcPts val="0"/>
-                        </a:spcAft>
-                      </a:pPr>
-                      <a:r>
-                        <a:rPr lang="en-US" sz="2000">
-                          <a:effectLst/>
-                        </a:rPr>
-                        <a:t>4.2 User Acceptance Testing</a:t>
-                      </a:r>
-                      <a:endParaRPr lang="en-US" sz="2000">
-                        <a:effectLst/>
-                        <a:latin typeface="Times New Roman" panose="02020603050405020304" pitchFamily="18" charset="0"/>
-                        <a:ea typeface="Times New Roman" panose="02020603050405020304" pitchFamily="18" charset="0"/>
-                        <a:cs typeface="Arial" panose="020B0604020202020204" pitchFamily="34" charset="0"/>
-                      </a:endParaRPr>
-                    </a:p>
-                  </a:txBody>
-                  <a:tcPr marL="68580" marR="68580" marT="0" marB="0"/>
-                </a:tc>
-                <a:tc>
-                  <a:txBody>
-                    <a:bodyPr/>
-                    <a:lstStyle/>
-                    <a:p>
-                      <a:pPr marL="0" marR="0">
-                        <a:spcBef>
-                          <a:spcPts val="0"/>
-                        </a:spcBef>
-                        <a:spcAft>
-                          <a:spcPts val="0"/>
-                        </a:spcAft>
-                      </a:pPr>
-                      <a:r>
-                        <a:rPr lang="en-US" sz="1800">
-                          <a:effectLst/>
-                        </a:rPr>
-                        <a:t>2 Weeks</a:t>
-                      </a:r>
-                      <a:endParaRPr lang="en-US" sz="1800">
-                        <a:effectLst/>
-                        <a:latin typeface="Times New Roman" panose="02020603050405020304" pitchFamily="18" charset="0"/>
-                        <a:ea typeface="Times New Roman" panose="02020603050405020304" pitchFamily="18" charset="0"/>
-                        <a:cs typeface="Arial" panose="020B0604020202020204" pitchFamily="34" charset="0"/>
-                      </a:endParaRPr>
-                    </a:p>
-                  </a:txBody>
-                  <a:tcPr marL="68580" marR="68580" marT="0" marB="0"/>
-                </a:tc>
-                <a:tc>
-                  <a:txBody>
-                    <a:bodyPr/>
-                    <a:lstStyle/>
-                    <a:p>
-                      <a:pPr marL="0" marR="0">
-                        <a:spcBef>
-                          <a:spcPts val="0"/>
-                        </a:spcBef>
-                        <a:spcAft>
-                          <a:spcPts val="0"/>
-                        </a:spcAft>
-                      </a:pPr>
-                      <a:r>
-                        <a:rPr lang="en-US" sz="1800">
-                          <a:effectLst/>
-                        </a:rPr>
-                        <a:t>Week 23</a:t>
-                      </a:r>
-                      <a:endParaRPr lang="en-US" sz="1800">
-                        <a:effectLst/>
-                        <a:latin typeface="Times New Roman" panose="02020603050405020304" pitchFamily="18" charset="0"/>
-                        <a:ea typeface="Times New Roman" panose="02020603050405020304" pitchFamily="18" charset="0"/>
-                        <a:cs typeface="Arial" panose="020B0604020202020204" pitchFamily="34" charset="0"/>
-                      </a:endParaRPr>
-                    </a:p>
-                  </a:txBody>
-                  <a:tcPr marL="68580" marR="68580" marT="0" marB="0"/>
-                </a:tc>
-                <a:tc>
-                  <a:txBody>
-                    <a:bodyPr/>
-                    <a:lstStyle/>
-                    <a:p>
-                      <a:pPr marL="0" marR="0">
-                        <a:spcBef>
-                          <a:spcPts val="0"/>
-                        </a:spcBef>
-                        <a:spcAft>
-                          <a:spcPts val="0"/>
-                        </a:spcAft>
-                      </a:pPr>
-                      <a:r>
-                        <a:rPr lang="en-US" sz="1800">
-                          <a:effectLst/>
-                        </a:rPr>
-                        <a:t>Week 25</a:t>
-                      </a:r>
-                      <a:endParaRPr lang="en-US" sz="1800">
-                        <a:effectLst/>
-                        <a:latin typeface="Times New Roman" panose="02020603050405020304" pitchFamily="18" charset="0"/>
-                        <a:ea typeface="Times New Roman" panose="02020603050405020304" pitchFamily="18" charset="0"/>
-                        <a:cs typeface="Arial" panose="020B0604020202020204" pitchFamily="34" charset="0"/>
-                      </a:endParaRPr>
-                    </a:p>
-                  </a:txBody>
-                  <a:tcPr marL="68580" marR="68580" marT="0" marB="0"/>
-                </a:tc>
-                <a:extLst>
-                  <a:ext uri="{0D108BD9-81ED-4DB2-BD59-A6C34878D82A}">
-                    <a16:rowId xmlns:a16="http://schemas.microsoft.com/office/drawing/2014/main" val="3428909020"/>
-                  </a:ext>
-                </a:extLst>
-              </a:tr>
-              <a:tr h="584499">
-                <a:tc>
-                  <a:txBody>
-                    <a:bodyPr/>
-                    <a:lstStyle/>
-                    <a:p>
-                      <a:pPr marL="0" marR="0">
-                        <a:spcBef>
-                          <a:spcPts val="0"/>
-                        </a:spcBef>
-                        <a:spcAft>
-                          <a:spcPts val="0"/>
-                        </a:spcAft>
-                      </a:pPr>
-                      <a:r>
-                        <a:rPr lang="en-US" sz="2000" dirty="0">
-                          <a:effectLst/>
-                        </a:rPr>
-                        <a:t>5. Deployment and Launch</a:t>
-                      </a:r>
-                      <a:endParaRPr lang="en-US" sz="2000" dirty="0">
-                        <a:effectLst/>
-                        <a:latin typeface="Times New Roman" panose="02020603050405020304" pitchFamily="18" charset="0"/>
-                        <a:ea typeface="Times New Roman" panose="02020603050405020304" pitchFamily="18" charset="0"/>
-                        <a:cs typeface="Arial" panose="020B0604020202020204" pitchFamily="34" charset="0"/>
-                      </a:endParaRPr>
-                    </a:p>
-                  </a:txBody>
-                  <a:tcPr marL="68580" marR="68580" marT="0" marB="0"/>
-                </a:tc>
-                <a:tc>
-                  <a:txBody>
-                    <a:bodyPr/>
-                    <a:lstStyle/>
-                    <a:p>
-                      <a:pPr marL="0" marR="0">
-                        <a:spcBef>
-                          <a:spcPts val="0"/>
-                        </a:spcBef>
-                        <a:spcAft>
-                          <a:spcPts val="0"/>
-                        </a:spcAft>
-                      </a:pPr>
-                      <a:r>
-                        <a:rPr lang="en-US" sz="1800">
-                          <a:effectLst/>
-                        </a:rPr>
-                        <a:t>2 Weeks</a:t>
-                      </a:r>
-                      <a:endParaRPr lang="en-US" sz="1800">
-                        <a:effectLst/>
-                        <a:latin typeface="Times New Roman" panose="02020603050405020304" pitchFamily="18" charset="0"/>
-                        <a:ea typeface="Times New Roman" panose="02020603050405020304" pitchFamily="18" charset="0"/>
-                        <a:cs typeface="Arial" panose="020B0604020202020204" pitchFamily="34" charset="0"/>
-                      </a:endParaRPr>
-                    </a:p>
-                  </a:txBody>
-                  <a:tcPr marL="68580" marR="68580" marT="0" marB="0"/>
-                </a:tc>
-                <a:tc>
-                  <a:txBody>
-                    <a:bodyPr/>
-                    <a:lstStyle/>
-                    <a:p>
-                      <a:pPr marL="0" marR="0">
-                        <a:spcBef>
-                          <a:spcPts val="0"/>
-                        </a:spcBef>
-                        <a:spcAft>
-                          <a:spcPts val="0"/>
-                        </a:spcAft>
-                      </a:pPr>
-                      <a:r>
-                        <a:rPr lang="en-US" sz="1800">
-                          <a:effectLst/>
-                        </a:rPr>
-                        <a:t>Month 6.75</a:t>
-                      </a:r>
-                      <a:endParaRPr lang="en-US" sz="1800">
-                        <a:effectLst/>
-                        <a:latin typeface="Times New Roman" panose="02020603050405020304" pitchFamily="18" charset="0"/>
-                        <a:ea typeface="Times New Roman" panose="02020603050405020304" pitchFamily="18" charset="0"/>
-                        <a:cs typeface="Arial" panose="020B0604020202020204" pitchFamily="34" charset="0"/>
-                      </a:endParaRPr>
-                    </a:p>
-                  </a:txBody>
-                  <a:tcPr marL="68580" marR="68580" marT="0" marB="0"/>
-                </a:tc>
-                <a:tc>
-                  <a:txBody>
-                    <a:bodyPr/>
-                    <a:lstStyle/>
-                    <a:p>
-                      <a:pPr marL="0" marR="0">
-                        <a:spcBef>
-                          <a:spcPts val="0"/>
-                        </a:spcBef>
-                        <a:spcAft>
-                          <a:spcPts val="0"/>
-                        </a:spcAft>
-                      </a:pPr>
-                      <a:r>
-                        <a:rPr lang="en-US" sz="1800" dirty="0">
-                          <a:effectLst/>
-                        </a:rPr>
-                        <a:t>Month 7</a:t>
-                      </a:r>
-                      <a:endParaRPr lang="en-US" sz="1800" dirty="0">
-                        <a:effectLst/>
-                        <a:latin typeface="Times New Roman" panose="02020603050405020304" pitchFamily="18" charset="0"/>
-                        <a:ea typeface="Times New Roman" panose="02020603050405020304" pitchFamily="18" charset="0"/>
-                        <a:cs typeface="Arial" panose="020B0604020202020204" pitchFamily="34" charset="0"/>
-                      </a:endParaRPr>
-                    </a:p>
-                  </a:txBody>
-                  <a:tcPr marL="68580" marR="68580" marT="0" marB="0"/>
-                </a:tc>
-                <a:extLst>
-                  <a:ext uri="{0D108BD9-81ED-4DB2-BD59-A6C34878D82A}">
-                    <a16:rowId xmlns:a16="http://schemas.microsoft.com/office/drawing/2014/main" val="4287749573"/>
-                  </a:ext>
-                </a:extLst>
-              </a:tr>
-            </a:tbl>
-          </a:graphicData>
-        </a:graphic>
-      </p:graphicFrame>
+        </p:nvPicPr>
+        <p:blipFill>
+          <a:blip r:embed="rId2">
+            <a:extLst>
+              <a:ext uri="{28A0092B-C50C-407E-A947-70E740481C1C}">
+                <a14:useLocalDpi xmlns:a14="http://schemas.microsoft.com/office/drawing/2010/main" val="0"/>
+              </a:ext>
+            </a:extLst>
+          </a:blip>
+          <a:srcRect t="8334" b="11111"/>
+          <a:stretch/>
+        </p:blipFill>
+        <p:spPr>
+          <a:xfrm>
+            <a:off x="304800" y="1308101"/>
+            <a:ext cx="8610600" cy="5202238"/>
+          </a:xfrm>
+          <a:noFill/>
+        </p:spPr>
+      </p:pic>
     </p:spTree>
     <p:extLst>
       <p:ext uri="{BB962C8B-B14F-4D97-AF65-F5344CB8AC3E}">
@@ -9548,7 +6399,7 @@
 </p:sld>
 </file>
 
-<file path=ppt/slides/slide19.xml><?xml version="1.0" encoding="utf-8"?>
+<file path=ppt/slides/slide17.xml><?xml version="1.0" encoding="utf-8"?>
 <p:sld xmlns:a="http://schemas.openxmlformats.org/drawingml/2006/main" xmlns:r="http://schemas.openxmlformats.org/officeDocument/2006/relationships" xmlns:p="http://schemas.openxmlformats.org/presentationml/2006/main">
   <p:cSld>
     <p:spTree>
@@ -9958,6 +6809,172 @@
     <p:extLst>
       <p:ext uri="{BB962C8B-B14F-4D97-AF65-F5344CB8AC3E}">
         <p14:creationId xmlns:p14="http://schemas.microsoft.com/office/powerpoint/2010/main" val="1055566154"/>
+      </p:ext>
+    </p:extLst>
+  </p:cSld>
+  <p:clrMapOvr>
+    <a:masterClrMapping/>
+  </p:clrMapOvr>
+</p:sld>
+</file>
+
+<file path=ppt/slides/slide18.xml><?xml version="1.0" encoding="utf-8"?>
+<p:sld xmlns:a="http://schemas.openxmlformats.org/drawingml/2006/main" xmlns:r="http://schemas.openxmlformats.org/officeDocument/2006/relationships" xmlns:p="http://schemas.openxmlformats.org/presentationml/2006/main">
+  <p:cSld>
+    <p:spTree>
+      <p:nvGrpSpPr>
+        <p:cNvPr id="1" name="">
+          <a:extLst>
+            <a:ext uri="{FF2B5EF4-FFF2-40B4-BE49-F238E27FC236}">
+              <a16:creationId xmlns:a16="http://schemas.microsoft.com/office/drawing/2014/main" id="{3C1FB8ED-2723-24A3-FDE7-3C655758E890}"/>
+            </a:ext>
+          </a:extLst>
+        </p:cNvPr>
+        <p:cNvGrpSpPr/>
+        <p:nvPr/>
+      </p:nvGrpSpPr>
+      <p:grpSpPr>
+        <a:xfrm>
+          <a:off x="0" y="0"/>
+          <a:ext cx="0" cy="0"/>
+          <a:chOff x="0" y="0"/>
+          <a:chExt cx="0" cy="0"/>
+        </a:xfrm>
+      </p:grpSpPr>
+      <p:sp>
+        <p:nvSpPr>
+          <p:cNvPr id="2" name="Title 1">
+            <a:extLst>
+              <a:ext uri="{FF2B5EF4-FFF2-40B4-BE49-F238E27FC236}">
+                <a16:creationId xmlns:a16="http://schemas.microsoft.com/office/drawing/2014/main" id="{94FF57AE-1B33-5DC6-63BB-3E2A3EC3DDC8}"/>
+              </a:ext>
+            </a:extLst>
+          </p:cNvPr>
+          <p:cNvSpPr>
+            <a:spLocks noGrp="1"/>
+          </p:cNvSpPr>
+          <p:nvPr>
+            <p:ph type="title"/>
+          </p:nvPr>
+        </p:nvSpPr>
+        <p:spPr/>
+        <p:txBody>
+          <a:bodyPr/>
+          <a:lstStyle/>
+          <a:p>
+            <a:endParaRPr lang="en-US" dirty="0"/>
+          </a:p>
+        </p:txBody>
+      </p:sp>
+      <p:sp>
+        <p:nvSpPr>
+          <p:cNvPr id="6" name="Rectangle 3">
+            <a:extLst>
+              <a:ext uri="{FF2B5EF4-FFF2-40B4-BE49-F238E27FC236}">
+                <a16:creationId xmlns:a16="http://schemas.microsoft.com/office/drawing/2014/main" id="{9995EC70-165C-581A-8681-71550ABB6926}"/>
+              </a:ext>
+            </a:extLst>
+          </p:cNvPr>
+          <p:cNvSpPr>
+            <a:spLocks noChangeArrowheads="1"/>
+          </p:cNvSpPr>
+          <p:nvPr/>
+        </p:nvSpPr>
+        <p:spPr bwMode="auto">
+          <a:xfrm rot="10800000" flipV="1">
+            <a:off x="1828800" y="2667000"/>
+            <a:ext cx="5334000" cy="1323439"/>
+          </a:xfrm>
+          <a:prstGeom prst="rect">
+            <a:avLst/>
+          </a:prstGeom>
+          <a:noFill/>
+          <a:ln>
+            <a:noFill/>
+          </a:ln>
+          <a:effectLst/>
+          <a:extLst>
+            <a:ext uri="{909E8E84-426E-40DD-AFC4-6F175D3DCCD1}">
+              <a14:hiddenFill xmlns:a14="http://schemas.microsoft.com/office/drawing/2010/main">
+                <a:solidFill>
+                  <a:schemeClr val="accent1"/>
+                </a:solidFill>
+              </a14:hiddenFill>
+            </a:ext>
+            <a:ext uri="{91240B29-F687-4F45-9708-019B960494DF}">
+              <a14:hiddenLine xmlns:a14="http://schemas.microsoft.com/office/drawing/2010/main" w="9525">
+                <a:solidFill>
+                  <a:schemeClr val="tx1"/>
+                </a:solidFill>
+                <a:miter lim="800000"/>
+                <a:headEnd/>
+                <a:tailEnd/>
+              </a14:hiddenLine>
+            </a:ext>
+            <a:ext uri="{AF507438-7753-43E0-B8FC-AC1667EBCBE1}">
+              <a14:hiddenEffects xmlns:a14="http://schemas.microsoft.com/office/drawing/2010/main">
+                <a:effectLst>
+                  <a:outerShdw dist="35921" dir="2700000" algn="ctr" rotWithShape="0">
+                    <a:schemeClr val="bg2"/>
+                  </a:outerShdw>
+                </a:effectLst>
+              </a14:hiddenEffects>
+            </a:ext>
+          </a:extLst>
+        </p:spPr>
+        <p:txBody>
+          <a:bodyPr vert="horz" wrap="square" lIns="91440" tIns="45720" rIns="91440" bIns="45720" numCol="1" anchor="ctr" anchorCtr="0" compatLnSpc="1">
+            <a:prstTxWarp prst="textNoShape">
+              <a:avLst/>
+            </a:prstTxWarp>
+            <a:spAutoFit/>
+          </a:bodyPr>
+          <a:lstStyle/>
+          <a:p>
+            <a:pPr marL="0" marR="0" lvl="0" indent="0" algn="l" defTabSz="914400" rtl="0" eaLnBrk="0" fontAlgn="base" latinLnBrk="0" hangingPunct="0">
+              <a:lnSpc>
+                <a:spcPct val="100000"/>
+              </a:lnSpc>
+              <a:spcBef>
+                <a:spcPct val="0"/>
+              </a:spcBef>
+              <a:spcAft>
+                <a:spcPct val="0"/>
+              </a:spcAft>
+              <a:buClrTx/>
+              <a:buSzTx/>
+              <a:tabLst/>
+            </a:pPr>
+            <a:r>
+              <a:rPr kumimoji="0" lang="en-US" altLang="en-US" sz="8000" b="1" i="0" u="none" strike="noStrike" cap="none" normalizeH="0" baseline="0" dirty="0">
+                <a:ln>
+                  <a:noFill/>
+                </a:ln>
+                <a:solidFill>
+                  <a:schemeClr val="tx1"/>
+                </a:solidFill>
+                <a:effectLst/>
+                <a:latin typeface="Arial" panose="020B0604020202020204" pitchFamily="34" charset="0"/>
+              </a:rPr>
+              <a:t>Thank You</a:t>
+            </a:r>
+            <a:endParaRPr kumimoji="0" lang="en-US" altLang="en-US" sz="8000" b="0" i="0" u="none" strike="noStrike" cap="none" normalizeH="0" baseline="0" dirty="0">
+              <a:ln>
+                <a:noFill/>
+              </a:ln>
+              <a:solidFill>
+                <a:schemeClr val="tx1"/>
+              </a:solidFill>
+              <a:effectLst/>
+              <a:latin typeface="Arial" panose="020B0604020202020204" pitchFamily="34" charset="0"/>
+            </a:endParaRPr>
+          </a:p>
+        </p:txBody>
+      </p:sp>
+    </p:spTree>
+    <p:extLst>
+      <p:ext uri="{BB962C8B-B14F-4D97-AF65-F5344CB8AC3E}">
+        <p14:creationId xmlns:p14="http://schemas.microsoft.com/office/powerpoint/2010/main" val="3797507296"/>
       </p:ext>
     </p:extLst>
   </p:cSld>
@@ -11121,39 +8138,7 @@
                 <a:latin typeface="Times New Roman" panose="02020603050405020304" pitchFamily="18" charset="0"/>
                 <a:cs typeface="Times New Roman" panose="02020603050405020304" pitchFamily="18" charset="0"/>
               </a:rPr>
-              <a:t>,</a:t>
-            </a:r>
-          </a:p>
-          <a:p>
-            <a:pPr marL="0" marR="0" lvl="0" indent="0" algn="l" defTabSz="914400" rtl="0" eaLnBrk="0" fontAlgn="base" latinLnBrk="0" hangingPunct="0">
-              <a:lnSpc>
-                <a:spcPct val="150000"/>
-              </a:lnSpc>
-              <a:spcBef>
-                <a:spcPct val="0"/>
-              </a:spcBef>
-              <a:spcAft>
-                <a:spcPct val="0"/>
-              </a:spcAft>
-              <a:buClrTx/>
-              <a:buSzTx/>
-              <a:buFontTx/>
-              <a:buChar char="•"/>
-              <a:tabLst/>
-            </a:pPr>
-            <a:r>
-              <a:rPr kumimoji="0" lang="en-US" altLang="en-US" sz="2600" b="0" i="0" u="none" strike="noStrike" cap="none" normalizeH="0" baseline="0" dirty="0">
-                <a:ln>
-                  <a:noFill/>
-                </a:ln>
-                <a:solidFill>
-                  <a:schemeClr val="tx1"/>
-                </a:solidFill>
-                <a:effectLst/>
-                <a:latin typeface="Times New Roman" panose="02020603050405020304" pitchFamily="18" charset="0"/>
-                <a:cs typeface="Times New Roman" panose="02020603050405020304" pitchFamily="18" charset="0"/>
-              </a:rPr>
-              <a:t> but lack in </a:t>
+              <a:t>, but lack in </a:t>
             </a:r>
             <a:r>
               <a:rPr kumimoji="0" lang="en-US" altLang="en-US" sz="2600" b="1" i="0" u="none" strike="noStrike" cap="none" normalizeH="0" baseline="0" dirty="0">
@@ -11364,14 +8349,14 @@
             <p:ph idx="1"/>
             <p:extLst>
               <p:ext uri="{D42A27DB-BD31-4B8C-83A1-F6EECF244321}">
-                <p14:modId xmlns:p14="http://schemas.microsoft.com/office/powerpoint/2010/main" val="3130735662"/>
+                <p14:modId xmlns:p14="http://schemas.microsoft.com/office/powerpoint/2010/main" val="2645439238"/>
               </p:ext>
             </p:extLst>
           </p:nvPr>
         </p:nvGraphicFramePr>
         <p:xfrm>
           <a:off x="457200" y="1371600"/>
-          <a:ext cx="8229600" cy="5181599"/>
+          <a:ext cx="8229600" cy="4800601"/>
         </p:xfrm>
         <a:graphic>
           <a:graphicData uri="http://schemas.openxmlformats.org/drawingml/2006/table">
@@ -11395,7 +8380,7 @@
                   </a:extLst>
                 </a:gridCol>
               </a:tblGrid>
-              <a:tr h="518159">
+              <a:tr h="685799">
                 <a:tc>
                   <a:txBody>
                     <a:bodyPr/>
@@ -11460,7 +8445,7 @@
                   </a:ext>
                 </a:extLst>
               </a:tr>
-              <a:tr h="1554480">
+              <a:tr h="2057401">
                 <a:tc>
                   <a:txBody>
                     <a:bodyPr/>
@@ -11475,12 +8460,12 @@
                         </a:spcAft>
                       </a:pPr>
                       <a:r>
-                        <a:rPr lang="en-US" sz="2000">
+                        <a:rPr lang="en-US" sz="2400">
                           <a:effectLst/>
                         </a:rPr>
                         <a:t>Project Management: Manage tasks, timelines, and resources.</a:t>
                       </a:r>
-                      <a:endParaRPr lang="en-US" sz="1400">
+                      <a:endParaRPr lang="en-US" sz="1600">
                         <a:effectLst/>
                         <a:latin typeface="Times New Roman" panose="02020603050405020304" pitchFamily="18" charset="0"/>
                         <a:ea typeface="Times New Roman" panose="02020603050405020304" pitchFamily="18" charset="0"/>
@@ -11504,12 +8489,12 @@
                         </a:spcAft>
                       </a:pPr>
                       <a:r>
-                        <a:rPr lang="en-US" sz="2000" dirty="0">
+                        <a:rPr lang="en-US" sz="2400" dirty="0">
                           <a:effectLst/>
                         </a:rPr>
                         <a:t>Automatically generate real-time documentation of decisions and progress.</a:t>
                       </a:r>
-                      <a:endParaRPr lang="en-US" sz="1400" dirty="0">
+                      <a:endParaRPr lang="en-US" sz="1600" dirty="0">
                         <a:effectLst/>
                         <a:latin typeface="Times New Roman" panose="02020603050405020304" pitchFamily="18" charset="0"/>
                         <a:ea typeface="Times New Roman" panose="02020603050405020304" pitchFamily="18" charset="0"/>
@@ -11525,7 +8510,7 @@
                   </a:ext>
                 </a:extLst>
               </a:tr>
-              <a:tr h="1554480">
+              <a:tr h="2057401">
                 <a:tc>
                   <a:txBody>
                     <a:bodyPr/>
@@ -11540,12 +8525,12 @@
                         </a:spcAft>
                       </a:pPr>
                       <a:r>
-                        <a:rPr lang="en-US" sz="2000" dirty="0">
+                        <a:rPr lang="en-US" sz="2400" dirty="0">
                           <a:effectLst/>
                         </a:rPr>
                         <a:t>Budget Tracking: Monitor project expenses and stay within budget.</a:t>
                       </a:r>
-                      <a:endParaRPr lang="en-US" sz="1400" dirty="0">
+                      <a:endParaRPr lang="en-US" sz="1600" dirty="0">
                         <a:effectLst/>
                         <a:latin typeface="Times New Roman" panose="02020603050405020304" pitchFamily="18" charset="0"/>
                         <a:ea typeface="Times New Roman" panose="02020603050405020304" pitchFamily="18" charset="0"/>
@@ -11569,12 +8554,12 @@
                         </a:spcAft>
                       </a:pPr>
                       <a:r>
-                        <a:rPr lang="en-US" sz="2000">
+                        <a:rPr lang="en-US" sz="2400" dirty="0">
                           <a:effectLst/>
                         </a:rPr>
                         <a:t>Customizable Project Tracking: Tailor project tracking dashboards to suit specific client needs.</a:t>
                       </a:r>
-                      <a:endParaRPr lang="en-US" sz="1400">
+                      <a:endParaRPr lang="en-US" sz="1600" dirty="0">
                         <a:effectLst/>
                         <a:latin typeface="Times New Roman" panose="02020603050405020304" pitchFamily="18" charset="0"/>
                         <a:ea typeface="Times New Roman" panose="02020603050405020304" pitchFamily="18" charset="0"/>
@@ -11587,83 +8572,6 @@
                 <a:extLst>
                   <a:ext uri="{0D108BD9-81ED-4DB2-BD59-A6C34878D82A}">
                     <a16:rowId xmlns:a16="http://schemas.microsoft.com/office/drawing/2014/main" val="1766004198"/>
-                  </a:ext>
-                </a:extLst>
-              </a:tr>
-              <a:tr h="1554480">
-                <a:tc>
-                  <a:txBody>
-                    <a:bodyPr/>
-                    <a:lstStyle/>
-                    <a:p>
-                      <a:pPr marL="0" marR="0" algn="l">
-                        <a:spcBef>
-                          <a:spcPts val="65"/>
-                        </a:spcBef>
-                        <a:spcAft>
-                          <a:spcPts val="0"/>
-                        </a:spcAft>
-                      </a:pPr>
-                      <a:r>
-                        <a:rPr lang="en-US" sz="2000" dirty="0">
-                          <a:effectLst/>
-                        </a:rPr>
-                        <a:t>Client Portal: Limited client visibility into project details.</a:t>
-                      </a:r>
-                      <a:endParaRPr lang="en-US" sz="1400" dirty="0">
-                        <a:effectLst/>
-                        <a:latin typeface="Times New Roman" panose="02020603050405020304" pitchFamily="18" charset="0"/>
-                        <a:ea typeface="Times New Roman" panose="02020603050405020304" pitchFamily="18" charset="0"/>
-                        <a:cs typeface="Arial" panose="020B0604020202020204" pitchFamily="34" charset="0"/>
-                      </a:endParaRPr>
-                    </a:p>
-                  </a:txBody>
-                  <a:tcPr marL="68580" marR="68580" marT="0" marB="0" anchor="ctr"/>
-                </a:tc>
-                <a:tc>
-                  <a:txBody>
-                    <a:bodyPr/>
-                    <a:lstStyle/>
-                    <a:p>
-                      <a:pPr marL="0" marR="0" algn="l">
-                        <a:spcBef>
-                          <a:spcPts val="65"/>
-                        </a:spcBef>
-                        <a:spcAft>
-                          <a:spcPts val="0"/>
-                        </a:spcAft>
-                      </a:pPr>
-                      <a:r>
-                        <a:rPr lang="en-US" sz="2000" dirty="0">
-                          <a:effectLst/>
-                        </a:rPr>
-                        <a:t>Personalized Communication: Direct, customizable communication channels between clients, builders, and </a:t>
-                      </a:r>
-                      <a:r>
-                        <a:rPr lang="en-US" sz="2000" dirty="0" err="1">
-                          <a:effectLst/>
-                        </a:rPr>
-                        <a:t>tradies</a:t>
-                      </a:r>
-                      <a:r>
-                        <a:rPr lang="en-US" sz="2000" dirty="0">
-                          <a:effectLst/>
-                        </a:rPr>
-                        <a:t>.</a:t>
-                      </a:r>
-                      <a:endParaRPr lang="en-US" sz="1400" dirty="0">
-                        <a:effectLst/>
-                        <a:latin typeface="Times New Roman" panose="02020603050405020304" pitchFamily="18" charset="0"/>
-                        <a:ea typeface="Times New Roman" panose="02020603050405020304" pitchFamily="18" charset="0"/>
-                        <a:cs typeface="Arial" panose="020B0604020202020204" pitchFamily="34" charset="0"/>
-                      </a:endParaRPr>
-                    </a:p>
-                  </a:txBody>
-                  <a:tcPr marL="68580" marR="68580" marT="0" marB="0" anchor="ctr"/>
-                </a:tc>
-                <a:extLst>
-                  <a:ext uri="{0D108BD9-81ED-4DB2-BD59-A6C34878D82A}">
-                    <a16:rowId xmlns:a16="http://schemas.microsoft.com/office/drawing/2014/main" val="886487636"/>
                   </a:ext>
                 </a:extLst>
               </a:tr>
@@ -11719,10 +8627,22 @@
         </p:nvSpPr>
         <p:spPr/>
         <p:txBody>
-          <a:bodyPr/>
+          <a:bodyPr>
+            <a:normAutofit fontScale="90000"/>
+          </a:bodyPr>
           <a:lstStyle/>
           <a:p>
-            <a:endParaRPr lang="en-US"/>
+            <a:r>
+              <a:rPr lang="en-US" dirty="0"/>
+              <a:t>Differentiate Between </a:t>
+            </a:r>
+            <a:br>
+              <a:rPr lang="en-US" dirty="0"/>
+            </a:br>
+            <a:r>
+              <a:rPr lang="en-US" dirty="0"/>
+              <a:t>Existing &amp; Unique Features</a:t>
+            </a:r>
           </a:p>
         </p:txBody>
       </p:sp>
@@ -11742,14 +8662,14 @@
             <p:ph idx="1"/>
             <p:extLst>
               <p:ext uri="{D42A27DB-BD31-4B8C-83A1-F6EECF244321}">
-                <p14:modId xmlns:p14="http://schemas.microsoft.com/office/powerpoint/2010/main" val="4195359306"/>
+                <p14:modId xmlns:p14="http://schemas.microsoft.com/office/powerpoint/2010/main" val="1484481390"/>
               </p:ext>
             </p:extLst>
           </p:nvPr>
         </p:nvGraphicFramePr>
         <p:xfrm>
           <a:off x="304800" y="1447800"/>
-          <a:ext cx="8534400" cy="4648200"/>
+          <a:ext cx="8534400" cy="2582333"/>
         </p:xfrm>
         <a:graphic>
           <a:graphicData uri="http://schemas.openxmlformats.org/drawingml/2006/table">
@@ -11860,7 +8780,57 @@
                   </a:ext>
                 </a:extLst>
               </a:tr>
-              <a:tr h="2065867">
+            </a:tbl>
+          </a:graphicData>
+        </a:graphic>
+      </p:graphicFrame>
+      <p:graphicFrame>
+        <p:nvGraphicFramePr>
+          <p:cNvPr id="3" name="Table 2">
+            <a:extLst>
+              <a:ext uri="{FF2B5EF4-FFF2-40B4-BE49-F238E27FC236}">
+                <a16:creationId xmlns:a16="http://schemas.microsoft.com/office/drawing/2014/main" id="{ECA9F46F-D68D-8AA1-BE92-8B5B08BA556E}"/>
+              </a:ext>
+            </a:extLst>
+          </p:cNvPr>
+          <p:cNvGraphicFramePr>
+            <a:graphicFrameLocks noGrp="1"/>
+          </p:cNvGraphicFramePr>
+          <p:nvPr>
+            <p:extLst>
+              <p:ext uri="{D42A27DB-BD31-4B8C-83A1-F6EECF244321}">
+                <p14:modId xmlns:p14="http://schemas.microsoft.com/office/powerpoint/2010/main" val="2685739717"/>
+              </p:ext>
+            </p:extLst>
+          </p:nvPr>
+        </p:nvGraphicFramePr>
+        <p:xfrm>
+          <a:off x="304800" y="3996604"/>
+          <a:ext cx="8534400" cy="1642195"/>
+        </p:xfrm>
+        <a:graphic>
+          <a:graphicData uri="http://schemas.openxmlformats.org/drawingml/2006/table">
+            <a:tbl>
+              <a:tblPr firstRow="1" firstCol="1" bandRow="1">
+                <a:tableStyleId>{5C22544A-7EE6-4342-B048-85BDC9FD1C3A}</a:tableStyleId>
+              </a:tblPr>
+              <a:tblGrid>
+                <a:gridCol w="4267200">
+                  <a:extLst>
+                    <a:ext uri="{9D8B030D-6E8A-4147-A177-3AD203B41FA5}">
+                      <a16:colId xmlns:a16="http://schemas.microsoft.com/office/drawing/2014/main" val="3887866217"/>
+                    </a:ext>
+                  </a:extLst>
+                </a:gridCol>
+                <a:gridCol w="4267200">
+                  <a:extLst>
+                    <a:ext uri="{9D8B030D-6E8A-4147-A177-3AD203B41FA5}">
+                      <a16:colId xmlns:a16="http://schemas.microsoft.com/office/drawing/2014/main" val="3654215540"/>
+                    </a:ext>
+                  </a:extLst>
+                </a:gridCol>
+              </a:tblGrid>
+              <a:tr h="1642195">
                 <a:tc>
                   <a:txBody>
                     <a:bodyPr/>
@@ -11875,12 +8845,12 @@
                         </a:spcAft>
                       </a:pPr>
                       <a:r>
-                        <a:rPr lang="en-US" sz="2200" dirty="0">
+                        <a:rPr lang="en-US" sz="2000" dirty="0">
                           <a:effectLst/>
                         </a:rPr>
-                        <a:t>Progress Photos/Updates: Upload and share progress pictures.</a:t>
+                        <a:t>Client Portal: Limited client visibility into project details.</a:t>
                       </a:r>
-                      <a:endParaRPr lang="en-US" sz="2200" dirty="0">
+                      <a:endParaRPr lang="en-US" sz="1400" dirty="0">
                         <a:effectLst/>
                         <a:latin typeface="Times New Roman" panose="02020603050405020304" pitchFamily="18" charset="0"/>
                         <a:ea typeface="Times New Roman" panose="02020603050405020304" pitchFamily="18" charset="0"/>
@@ -11904,12 +8874,24 @@
                         </a:spcAft>
                       </a:pPr>
                       <a:r>
-                        <a:rPr lang="en-US" sz="2200" dirty="0">
+                        <a:rPr lang="en-US" sz="2000" dirty="0">
                           <a:effectLst/>
                         </a:rPr>
-                        <a:t>Interactive Progress Reports: Real-time, interactive reports with updates, photos, and documents.</a:t>
+                        <a:t>Personalized Communication: Direct, customizable communication channels between clients, builders, and </a:t>
                       </a:r>
-                      <a:endParaRPr lang="en-US" sz="2200" dirty="0">
+                      <a:r>
+                        <a:rPr lang="en-US" sz="2000" dirty="0" err="1">
+                          <a:effectLst/>
+                        </a:rPr>
+                        <a:t>tradies</a:t>
+                      </a:r>
+                      <a:r>
+                        <a:rPr lang="en-US" sz="2000" dirty="0">
+                          <a:effectLst/>
+                        </a:rPr>
+                        <a:t>.</a:t>
+                      </a:r>
+                      <a:endParaRPr lang="en-US" sz="1400" dirty="0">
                         <a:effectLst/>
                         <a:latin typeface="Times New Roman" panose="02020603050405020304" pitchFamily="18" charset="0"/>
                         <a:ea typeface="Times New Roman" panose="02020603050405020304" pitchFamily="18" charset="0"/>
@@ -11921,7 +8903,7 @@
                 </a:tc>
                 <a:extLst>
                   <a:ext uri="{0D108BD9-81ED-4DB2-BD59-A6C34878D82A}">
-                    <a16:rowId xmlns:a16="http://schemas.microsoft.com/office/drawing/2014/main" val="142014423"/>
+                    <a16:rowId xmlns:a16="http://schemas.microsoft.com/office/drawing/2014/main" val="600603657"/>
                   </a:ext>
                 </a:extLst>
               </a:tr>

</xml_diff>